<commit_message>
Update and revise the course structure
</commit_message>
<xml_diff>
--- a/syllabus/format.pptx
+++ b/syllabus/format.pptx
@@ -6,6 +6,7 @@
   </p:sldMasterIdLst>
   <p:sldIdLst>
     <p:sldId id="256" r:id="rId2"/>
+    <p:sldId id="257" r:id="rId3"/>
   </p:sldIdLst>
   <p:sldSz cx="9144000" cy="6858000" type="screen4x3"/>
   <p:notesSz cx="6858000" cy="9144000"/>
@@ -254,7 +255,7 @@
           <a:p>
             <a:fld id="{48CDFCA1-6601-C943-AA02-89F09BE97B91}" type="datetimeFigureOut">
               <a:rPr lang="en-US" smtClean="0"/>
-              <a:t>2/11/2022</a:t>
+              <a:t>2/28/2022</a:t>
             </a:fld>
             <a:endParaRPr lang="en-US"/>
           </a:p>
@@ -424,7 +425,7 @@
           <a:p>
             <a:fld id="{48CDFCA1-6601-C943-AA02-89F09BE97B91}" type="datetimeFigureOut">
               <a:rPr lang="en-US" smtClean="0"/>
-              <a:t>2/11/2022</a:t>
+              <a:t>2/28/2022</a:t>
             </a:fld>
             <a:endParaRPr lang="en-US"/>
           </a:p>
@@ -604,7 +605,7 @@
           <a:p>
             <a:fld id="{48CDFCA1-6601-C943-AA02-89F09BE97B91}" type="datetimeFigureOut">
               <a:rPr lang="en-US" smtClean="0"/>
-              <a:t>2/11/2022</a:t>
+              <a:t>2/28/2022</a:t>
             </a:fld>
             <a:endParaRPr lang="en-US"/>
           </a:p>
@@ -774,7 +775,7 @@
           <a:p>
             <a:fld id="{48CDFCA1-6601-C943-AA02-89F09BE97B91}" type="datetimeFigureOut">
               <a:rPr lang="en-US" smtClean="0"/>
-              <a:t>2/11/2022</a:t>
+              <a:t>2/28/2022</a:t>
             </a:fld>
             <a:endParaRPr lang="en-US"/>
           </a:p>
@@ -1018,7 +1019,7 @@
           <a:p>
             <a:fld id="{48CDFCA1-6601-C943-AA02-89F09BE97B91}" type="datetimeFigureOut">
               <a:rPr lang="en-US" smtClean="0"/>
-              <a:t>2/11/2022</a:t>
+              <a:t>2/28/2022</a:t>
             </a:fld>
             <a:endParaRPr lang="en-US"/>
           </a:p>
@@ -1250,7 +1251,7 @@
           <a:p>
             <a:fld id="{48CDFCA1-6601-C943-AA02-89F09BE97B91}" type="datetimeFigureOut">
               <a:rPr lang="en-US" smtClean="0"/>
-              <a:t>2/11/2022</a:t>
+              <a:t>2/28/2022</a:t>
             </a:fld>
             <a:endParaRPr lang="en-US"/>
           </a:p>
@@ -1617,7 +1618,7 @@
           <a:p>
             <a:fld id="{48CDFCA1-6601-C943-AA02-89F09BE97B91}" type="datetimeFigureOut">
               <a:rPr lang="en-US" smtClean="0"/>
-              <a:t>2/11/2022</a:t>
+              <a:t>2/28/2022</a:t>
             </a:fld>
             <a:endParaRPr lang="en-US"/>
           </a:p>
@@ -1735,7 +1736,7 @@
           <a:p>
             <a:fld id="{48CDFCA1-6601-C943-AA02-89F09BE97B91}" type="datetimeFigureOut">
               <a:rPr lang="en-US" smtClean="0"/>
-              <a:t>2/11/2022</a:t>
+              <a:t>2/28/2022</a:t>
             </a:fld>
             <a:endParaRPr lang="en-US"/>
           </a:p>
@@ -1830,7 +1831,7 @@
           <a:p>
             <a:fld id="{48CDFCA1-6601-C943-AA02-89F09BE97B91}" type="datetimeFigureOut">
               <a:rPr lang="en-US" smtClean="0"/>
-              <a:t>2/11/2022</a:t>
+              <a:t>2/28/2022</a:t>
             </a:fld>
             <a:endParaRPr lang="en-US"/>
           </a:p>
@@ -2107,7 +2108,7 @@
           <a:p>
             <a:fld id="{48CDFCA1-6601-C943-AA02-89F09BE97B91}" type="datetimeFigureOut">
               <a:rPr lang="en-US" smtClean="0"/>
-              <a:t>2/11/2022</a:t>
+              <a:t>2/28/2022</a:t>
             </a:fld>
             <a:endParaRPr lang="en-US"/>
           </a:p>
@@ -2364,7 +2365,7 @@
           <a:p>
             <a:fld id="{48CDFCA1-6601-C943-AA02-89F09BE97B91}" type="datetimeFigureOut">
               <a:rPr lang="en-US" smtClean="0"/>
-              <a:t>2/11/2022</a:t>
+              <a:t>2/28/2022</a:t>
             </a:fld>
             <a:endParaRPr lang="en-US"/>
           </a:p>
@@ -2577,7 +2578,7 @@
           <a:p>
             <a:fld id="{48CDFCA1-6601-C943-AA02-89F09BE97B91}" type="datetimeFigureOut">
               <a:rPr lang="en-US" smtClean="0"/>
-              <a:t>2/11/2022</a:t>
+              <a:t>2/28/2022</a:t>
             </a:fld>
             <a:endParaRPr lang="en-US"/>
           </a:p>
@@ -3007,7 +3008,2671 @@
           <p:nvPr>
             <p:extLst>
               <p:ext uri="{D42A27DB-BD31-4B8C-83A1-F6EECF244321}">
-                <p14:modId xmlns:p14="http://schemas.microsoft.com/office/powerpoint/2010/main" val="3986305723"/>
+                <p14:modId xmlns:p14="http://schemas.microsoft.com/office/powerpoint/2010/main" val="1260134993"/>
+              </p:ext>
+            </p:extLst>
+          </p:nvPr>
+        </p:nvGraphicFramePr>
+        <p:xfrm>
+          <a:off x="0" y="0"/>
+          <a:ext cx="9144002" cy="7069456"/>
+        </p:xfrm>
+        <a:graphic>
+          <a:graphicData uri="http://schemas.openxmlformats.org/drawingml/2006/table">
+            <a:tbl>
+              <a:tblPr firstRow="1" bandRow="1" bandCol="1">
+                <a:tableStyleId>{F2DE63D5-997A-4646-A377-4702673A728D}</a:tableStyleId>
+              </a:tblPr>
+              <a:tblGrid>
+                <a:gridCol w="1298825">
+                  <a:extLst>
+                    <a:ext uri="{9D8B030D-6E8A-4147-A177-3AD203B41FA5}">
+                      <a16:colId xmlns:a16="http://schemas.microsoft.com/office/drawing/2014/main" val="3049745298"/>
+                    </a:ext>
+                  </a:extLst>
+                </a:gridCol>
+                <a:gridCol w="5977046">
+                  <a:extLst>
+                    <a:ext uri="{9D8B030D-6E8A-4147-A177-3AD203B41FA5}">
+                      <a16:colId xmlns:a16="http://schemas.microsoft.com/office/drawing/2014/main" val="3141381812"/>
+                    </a:ext>
+                  </a:extLst>
+                </a:gridCol>
+                <a:gridCol w="1868131">
+                  <a:extLst>
+                    <a:ext uri="{9D8B030D-6E8A-4147-A177-3AD203B41FA5}">
+                      <a16:colId xmlns:a16="http://schemas.microsoft.com/office/drawing/2014/main" val="2516319591"/>
+                    </a:ext>
+                  </a:extLst>
+                </a:gridCol>
+              </a:tblGrid>
+              <a:tr h="214313">
+                <a:tc>
+                  <a:txBody>
+                    <a:bodyPr/>
+                    <a:lstStyle/>
+                    <a:p>
+                      <a:pPr marL="90170" marR="0" algn="ctr">
+                        <a:spcBef>
+                          <a:spcPts val="0"/>
+                        </a:spcBef>
+                        <a:spcAft>
+                          <a:spcPts val="0"/>
+                        </a:spcAft>
+                      </a:pPr>
+                      <a:r>
+                        <a:rPr lang="en-US" sz="1400" dirty="0">
+                          <a:effectLst/>
+                          <a:latin typeface="Times New Roman" panose="02020603050405020304" pitchFamily="18" charset="0"/>
+                          <a:cs typeface="Times New Roman" panose="02020603050405020304" pitchFamily="18" charset="0"/>
+                        </a:rPr>
+                        <a:t>Week</a:t>
+                      </a:r>
+                      <a:endParaRPr lang="en-US" sz="1400" dirty="0">
+                        <a:solidFill>
+                          <a:srgbClr val="000000"/>
+                        </a:solidFill>
+                        <a:effectLst/>
+                        <a:latin typeface="Times New Roman" panose="02020603050405020304" pitchFamily="18" charset="0"/>
+                        <a:ea typeface="Calibri" panose="020F0502020204030204" pitchFamily="34" charset="0"/>
+                        <a:cs typeface="Times New Roman" panose="02020603050405020304" pitchFamily="18" charset="0"/>
+                      </a:endParaRPr>
+                    </a:p>
+                  </a:txBody>
+                  <a:tcPr marL="53270" marR="53270" marT="0" marB="0"/>
+                </a:tc>
+                <a:tc>
+                  <a:txBody>
+                    <a:bodyPr/>
+                    <a:lstStyle/>
+                    <a:p>
+                      <a:pPr marL="90170" marR="0" algn="ctr">
+                        <a:spcBef>
+                          <a:spcPts val="0"/>
+                        </a:spcBef>
+                        <a:spcAft>
+                          <a:spcPts val="0"/>
+                        </a:spcAft>
+                      </a:pPr>
+                      <a:r>
+                        <a:rPr lang="en-US" sz="1400" dirty="0">
+                          <a:effectLst/>
+                          <a:latin typeface="Times New Roman" panose="02020603050405020304" pitchFamily="18" charset="0"/>
+                          <a:cs typeface="Times New Roman" panose="02020603050405020304" pitchFamily="18" charset="0"/>
+                        </a:rPr>
+                        <a:t>Topic</a:t>
+                      </a:r>
+                      <a:endParaRPr lang="en-US" sz="1400" dirty="0">
+                        <a:solidFill>
+                          <a:srgbClr val="000000"/>
+                        </a:solidFill>
+                        <a:effectLst/>
+                        <a:latin typeface="Times New Roman" panose="02020603050405020304" pitchFamily="18" charset="0"/>
+                        <a:ea typeface="Calibri" panose="020F0502020204030204" pitchFamily="34" charset="0"/>
+                        <a:cs typeface="Times New Roman" panose="02020603050405020304" pitchFamily="18" charset="0"/>
+                      </a:endParaRPr>
+                    </a:p>
+                  </a:txBody>
+                  <a:tcPr marL="53270" marR="53270" marT="0" marB="0"/>
+                </a:tc>
+                <a:tc>
+                  <a:txBody>
+                    <a:bodyPr/>
+                    <a:lstStyle/>
+                    <a:p>
+                      <a:pPr marL="90170" marR="0" algn="ctr">
+                        <a:spcBef>
+                          <a:spcPts val="0"/>
+                        </a:spcBef>
+                        <a:spcAft>
+                          <a:spcPts val="0"/>
+                        </a:spcAft>
+                      </a:pPr>
+                      <a:r>
+                        <a:rPr lang="en-US" sz="1400">
+                          <a:effectLst/>
+                          <a:latin typeface="Times New Roman" panose="02020603050405020304" pitchFamily="18" charset="0"/>
+                          <a:cs typeface="Times New Roman" panose="02020603050405020304" pitchFamily="18" charset="0"/>
+                        </a:rPr>
+                        <a:t>Coursework</a:t>
+                      </a:r>
+                      <a:endParaRPr lang="en-US" sz="1400" dirty="0">
+                        <a:solidFill>
+                          <a:srgbClr val="000000"/>
+                        </a:solidFill>
+                        <a:effectLst/>
+                        <a:latin typeface="Times New Roman" panose="02020603050405020304" pitchFamily="18" charset="0"/>
+                        <a:ea typeface="Calibri" panose="020F0502020204030204" pitchFamily="34" charset="0"/>
+                        <a:cs typeface="Times New Roman" panose="02020603050405020304" pitchFamily="18" charset="0"/>
+                      </a:endParaRPr>
+                    </a:p>
+                  </a:txBody>
+                  <a:tcPr marL="53270" marR="53270" marT="0" marB="0"/>
+                </a:tc>
+                <a:extLst>
+                  <a:ext uri="{0D108BD9-81ED-4DB2-BD59-A6C34878D82A}">
+                    <a16:rowId xmlns:a16="http://schemas.microsoft.com/office/drawing/2014/main" val="1094461806"/>
+                  </a:ext>
+                </a:extLst>
+              </a:tr>
+              <a:tr h="428625">
+                <a:tc>
+                  <a:txBody>
+                    <a:bodyPr/>
+                    <a:lstStyle/>
+                    <a:p>
+                      <a:pPr marL="90170" marR="0" algn="ctr">
+                        <a:spcBef>
+                          <a:spcPts val="0"/>
+                        </a:spcBef>
+                        <a:spcAft>
+                          <a:spcPts val="0"/>
+                        </a:spcAft>
+                      </a:pPr>
+                      <a:r>
+                        <a:rPr lang="en-US" sz="1400" b="1" dirty="0">
+                          <a:effectLst/>
+                          <a:latin typeface="Times New Roman" panose="02020603050405020304" pitchFamily="18" charset="0"/>
+                          <a:cs typeface="Times New Roman" panose="02020603050405020304" pitchFamily="18" charset="0"/>
+                        </a:rPr>
+                        <a:t>Week 1: </a:t>
+                      </a:r>
+                    </a:p>
+                    <a:p>
+                      <a:pPr marL="90170" marR="0" algn="ctr">
+                        <a:spcBef>
+                          <a:spcPts val="0"/>
+                        </a:spcBef>
+                        <a:spcAft>
+                          <a:spcPts val="0"/>
+                        </a:spcAft>
+                      </a:pPr>
+                      <a:r>
+                        <a:rPr lang="en-US" sz="1400" b="1" dirty="0">
+                          <a:effectLst/>
+                          <a:latin typeface="Times New Roman" panose="02020603050405020304" pitchFamily="18" charset="0"/>
+                          <a:cs typeface="Times New Roman" panose="02020603050405020304" pitchFamily="18" charset="0"/>
+                        </a:rPr>
+                        <a:t>Jan 24</a:t>
+                      </a:r>
+                      <a:r>
+                        <a:rPr lang="en-US" sz="1400" b="1" baseline="30000" dirty="0">
+                          <a:effectLst/>
+                          <a:latin typeface="Times New Roman" panose="02020603050405020304" pitchFamily="18" charset="0"/>
+                          <a:cs typeface="Times New Roman" panose="02020603050405020304" pitchFamily="18" charset="0"/>
+                        </a:rPr>
+                        <a:t>th</a:t>
+                      </a:r>
+                      <a:endParaRPr lang="en-US" sz="1400" b="1" dirty="0">
+                        <a:solidFill>
+                          <a:srgbClr val="000000"/>
+                        </a:solidFill>
+                        <a:effectLst/>
+                        <a:latin typeface="Times New Roman" panose="02020603050405020304" pitchFamily="18" charset="0"/>
+                        <a:ea typeface="Calibri" panose="020F0502020204030204" pitchFamily="34" charset="0"/>
+                        <a:cs typeface="Times New Roman" panose="02020603050405020304" pitchFamily="18" charset="0"/>
+                      </a:endParaRPr>
+                    </a:p>
+                  </a:txBody>
+                  <a:tcPr marL="53270" marR="53270" marT="0" marB="0"/>
+                </a:tc>
+                <a:tc>
+                  <a:txBody>
+                    <a:bodyPr/>
+                    <a:lstStyle/>
+                    <a:p>
+                      <a:pPr marL="90170" marR="0">
+                        <a:spcBef>
+                          <a:spcPts val="0"/>
+                        </a:spcBef>
+                        <a:spcAft>
+                          <a:spcPts val="0"/>
+                        </a:spcAft>
+                      </a:pPr>
+                      <a:r>
+                        <a:rPr lang="en-US" sz="1400" dirty="0">
+                          <a:effectLst/>
+                          <a:latin typeface="Times New Roman" panose="02020603050405020304" pitchFamily="18" charset="0"/>
+                          <a:cs typeface="Times New Roman" panose="02020603050405020304" pitchFamily="18" charset="0"/>
+                        </a:rPr>
+                        <a:t>Introduction and course overview</a:t>
+                      </a:r>
+                    </a:p>
+                    <a:p>
+                      <a:pPr marL="90170" marR="0">
+                        <a:spcBef>
+                          <a:spcPts val="0"/>
+                        </a:spcBef>
+                        <a:spcAft>
+                          <a:spcPts val="0"/>
+                        </a:spcAft>
+                      </a:pPr>
+                      <a:r>
+                        <a:rPr lang="en-US" sz="1400" dirty="0">
+                          <a:effectLst/>
+                          <a:latin typeface="Times New Roman" panose="02020603050405020304" pitchFamily="18" charset="0"/>
+                          <a:cs typeface="Times New Roman" panose="02020603050405020304" pitchFamily="18" charset="0"/>
+                        </a:rPr>
+                        <a:t>Installing Anaconda + </a:t>
+                      </a:r>
+                      <a:r>
+                        <a:rPr lang="en-US" sz="1400" dirty="0" err="1">
+                          <a:effectLst/>
+                          <a:latin typeface="Times New Roman" panose="02020603050405020304" pitchFamily="18" charset="0"/>
+                          <a:cs typeface="Times New Roman" panose="02020603050405020304" pitchFamily="18" charset="0"/>
+                        </a:rPr>
+                        <a:t>Jupyter</a:t>
+                      </a:r>
+                      <a:r>
+                        <a:rPr lang="en-US" sz="1400" dirty="0">
+                          <a:effectLst/>
+                          <a:latin typeface="Times New Roman" panose="02020603050405020304" pitchFamily="18" charset="0"/>
+                          <a:cs typeface="Times New Roman" panose="02020603050405020304" pitchFamily="18" charset="0"/>
+                        </a:rPr>
+                        <a:t> notebooks</a:t>
+                      </a:r>
+                      <a:endParaRPr lang="en-US" sz="1400" dirty="0">
+                        <a:solidFill>
+                          <a:srgbClr val="000000"/>
+                        </a:solidFill>
+                        <a:effectLst/>
+                        <a:latin typeface="Times New Roman" panose="02020603050405020304" pitchFamily="18" charset="0"/>
+                        <a:ea typeface="Calibri" panose="020F0502020204030204" pitchFamily="34" charset="0"/>
+                        <a:cs typeface="Times New Roman" panose="02020603050405020304" pitchFamily="18" charset="0"/>
+                      </a:endParaRPr>
+                    </a:p>
+                  </a:txBody>
+                  <a:tcPr marL="53270" marR="53270" marT="0" marB="0" anchor="ctr"/>
+                </a:tc>
+                <a:tc>
+                  <a:txBody>
+                    <a:bodyPr/>
+                    <a:lstStyle/>
+                    <a:p>
+                      <a:pPr marL="90170" marR="0" algn="ctr">
+                        <a:spcBef>
+                          <a:spcPts val="0"/>
+                        </a:spcBef>
+                        <a:spcAft>
+                          <a:spcPts val="0"/>
+                        </a:spcAft>
+                      </a:pPr>
+                      <a:r>
+                        <a:rPr lang="en-US" sz="1400" dirty="0">
+                          <a:effectLst/>
+                          <a:latin typeface="Times New Roman" panose="02020603050405020304" pitchFamily="18" charset="0"/>
+                          <a:cs typeface="Times New Roman" panose="02020603050405020304" pitchFamily="18" charset="0"/>
+                        </a:rPr>
+                        <a:t>Assignment 1</a:t>
+                      </a:r>
+                      <a:endParaRPr lang="en-US" sz="1400" dirty="0">
+                        <a:solidFill>
+                          <a:srgbClr val="000000"/>
+                        </a:solidFill>
+                        <a:effectLst/>
+                        <a:latin typeface="Times New Roman" panose="02020603050405020304" pitchFamily="18" charset="0"/>
+                        <a:ea typeface="Calibri" panose="020F0502020204030204" pitchFamily="34" charset="0"/>
+                        <a:cs typeface="Times New Roman" panose="02020603050405020304" pitchFamily="18" charset="0"/>
+                      </a:endParaRPr>
+                    </a:p>
+                  </a:txBody>
+                  <a:tcPr marL="53270" marR="53270" marT="0" marB="0" anchor="ctr"/>
+                </a:tc>
+                <a:extLst>
+                  <a:ext uri="{0D108BD9-81ED-4DB2-BD59-A6C34878D82A}">
+                    <a16:rowId xmlns:a16="http://schemas.microsoft.com/office/drawing/2014/main" val="2484527875"/>
+                  </a:ext>
+                </a:extLst>
+              </a:tr>
+              <a:tr h="428625">
+                <a:tc>
+                  <a:txBody>
+                    <a:bodyPr/>
+                    <a:lstStyle/>
+                    <a:p>
+                      <a:pPr marL="90170" marR="0" algn="ctr">
+                        <a:spcBef>
+                          <a:spcPts val="0"/>
+                        </a:spcBef>
+                        <a:spcAft>
+                          <a:spcPts val="0"/>
+                        </a:spcAft>
+                      </a:pPr>
+                      <a:r>
+                        <a:rPr lang="en-US" sz="1400" b="1" dirty="0">
+                          <a:effectLst/>
+                          <a:latin typeface="Times New Roman" panose="02020603050405020304" pitchFamily="18" charset="0"/>
+                          <a:cs typeface="Times New Roman" panose="02020603050405020304" pitchFamily="18" charset="0"/>
+                        </a:rPr>
+                        <a:t>Week 2: </a:t>
+                      </a:r>
+                    </a:p>
+                    <a:p>
+                      <a:pPr marL="90170" marR="0" algn="ctr">
+                        <a:spcBef>
+                          <a:spcPts val="0"/>
+                        </a:spcBef>
+                        <a:spcAft>
+                          <a:spcPts val="0"/>
+                        </a:spcAft>
+                      </a:pPr>
+                      <a:r>
+                        <a:rPr lang="en-US" sz="1400" b="1" dirty="0">
+                          <a:effectLst/>
+                          <a:latin typeface="Times New Roman" panose="02020603050405020304" pitchFamily="18" charset="0"/>
+                          <a:cs typeface="Times New Roman" panose="02020603050405020304" pitchFamily="18" charset="0"/>
+                        </a:rPr>
+                        <a:t>Jan 31</a:t>
+                      </a:r>
+                      <a:r>
+                        <a:rPr lang="en-US" sz="1400" b="1" baseline="30000" dirty="0">
+                          <a:effectLst/>
+                          <a:latin typeface="Times New Roman" panose="02020603050405020304" pitchFamily="18" charset="0"/>
+                          <a:cs typeface="Times New Roman" panose="02020603050405020304" pitchFamily="18" charset="0"/>
+                        </a:rPr>
+                        <a:t>st</a:t>
+                      </a:r>
+                      <a:r>
+                        <a:rPr lang="en-US" sz="1400" b="1" dirty="0">
+                          <a:effectLst/>
+                          <a:latin typeface="Times New Roman" panose="02020603050405020304" pitchFamily="18" charset="0"/>
+                          <a:cs typeface="Times New Roman" panose="02020603050405020304" pitchFamily="18" charset="0"/>
+                        </a:rPr>
+                        <a:t> </a:t>
+                      </a:r>
+                      <a:endParaRPr lang="en-US" sz="1400" b="1" dirty="0">
+                        <a:solidFill>
+                          <a:srgbClr val="000000"/>
+                        </a:solidFill>
+                        <a:effectLst/>
+                        <a:latin typeface="Times New Roman" panose="02020603050405020304" pitchFamily="18" charset="0"/>
+                        <a:ea typeface="Calibri" panose="020F0502020204030204" pitchFamily="34" charset="0"/>
+                        <a:cs typeface="Times New Roman" panose="02020603050405020304" pitchFamily="18" charset="0"/>
+                      </a:endParaRPr>
+                    </a:p>
+                  </a:txBody>
+                  <a:tcPr marL="53270" marR="53270" marT="0" marB="0"/>
+                </a:tc>
+                <a:tc>
+                  <a:txBody>
+                    <a:bodyPr/>
+                    <a:lstStyle/>
+                    <a:p>
+                      <a:pPr marL="90170" marR="0">
+                        <a:spcBef>
+                          <a:spcPts val="0"/>
+                        </a:spcBef>
+                        <a:spcAft>
+                          <a:spcPts val="0"/>
+                        </a:spcAft>
+                      </a:pPr>
+                      <a:r>
+                        <a:rPr lang="en-US" sz="1400" dirty="0">
+                          <a:effectLst/>
+                          <a:latin typeface="Times New Roman" panose="02020603050405020304" pitchFamily="18" charset="0"/>
+                          <a:cs typeface="Times New Roman" panose="02020603050405020304" pitchFamily="18" charset="0"/>
+                        </a:rPr>
+                        <a:t>Python for total beginners</a:t>
+                      </a:r>
+                      <a:endParaRPr lang="en-US" sz="1400" dirty="0">
+                        <a:solidFill>
+                          <a:srgbClr val="000000"/>
+                        </a:solidFill>
+                        <a:effectLst/>
+                        <a:latin typeface="Times New Roman" panose="02020603050405020304" pitchFamily="18" charset="0"/>
+                        <a:ea typeface="Calibri" panose="020F0502020204030204" pitchFamily="34" charset="0"/>
+                        <a:cs typeface="Times New Roman" panose="02020603050405020304" pitchFamily="18" charset="0"/>
+                      </a:endParaRPr>
+                    </a:p>
+                  </a:txBody>
+                  <a:tcPr marL="53270" marR="53270" marT="0" marB="0" anchor="ctr"/>
+                </a:tc>
+                <a:tc>
+                  <a:txBody>
+                    <a:bodyPr/>
+                    <a:lstStyle/>
+                    <a:p>
+                      <a:pPr marL="90170" marR="0" algn="ctr">
+                        <a:spcBef>
+                          <a:spcPts val="0"/>
+                        </a:spcBef>
+                        <a:spcAft>
+                          <a:spcPts val="0"/>
+                        </a:spcAft>
+                      </a:pPr>
+                      <a:r>
+                        <a:rPr lang="en-US" sz="1400" dirty="0">
+                          <a:effectLst/>
+                          <a:latin typeface="Times New Roman" panose="02020603050405020304" pitchFamily="18" charset="0"/>
+                          <a:cs typeface="Times New Roman" panose="02020603050405020304" pitchFamily="18" charset="0"/>
+                        </a:rPr>
+                        <a:t>Assignment 2</a:t>
+                      </a:r>
+                      <a:endParaRPr lang="en-US" sz="1400" dirty="0">
+                        <a:solidFill>
+                          <a:srgbClr val="000000"/>
+                        </a:solidFill>
+                        <a:effectLst/>
+                        <a:latin typeface="Times New Roman" panose="02020603050405020304" pitchFamily="18" charset="0"/>
+                        <a:ea typeface="Calibri" panose="020F0502020204030204" pitchFamily="34" charset="0"/>
+                        <a:cs typeface="Times New Roman" panose="02020603050405020304" pitchFamily="18" charset="0"/>
+                      </a:endParaRPr>
+                    </a:p>
+                  </a:txBody>
+                  <a:tcPr marL="53270" marR="53270" marT="0" marB="0" anchor="ctr"/>
+                </a:tc>
+                <a:extLst>
+                  <a:ext uri="{0D108BD9-81ED-4DB2-BD59-A6C34878D82A}">
+                    <a16:rowId xmlns:a16="http://schemas.microsoft.com/office/drawing/2014/main" val="3329571202"/>
+                  </a:ext>
+                </a:extLst>
+              </a:tr>
+              <a:tr h="428625">
+                <a:tc>
+                  <a:txBody>
+                    <a:bodyPr/>
+                    <a:lstStyle/>
+                    <a:p>
+                      <a:pPr marL="90170" marR="0" algn="ctr">
+                        <a:spcBef>
+                          <a:spcPts val="0"/>
+                        </a:spcBef>
+                        <a:spcAft>
+                          <a:spcPts val="0"/>
+                        </a:spcAft>
+                      </a:pPr>
+                      <a:r>
+                        <a:rPr lang="en-US" sz="1400" b="1" dirty="0">
+                          <a:effectLst/>
+                          <a:latin typeface="Times New Roman" panose="02020603050405020304" pitchFamily="18" charset="0"/>
+                          <a:cs typeface="Times New Roman" panose="02020603050405020304" pitchFamily="18" charset="0"/>
+                        </a:rPr>
+                        <a:t>Week 3: </a:t>
+                      </a:r>
+                    </a:p>
+                    <a:p>
+                      <a:pPr marL="90170" marR="0" algn="ctr">
+                        <a:spcBef>
+                          <a:spcPts val="0"/>
+                        </a:spcBef>
+                        <a:spcAft>
+                          <a:spcPts val="0"/>
+                        </a:spcAft>
+                      </a:pPr>
+                      <a:r>
+                        <a:rPr lang="en-US" sz="1400" b="1" dirty="0">
+                          <a:effectLst/>
+                          <a:latin typeface="Times New Roman" panose="02020603050405020304" pitchFamily="18" charset="0"/>
+                          <a:cs typeface="Times New Roman" panose="02020603050405020304" pitchFamily="18" charset="0"/>
+                        </a:rPr>
+                        <a:t>Feb 7</a:t>
+                      </a:r>
+                      <a:r>
+                        <a:rPr lang="en-US" sz="1400" b="1" baseline="30000" dirty="0">
+                          <a:effectLst/>
+                          <a:latin typeface="Times New Roman" panose="02020603050405020304" pitchFamily="18" charset="0"/>
+                          <a:cs typeface="Times New Roman" panose="02020603050405020304" pitchFamily="18" charset="0"/>
+                        </a:rPr>
+                        <a:t>th</a:t>
+                      </a:r>
+                      <a:endParaRPr lang="en-US" sz="1400" b="1" dirty="0">
+                        <a:solidFill>
+                          <a:srgbClr val="000000"/>
+                        </a:solidFill>
+                        <a:effectLst/>
+                        <a:latin typeface="Times New Roman" panose="02020603050405020304" pitchFamily="18" charset="0"/>
+                        <a:ea typeface="Calibri" panose="020F0502020204030204" pitchFamily="34" charset="0"/>
+                        <a:cs typeface="Times New Roman" panose="02020603050405020304" pitchFamily="18" charset="0"/>
+                      </a:endParaRPr>
+                    </a:p>
+                  </a:txBody>
+                  <a:tcPr marL="53270" marR="53270" marT="0" marB="0"/>
+                </a:tc>
+                <a:tc>
+                  <a:txBody>
+                    <a:bodyPr/>
+                    <a:lstStyle/>
+                    <a:p>
+                      <a:pPr marL="90170" marR="0">
+                        <a:spcBef>
+                          <a:spcPts val="0"/>
+                        </a:spcBef>
+                        <a:spcAft>
+                          <a:spcPts val="0"/>
+                        </a:spcAft>
+                      </a:pPr>
+                      <a:r>
+                        <a:rPr lang="en-US" sz="1400" dirty="0">
+                          <a:effectLst/>
+                          <a:latin typeface="Times New Roman" panose="02020603050405020304" pitchFamily="18" charset="0"/>
+                          <a:cs typeface="Times New Roman" panose="02020603050405020304" pitchFamily="18" charset="0"/>
+                        </a:rPr>
+                        <a:t>Obtaining satellite imagery</a:t>
+                      </a:r>
+                    </a:p>
+                    <a:p>
+                      <a:pPr marL="90170" marR="0">
+                        <a:spcBef>
+                          <a:spcPts val="0"/>
+                        </a:spcBef>
+                        <a:spcAft>
+                          <a:spcPts val="0"/>
+                        </a:spcAft>
+                      </a:pPr>
+                      <a:r>
+                        <a:rPr lang="en-US" sz="1400" dirty="0">
+                          <a:effectLst/>
+                          <a:latin typeface="Times New Roman" panose="02020603050405020304" pitchFamily="18" charset="0"/>
+                          <a:cs typeface="Times New Roman" panose="02020603050405020304" pitchFamily="18" charset="0"/>
+                        </a:rPr>
+                        <a:t>(Including API scripting)</a:t>
+                      </a:r>
+                      <a:endParaRPr lang="en-US" sz="1400" dirty="0">
+                        <a:solidFill>
+                          <a:srgbClr val="000000"/>
+                        </a:solidFill>
+                        <a:effectLst/>
+                        <a:latin typeface="Times New Roman" panose="02020603050405020304" pitchFamily="18" charset="0"/>
+                        <a:ea typeface="Calibri" panose="020F0502020204030204" pitchFamily="34" charset="0"/>
+                        <a:cs typeface="Times New Roman" panose="02020603050405020304" pitchFamily="18" charset="0"/>
+                      </a:endParaRPr>
+                    </a:p>
+                  </a:txBody>
+                  <a:tcPr marL="53270" marR="53270" marT="0" marB="0" anchor="ctr"/>
+                </a:tc>
+                <a:tc>
+                  <a:txBody>
+                    <a:bodyPr/>
+                    <a:lstStyle/>
+                    <a:p>
+                      <a:pPr marL="90170" marR="0" algn="ctr">
+                        <a:spcBef>
+                          <a:spcPts val="0"/>
+                        </a:spcBef>
+                        <a:spcAft>
+                          <a:spcPts val="0"/>
+                        </a:spcAft>
+                      </a:pPr>
+                      <a:r>
+                        <a:rPr lang="en-US" sz="1400" dirty="0">
+                          <a:solidFill>
+                            <a:srgbClr val="000000"/>
+                          </a:solidFill>
+                          <a:effectLst/>
+                          <a:latin typeface="Times New Roman" panose="02020603050405020304" pitchFamily="18" charset="0"/>
+                          <a:ea typeface="Calibri" panose="020F0502020204030204" pitchFamily="34" charset="0"/>
+                          <a:cs typeface="Times New Roman" panose="02020603050405020304" pitchFamily="18" charset="0"/>
+                        </a:rPr>
+                        <a:t>-</a:t>
+                      </a:r>
+                    </a:p>
+                  </a:txBody>
+                  <a:tcPr marL="53270" marR="53270" marT="0" marB="0" anchor="ctr"/>
+                </a:tc>
+                <a:extLst>
+                  <a:ext uri="{0D108BD9-81ED-4DB2-BD59-A6C34878D82A}">
+                    <a16:rowId xmlns:a16="http://schemas.microsoft.com/office/drawing/2014/main" val="3287750248"/>
+                  </a:ext>
+                </a:extLst>
+              </a:tr>
+              <a:tr h="428625">
+                <a:tc>
+                  <a:txBody>
+                    <a:bodyPr/>
+                    <a:lstStyle/>
+                    <a:p>
+                      <a:pPr marL="90170" marR="0" algn="ctr">
+                        <a:spcBef>
+                          <a:spcPts val="0"/>
+                        </a:spcBef>
+                        <a:spcAft>
+                          <a:spcPts val="0"/>
+                        </a:spcAft>
+                      </a:pPr>
+                      <a:r>
+                        <a:rPr lang="en-US" sz="1400" b="1" dirty="0">
+                          <a:effectLst/>
+                          <a:latin typeface="Times New Roman" panose="02020603050405020304" pitchFamily="18" charset="0"/>
+                          <a:cs typeface="Times New Roman" panose="02020603050405020304" pitchFamily="18" charset="0"/>
+                        </a:rPr>
+                        <a:t>Week 4:</a:t>
+                      </a:r>
+                    </a:p>
+                    <a:p>
+                      <a:pPr marL="90170" marR="0" algn="ctr">
+                        <a:spcBef>
+                          <a:spcPts val="0"/>
+                        </a:spcBef>
+                        <a:spcAft>
+                          <a:spcPts val="0"/>
+                        </a:spcAft>
+                      </a:pPr>
+                      <a:r>
+                        <a:rPr lang="en-US" sz="1400" b="1" dirty="0">
+                          <a:solidFill>
+                            <a:srgbClr val="000000"/>
+                          </a:solidFill>
+                          <a:effectLst/>
+                          <a:latin typeface="Times New Roman" panose="02020603050405020304" pitchFamily="18" charset="0"/>
+                          <a:ea typeface="Calibri" panose="020F0502020204030204" pitchFamily="34" charset="0"/>
+                          <a:cs typeface="Times New Roman" panose="02020603050405020304" pitchFamily="18" charset="0"/>
+                        </a:rPr>
+                        <a:t>Feb 14</a:t>
+                      </a:r>
+                      <a:r>
+                        <a:rPr lang="en-US" sz="1400" b="1" baseline="30000" dirty="0">
+                          <a:solidFill>
+                            <a:srgbClr val="000000"/>
+                          </a:solidFill>
+                          <a:effectLst/>
+                          <a:latin typeface="Times New Roman" panose="02020603050405020304" pitchFamily="18" charset="0"/>
+                          <a:ea typeface="Calibri" panose="020F0502020204030204" pitchFamily="34" charset="0"/>
+                          <a:cs typeface="Times New Roman" panose="02020603050405020304" pitchFamily="18" charset="0"/>
+                        </a:rPr>
+                        <a:t>th</a:t>
+                      </a:r>
+                      <a:r>
+                        <a:rPr lang="en-US" sz="1400" b="1" dirty="0">
+                          <a:solidFill>
+                            <a:srgbClr val="000000"/>
+                          </a:solidFill>
+                          <a:effectLst/>
+                          <a:latin typeface="Times New Roman" panose="02020603050405020304" pitchFamily="18" charset="0"/>
+                          <a:ea typeface="Calibri" panose="020F0502020204030204" pitchFamily="34" charset="0"/>
+                          <a:cs typeface="Times New Roman" panose="02020603050405020304" pitchFamily="18" charset="0"/>
+                        </a:rPr>
+                        <a:t> </a:t>
+                      </a:r>
+                    </a:p>
+                  </a:txBody>
+                  <a:tcPr marL="53270" marR="53270" marT="0" marB="0"/>
+                </a:tc>
+                <a:tc>
+                  <a:txBody>
+                    <a:bodyPr/>
+                    <a:lstStyle/>
+                    <a:p>
+                      <a:pPr marL="90170" marR="0">
+                        <a:spcBef>
+                          <a:spcPts val="0"/>
+                        </a:spcBef>
+                        <a:spcAft>
+                          <a:spcPts val="0"/>
+                        </a:spcAft>
+                      </a:pPr>
+                      <a:r>
+                        <a:rPr lang="en-US" sz="1400" dirty="0">
+                          <a:solidFill>
+                            <a:srgbClr val="000000"/>
+                          </a:solidFill>
+                          <a:effectLst/>
+                          <a:latin typeface="Times New Roman" panose="02020603050405020304" pitchFamily="18" charset="0"/>
+                          <a:ea typeface="Calibri" panose="020F0502020204030204" pitchFamily="34" charset="0"/>
+                          <a:cs typeface="Times New Roman" panose="02020603050405020304" pitchFamily="18" charset="0"/>
+                        </a:rPr>
+                        <a:t>Introduction to reading and writing multiband images. Image metadata. Compression. </a:t>
+                      </a:r>
+                    </a:p>
+                    <a:p>
+                      <a:pPr marL="90170" marR="0">
+                        <a:spcBef>
+                          <a:spcPts val="0"/>
+                        </a:spcBef>
+                        <a:spcAft>
+                          <a:spcPts val="0"/>
+                        </a:spcAft>
+                      </a:pPr>
+                      <a:r>
+                        <a:rPr lang="en-US" sz="1400" dirty="0">
+                          <a:solidFill>
+                            <a:srgbClr val="000000"/>
+                          </a:solidFill>
+                          <a:effectLst/>
+                          <a:latin typeface="Times New Roman" panose="02020603050405020304" pitchFamily="18" charset="0"/>
+                          <a:ea typeface="Calibri" panose="020F0502020204030204" pitchFamily="34" charset="0"/>
+                          <a:cs typeface="Times New Roman" panose="02020603050405020304" pitchFamily="18" charset="0"/>
+                        </a:rPr>
+                        <a:t>(via </a:t>
+                      </a:r>
+                      <a:r>
+                        <a:rPr lang="en-US" sz="1400" dirty="0" err="1">
+                          <a:solidFill>
+                            <a:srgbClr val="000000"/>
+                          </a:solidFill>
+                          <a:effectLst/>
+                          <a:latin typeface="Times New Roman" panose="02020603050405020304" pitchFamily="18" charset="0"/>
+                          <a:ea typeface="Calibri" panose="020F0502020204030204" pitchFamily="34" charset="0"/>
+                          <a:cs typeface="Times New Roman" panose="02020603050405020304" pitchFamily="18" charset="0"/>
+                        </a:rPr>
+                        <a:t>numpy</a:t>
+                      </a:r>
+                      <a:r>
+                        <a:rPr lang="en-US" sz="1400" dirty="0">
+                          <a:solidFill>
+                            <a:srgbClr val="000000"/>
+                          </a:solidFill>
+                          <a:effectLst/>
+                          <a:latin typeface="Times New Roman" panose="02020603050405020304" pitchFamily="18" charset="0"/>
+                          <a:ea typeface="Calibri" panose="020F0502020204030204" pitchFamily="34" charset="0"/>
+                          <a:cs typeface="Times New Roman" panose="02020603050405020304" pitchFamily="18" charset="0"/>
+                        </a:rPr>
+                        <a:t>, </a:t>
+                      </a:r>
+                      <a:r>
+                        <a:rPr lang="en-US" sz="1400" dirty="0" err="1">
+                          <a:solidFill>
+                            <a:srgbClr val="000000"/>
+                          </a:solidFill>
+                          <a:effectLst/>
+                          <a:latin typeface="Times New Roman" panose="02020603050405020304" pitchFamily="18" charset="0"/>
+                          <a:ea typeface="Calibri" panose="020F0502020204030204" pitchFamily="34" charset="0"/>
+                          <a:cs typeface="Times New Roman" panose="02020603050405020304" pitchFamily="18" charset="0"/>
+                        </a:rPr>
+                        <a:t>rasterio</a:t>
+                      </a:r>
+                      <a:r>
+                        <a:rPr lang="en-US" sz="1400" dirty="0">
+                          <a:solidFill>
+                            <a:srgbClr val="000000"/>
+                          </a:solidFill>
+                          <a:effectLst/>
+                          <a:latin typeface="Times New Roman" panose="02020603050405020304" pitchFamily="18" charset="0"/>
+                          <a:ea typeface="Calibri" panose="020F0502020204030204" pitchFamily="34" charset="0"/>
+                          <a:cs typeface="Times New Roman" panose="02020603050405020304" pitchFamily="18" charset="0"/>
+                        </a:rPr>
+                        <a:t> and </a:t>
+                      </a:r>
+                      <a:r>
+                        <a:rPr lang="en-US" sz="1400" dirty="0" err="1">
+                          <a:solidFill>
+                            <a:srgbClr val="000000"/>
+                          </a:solidFill>
+                          <a:effectLst/>
+                          <a:latin typeface="Times New Roman" panose="02020603050405020304" pitchFamily="18" charset="0"/>
+                          <a:ea typeface="Calibri" panose="020F0502020204030204" pitchFamily="34" charset="0"/>
+                          <a:cs typeface="Times New Roman" panose="02020603050405020304" pitchFamily="18" charset="0"/>
+                        </a:rPr>
+                        <a:t>geopandas</a:t>
+                      </a:r>
+                      <a:r>
+                        <a:rPr lang="en-US" sz="1400" dirty="0">
+                          <a:solidFill>
+                            <a:srgbClr val="000000"/>
+                          </a:solidFill>
+                          <a:effectLst/>
+                          <a:latin typeface="Times New Roman" panose="02020603050405020304" pitchFamily="18" charset="0"/>
+                          <a:ea typeface="Calibri" panose="020F0502020204030204" pitchFamily="34" charset="0"/>
+                          <a:cs typeface="Times New Roman" panose="02020603050405020304" pitchFamily="18" charset="0"/>
+                        </a:rPr>
+                        <a:t>)</a:t>
+                      </a:r>
+                    </a:p>
+                  </a:txBody>
+                  <a:tcPr marL="53270" marR="53270" marT="0" marB="0" anchor="ctr"/>
+                </a:tc>
+                <a:tc>
+                  <a:txBody>
+                    <a:bodyPr/>
+                    <a:lstStyle/>
+                    <a:p>
+                      <a:pPr marL="90170" marR="0" algn="ctr">
+                        <a:spcBef>
+                          <a:spcPts val="0"/>
+                        </a:spcBef>
+                        <a:spcAft>
+                          <a:spcPts val="0"/>
+                        </a:spcAft>
+                      </a:pPr>
+                      <a:r>
+                        <a:rPr lang="en-US" sz="1400" dirty="0">
+                          <a:effectLst/>
+                          <a:latin typeface="Times New Roman" panose="02020603050405020304" pitchFamily="18" charset="0"/>
+                          <a:cs typeface="Times New Roman" panose="02020603050405020304" pitchFamily="18" charset="0"/>
+                        </a:rPr>
+                        <a:t>Assignment 3</a:t>
+                      </a:r>
+                      <a:endParaRPr lang="en-US" sz="1400" dirty="0">
+                        <a:solidFill>
+                          <a:srgbClr val="000000"/>
+                        </a:solidFill>
+                        <a:effectLst/>
+                        <a:latin typeface="Times New Roman" panose="02020603050405020304" pitchFamily="18" charset="0"/>
+                        <a:ea typeface="Calibri" panose="020F0502020204030204" pitchFamily="34" charset="0"/>
+                        <a:cs typeface="Times New Roman" panose="02020603050405020304" pitchFamily="18" charset="0"/>
+                      </a:endParaRPr>
+                    </a:p>
+                  </a:txBody>
+                  <a:tcPr marL="53270" marR="53270" marT="0" marB="0" anchor="ctr"/>
+                </a:tc>
+                <a:extLst>
+                  <a:ext uri="{0D108BD9-81ED-4DB2-BD59-A6C34878D82A}">
+                    <a16:rowId xmlns:a16="http://schemas.microsoft.com/office/drawing/2014/main" val="2824917692"/>
+                  </a:ext>
+                </a:extLst>
+              </a:tr>
+              <a:tr h="428625">
+                <a:tc>
+                  <a:txBody>
+                    <a:bodyPr/>
+                    <a:lstStyle/>
+                    <a:p>
+                      <a:pPr marL="90170" marR="0" algn="ctr">
+                        <a:spcBef>
+                          <a:spcPts val="0"/>
+                        </a:spcBef>
+                        <a:spcAft>
+                          <a:spcPts val="0"/>
+                        </a:spcAft>
+                      </a:pPr>
+                      <a:r>
+                        <a:rPr lang="en-US" sz="1400" b="1" dirty="0">
+                          <a:effectLst/>
+                          <a:latin typeface="Times New Roman" panose="02020603050405020304" pitchFamily="18" charset="0"/>
+                          <a:cs typeface="Times New Roman" panose="02020603050405020304" pitchFamily="18" charset="0"/>
+                        </a:rPr>
+                        <a:t>Week 5: </a:t>
+                      </a:r>
+                    </a:p>
+                    <a:p>
+                      <a:pPr marL="90170" marR="0" algn="ctr">
+                        <a:spcBef>
+                          <a:spcPts val="0"/>
+                        </a:spcBef>
+                        <a:spcAft>
+                          <a:spcPts val="0"/>
+                        </a:spcAft>
+                      </a:pPr>
+                      <a:r>
+                        <a:rPr lang="en-US" sz="1400" b="1" dirty="0">
+                          <a:effectLst/>
+                          <a:latin typeface="Times New Roman" panose="02020603050405020304" pitchFamily="18" charset="0"/>
+                          <a:cs typeface="Times New Roman" panose="02020603050405020304" pitchFamily="18" charset="0"/>
+                        </a:rPr>
+                        <a:t>Feb 21</a:t>
+                      </a:r>
+                      <a:r>
+                        <a:rPr lang="en-US" sz="1400" b="1" baseline="30000" dirty="0">
+                          <a:effectLst/>
+                          <a:latin typeface="Times New Roman" panose="02020603050405020304" pitchFamily="18" charset="0"/>
+                          <a:cs typeface="Times New Roman" panose="02020603050405020304" pitchFamily="18" charset="0"/>
+                        </a:rPr>
+                        <a:t>st</a:t>
+                      </a:r>
+                      <a:r>
+                        <a:rPr lang="en-US" sz="1400" b="1" dirty="0">
+                          <a:effectLst/>
+                          <a:latin typeface="Times New Roman" panose="02020603050405020304" pitchFamily="18" charset="0"/>
+                          <a:cs typeface="Times New Roman" panose="02020603050405020304" pitchFamily="18" charset="0"/>
+                        </a:rPr>
+                        <a:t>   </a:t>
+                      </a:r>
+                      <a:endParaRPr lang="en-US" sz="1400" b="1" dirty="0">
+                        <a:solidFill>
+                          <a:srgbClr val="000000"/>
+                        </a:solidFill>
+                        <a:effectLst/>
+                        <a:latin typeface="Times New Roman" panose="02020603050405020304" pitchFamily="18" charset="0"/>
+                        <a:ea typeface="Calibri" panose="020F0502020204030204" pitchFamily="34" charset="0"/>
+                        <a:cs typeface="Times New Roman" panose="02020603050405020304" pitchFamily="18" charset="0"/>
+                      </a:endParaRPr>
+                    </a:p>
+                  </a:txBody>
+                  <a:tcPr marL="53270" marR="53270" marT="0" marB="0"/>
+                </a:tc>
+                <a:tc>
+                  <a:txBody>
+                    <a:bodyPr/>
+                    <a:lstStyle/>
+                    <a:p>
+                      <a:pPr marL="90170" marR="0">
+                        <a:spcBef>
+                          <a:spcPts val="0"/>
+                        </a:spcBef>
+                        <a:spcAft>
+                          <a:spcPts val="0"/>
+                        </a:spcAft>
+                      </a:pPr>
+                      <a:r>
+                        <a:rPr lang="en-US" sz="1400" dirty="0">
+                          <a:effectLst/>
+                          <a:latin typeface="Times New Roman" panose="02020603050405020304" pitchFamily="18" charset="0"/>
+                          <a:cs typeface="Times New Roman" panose="02020603050405020304" pitchFamily="18" charset="0"/>
+                        </a:rPr>
+                        <a:t>Introduction to the OpenCV  </a:t>
+                      </a:r>
+                    </a:p>
+                    <a:p>
+                      <a:pPr marL="90170" marR="0">
+                        <a:spcBef>
+                          <a:spcPts val="0"/>
+                        </a:spcBef>
+                        <a:spcAft>
+                          <a:spcPts val="0"/>
+                        </a:spcAft>
+                      </a:pPr>
+                      <a:r>
+                        <a:rPr lang="en-US" sz="1400" dirty="0">
+                          <a:effectLst/>
+                          <a:latin typeface="Times New Roman" panose="02020603050405020304" pitchFamily="18" charset="0"/>
+                          <a:cs typeface="Times New Roman" panose="02020603050405020304" pitchFamily="18" charset="0"/>
+                        </a:rPr>
+                        <a:t>(Reading, writing, basic core operations etc.)</a:t>
+                      </a:r>
+                      <a:endParaRPr lang="en-US" sz="1400" dirty="0">
+                        <a:solidFill>
+                          <a:srgbClr val="000000"/>
+                        </a:solidFill>
+                        <a:effectLst/>
+                        <a:latin typeface="Times New Roman" panose="02020603050405020304" pitchFamily="18" charset="0"/>
+                        <a:ea typeface="Calibri" panose="020F0502020204030204" pitchFamily="34" charset="0"/>
+                        <a:cs typeface="Times New Roman" panose="02020603050405020304" pitchFamily="18" charset="0"/>
+                      </a:endParaRPr>
+                    </a:p>
+                  </a:txBody>
+                  <a:tcPr marL="53270" marR="53270" marT="0" marB="0" anchor="ctr"/>
+                </a:tc>
+                <a:tc>
+                  <a:txBody>
+                    <a:bodyPr/>
+                    <a:lstStyle/>
+                    <a:p>
+                      <a:pPr marL="90170" marR="0" algn="ctr">
+                        <a:spcBef>
+                          <a:spcPts val="0"/>
+                        </a:spcBef>
+                        <a:spcAft>
+                          <a:spcPts val="0"/>
+                        </a:spcAft>
+                      </a:pPr>
+                      <a:r>
+                        <a:rPr lang="en-US" sz="1400" dirty="0">
+                          <a:effectLst/>
+                          <a:latin typeface="Times New Roman" panose="02020603050405020304" pitchFamily="18" charset="0"/>
+                          <a:cs typeface="Times New Roman" panose="02020603050405020304" pitchFamily="18" charset="0"/>
+                        </a:rPr>
+                        <a:t>Assignment 4</a:t>
+                      </a:r>
+                      <a:endParaRPr lang="en-US" sz="1400" dirty="0">
+                        <a:solidFill>
+                          <a:srgbClr val="000000"/>
+                        </a:solidFill>
+                        <a:effectLst/>
+                        <a:latin typeface="Times New Roman" panose="02020603050405020304" pitchFamily="18" charset="0"/>
+                        <a:ea typeface="Calibri" panose="020F0502020204030204" pitchFamily="34" charset="0"/>
+                        <a:cs typeface="Times New Roman" panose="02020603050405020304" pitchFamily="18" charset="0"/>
+                      </a:endParaRPr>
+                    </a:p>
+                  </a:txBody>
+                  <a:tcPr marL="53270" marR="53270" marT="0" marB="0" anchor="ctr"/>
+                </a:tc>
+                <a:extLst>
+                  <a:ext uri="{0D108BD9-81ED-4DB2-BD59-A6C34878D82A}">
+                    <a16:rowId xmlns:a16="http://schemas.microsoft.com/office/drawing/2014/main" val="2485139219"/>
+                  </a:ext>
+                </a:extLst>
+              </a:tr>
+              <a:tr h="428625">
+                <a:tc>
+                  <a:txBody>
+                    <a:bodyPr/>
+                    <a:lstStyle/>
+                    <a:p>
+                      <a:pPr marL="90170" marR="0" algn="ctr">
+                        <a:spcBef>
+                          <a:spcPts val="0"/>
+                        </a:spcBef>
+                        <a:spcAft>
+                          <a:spcPts val="0"/>
+                        </a:spcAft>
+                      </a:pPr>
+                      <a:r>
+                        <a:rPr lang="en-US" sz="1400" b="1" dirty="0">
+                          <a:effectLst/>
+                          <a:latin typeface="Times New Roman" panose="02020603050405020304" pitchFamily="18" charset="0"/>
+                          <a:cs typeface="Times New Roman" panose="02020603050405020304" pitchFamily="18" charset="0"/>
+                        </a:rPr>
+                        <a:t>Week 6:</a:t>
+                      </a:r>
+                    </a:p>
+                    <a:p>
+                      <a:pPr marL="90170" marR="0" algn="ctr">
+                        <a:spcBef>
+                          <a:spcPts val="0"/>
+                        </a:spcBef>
+                        <a:spcAft>
+                          <a:spcPts val="0"/>
+                        </a:spcAft>
+                      </a:pPr>
+                      <a:r>
+                        <a:rPr lang="en-US" sz="1400" b="1" dirty="0">
+                          <a:effectLst/>
+                          <a:latin typeface="Times New Roman" panose="02020603050405020304" pitchFamily="18" charset="0"/>
+                          <a:cs typeface="Times New Roman" panose="02020603050405020304" pitchFamily="18" charset="0"/>
+                        </a:rPr>
+                        <a:t>Feb 28</a:t>
+                      </a:r>
+                      <a:r>
+                        <a:rPr lang="en-US" sz="1400" b="1" baseline="30000" dirty="0">
+                          <a:effectLst/>
+                          <a:latin typeface="Times New Roman" panose="02020603050405020304" pitchFamily="18" charset="0"/>
+                          <a:cs typeface="Times New Roman" panose="02020603050405020304" pitchFamily="18" charset="0"/>
+                        </a:rPr>
+                        <a:t>th</a:t>
+                      </a:r>
+                      <a:r>
+                        <a:rPr lang="en-US" sz="1400" b="1" dirty="0">
+                          <a:effectLst/>
+                          <a:latin typeface="Times New Roman" panose="02020603050405020304" pitchFamily="18" charset="0"/>
+                          <a:cs typeface="Times New Roman" panose="02020603050405020304" pitchFamily="18" charset="0"/>
+                        </a:rPr>
+                        <a:t> </a:t>
+                      </a:r>
+                      <a:endParaRPr lang="en-US" sz="1400" b="1" dirty="0">
+                        <a:solidFill>
+                          <a:srgbClr val="000000"/>
+                        </a:solidFill>
+                        <a:effectLst/>
+                        <a:latin typeface="Times New Roman" panose="02020603050405020304" pitchFamily="18" charset="0"/>
+                        <a:ea typeface="Calibri" panose="020F0502020204030204" pitchFamily="34" charset="0"/>
+                        <a:cs typeface="Times New Roman" panose="02020603050405020304" pitchFamily="18" charset="0"/>
+                      </a:endParaRPr>
+                    </a:p>
+                  </a:txBody>
+                  <a:tcPr marL="53270" marR="53270" marT="0" marB="0"/>
+                </a:tc>
+                <a:tc>
+                  <a:txBody>
+                    <a:bodyPr/>
+                    <a:lstStyle/>
+                    <a:p>
+                      <a:pPr marL="90170" marR="0">
+                        <a:spcBef>
+                          <a:spcPts val="0"/>
+                        </a:spcBef>
+                        <a:spcAft>
+                          <a:spcPts val="0"/>
+                        </a:spcAft>
+                      </a:pPr>
+                      <a:r>
+                        <a:rPr lang="en-US" sz="1400" dirty="0">
+                          <a:effectLst/>
+                          <a:latin typeface="Times New Roman" panose="02020603050405020304" pitchFamily="18" charset="0"/>
+                          <a:cs typeface="Times New Roman" panose="02020603050405020304" pitchFamily="18" charset="0"/>
+                        </a:rPr>
+                        <a:t>Image processing in OpenCV</a:t>
+                      </a:r>
+                    </a:p>
+                    <a:p>
+                      <a:pPr marL="90170" marR="0">
+                        <a:spcBef>
+                          <a:spcPts val="0"/>
+                        </a:spcBef>
+                        <a:spcAft>
+                          <a:spcPts val="0"/>
+                        </a:spcAft>
+                      </a:pPr>
+                      <a:r>
+                        <a:rPr lang="en-US" sz="1400" dirty="0">
+                          <a:effectLst/>
+                          <a:latin typeface="Times New Roman" panose="02020603050405020304" pitchFamily="18" charset="0"/>
+                          <a:cs typeface="Times New Roman" panose="02020603050405020304" pitchFamily="18" charset="0"/>
+                        </a:rPr>
+                        <a:t>(</a:t>
+                      </a:r>
+                      <a:r>
+                        <a:rPr lang="en-US" sz="1400" dirty="0" err="1">
+                          <a:effectLst/>
+                          <a:latin typeface="Times New Roman" panose="02020603050405020304" pitchFamily="18" charset="0"/>
+                          <a:cs typeface="Times New Roman" panose="02020603050405020304" pitchFamily="18" charset="0"/>
+                        </a:rPr>
+                        <a:t>Colorspaces</a:t>
+                      </a:r>
+                      <a:r>
+                        <a:rPr lang="en-US" sz="1400" dirty="0">
+                          <a:effectLst/>
+                          <a:latin typeface="Times New Roman" panose="02020603050405020304" pitchFamily="18" charset="0"/>
+                          <a:cs typeface="Times New Roman" panose="02020603050405020304" pitchFamily="18" charset="0"/>
+                        </a:rPr>
+                        <a:t>, transformations, histograms etc.)</a:t>
+                      </a:r>
+                      <a:endParaRPr lang="en-US" sz="1400" dirty="0">
+                        <a:solidFill>
+                          <a:srgbClr val="000000"/>
+                        </a:solidFill>
+                        <a:effectLst/>
+                        <a:latin typeface="Times New Roman" panose="02020603050405020304" pitchFamily="18" charset="0"/>
+                        <a:ea typeface="Calibri" panose="020F0502020204030204" pitchFamily="34" charset="0"/>
+                        <a:cs typeface="Times New Roman" panose="02020603050405020304" pitchFamily="18" charset="0"/>
+                      </a:endParaRPr>
+                    </a:p>
+                  </a:txBody>
+                  <a:tcPr marL="53270" marR="53270" marT="0" marB="0" anchor="ctr"/>
+                </a:tc>
+                <a:tc>
+                  <a:txBody>
+                    <a:bodyPr/>
+                    <a:lstStyle/>
+                    <a:p>
+                      <a:pPr marL="90170" marR="0" lvl="0" indent="0" algn="ctr" defTabSz="914400" rtl="0" eaLnBrk="1" fontAlgn="auto" latinLnBrk="0" hangingPunct="1">
+                        <a:lnSpc>
+                          <a:spcPct val="100000"/>
+                        </a:lnSpc>
+                        <a:spcBef>
+                          <a:spcPts val="0"/>
+                        </a:spcBef>
+                        <a:spcAft>
+                          <a:spcPts val="0"/>
+                        </a:spcAft>
+                        <a:buClrTx/>
+                        <a:buSzTx/>
+                        <a:buFontTx/>
+                        <a:buNone/>
+                        <a:tabLst/>
+                        <a:defRPr/>
+                      </a:pPr>
+                      <a:r>
+                        <a:rPr lang="en-US" sz="1400" dirty="0">
+                          <a:effectLst/>
+                          <a:latin typeface="Times New Roman" panose="02020603050405020304" pitchFamily="18" charset="0"/>
+                          <a:cs typeface="Times New Roman" panose="02020603050405020304" pitchFamily="18" charset="0"/>
+                        </a:rPr>
+                        <a:t>Assignment 5</a:t>
+                      </a:r>
+                      <a:endParaRPr lang="en-US" sz="1400" dirty="0">
+                        <a:solidFill>
+                          <a:srgbClr val="000000"/>
+                        </a:solidFill>
+                        <a:effectLst/>
+                        <a:latin typeface="Times New Roman" panose="02020603050405020304" pitchFamily="18" charset="0"/>
+                        <a:ea typeface="Calibri" panose="020F0502020204030204" pitchFamily="34" charset="0"/>
+                        <a:cs typeface="Times New Roman" panose="02020603050405020304" pitchFamily="18" charset="0"/>
+                      </a:endParaRPr>
+                    </a:p>
+                  </a:txBody>
+                  <a:tcPr marL="53270" marR="53270" marT="0" marB="0" anchor="ctr"/>
+                </a:tc>
+                <a:extLst>
+                  <a:ext uri="{0D108BD9-81ED-4DB2-BD59-A6C34878D82A}">
+                    <a16:rowId xmlns:a16="http://schemas.microsoft.com/office/drawing/2014/main" val="3885921381"/>
+                  </a:ext>
+                </a:extLst>
+              </a:tr>
+              <a:tr h="428625">
+                <a:tc>
+                  <a:txBody>
+                    <a:bodyPr/>
+                    <a:lstStyle/>
+                    <a:p>
+                      <a:pPr marL="90170" marR="0" algn="ctr">
+                        <a:spcBef>
+                          <a:spcPts val="0"/>
+                        </a:spcBef>
+                        <a:spcAft>
+                          <a:spcPts val="0"/>
+                        </a:spcAft>
+                      </a:pPr>
+                      <a:r>
+                        <a:rPr lang="en-US" sz="1400" b="1" dirty="0">
+                          <a:effectLst/>
+                          <a:latin typeface="Times New Roman" panose="02020603050405020304" pitchFamily="18" charset="0"/>
+                          <a:cs typeface="Times New Roman" panose="02020603050405020304" pitchFamily="18" charset="0"/>
+                        </a:rPr>
+                        <a:t>Week 7:</a:t>
+                      </a:r>
+                    </a:p>
+                    <a:p>
+                      <a:pPr marL="90170" marR="0" algn="ctr">
+                        <a:spcBef>
+                          <a:spcPts val="0"/>
+                        </a:spcBef>
+                        <a:spcAft>
+                          <a:spcPts val="0"/>
+                        </a:spcAft>
+                      </a:pPr>
+                      <a:r>
+                        <a:rPr lang="en-US" sz="1400" b="1" dirty="0">
+                          <a:effectLst/>
+                          <a:latin typeface="Times New Roman" panose="02020603050405020304" pitchFamily="18" charset="0"/>
+                          <a:cs typeface="Times New Roman" panose="02020603050405020304" pitchFamily="18" charset="0"/>
+                        </a:rPr>
+                        <a:t>Mar 7</a:t>
+                      </a:r>
+                      <a:r>
+                        <a:rPr lang="en-US" sz="1400" b="1" baseline="30000" dirty="0">
+                          <a:effectLst/>
+                          <a:latin typeface="Times New Roman" panose="02020603050405020304" pitchFamily="18" charset="0"/>
+                          <a:cs typeface="Times New Roman" panose="02020603050405020304" pitchFamily="18" charset="0"/>
+                        </a:rPr>
+                        <a:t>th</a:t>
+                      </a:r>
+                      <a:endParaRPr lang="en-US" sz="1400" b="1" dirty="0">
+                        <a:solidFill>
+                          <a:srgbClr val="000000"/>
+                        </a:solidFill>
+                        <a:effectLst/>
+                        <a:latin typeface="Times New Roman" panose="02020603050405020304" pitchFamily="18" charset="0"/>
+                        <a:ea typeface="Calibri" panose="020F0502020204030204" pitchFamily="34" charset="0"/>
+                        <a:cs typeface="Times New Roman" panose="02020603050405020304" pitchFamily="18" charset="0"/>
+                      </a:endParaRPr>
+                    </a:p>
+                  </a:txBody>
+                  <a:tcPr marL="53270" marR="53270" marT="0" marB="0"/>
+                </a:tc>
+                <a:tc>
+                  <a:txBody>
+                    <a:bodyPr/>
+                    <a:lstStyle/>
+                    <a:p>
+                      <a:pPr marL="90170" marR="0">
+                        <a:spcBef>
+                          <a:spcPts val="0"/>
+                        </a:spcBef>
+                        <a:spcAft>
+                          <a:spcPts val="0"/>
+                        </a:spcAft>
+                      </a:pPr>
+                      <a:r>
+                        <a:rPr lang="en-US" sz="1400" dirty="0">
+                          <a:effectLst/>
+                          <a:latin typeface="Times New Roman" panose="02020603050405020304" pitchFamily="18" charset="0"/>
+                          <a:cs typeface="Times New Roman" panose="02020603050405020304" pitchFamily="18" charset="0"/>
+                        </a:rPr>
+                        <a:t>Feature/object detection in OpenCV</a:t>
+                      </a:r>
+                    </a:p>
+                    <a:p>
+                      <a:pPr marL="90170" marR="0">
+                        <a:spcBef>
+                          <a:spcPts val="0"/>
+                        </a:spcBef>
+                        <a:spcAft>
+                          <a:spcPts val="0"/>
+                        </a:spcAft>
+                      </a:pPr>
+                      <a:r>
+                        <a:rPr lang="en-US" sz="1400" dirty="0">
+                          <a:effectLst/>
+                          <a:latin typeface="Times New Roman" panose="02020603050405020304" pitchFamily="18" charset="0"/>
+                          <a:cs typeface="Times New Roman" panose="02020603050405020304" pitchFamily="18" charset="0"/>
+                        </a:rPr>
+                        <a:t>(Basic feature detection examples and extraction)</a:t>
+                      </a:r>
+                      <a:endParaRPr lang="en-US" sz="1400" dirty="0">
+                        <a:solidFill>
+                          <a:srgbClr val="000000"/>
+                        </a:solidFill>
+                        <a:effectLst/>
+                        <a:latin typeface="Times New Roman" panose="02020603050405020304" pitchFamily="18" charset="0"/>
+                        <a:ea typeface="Calibri" panose="020F0502020204030204" pitchFamily="34" charset="0"/>
+                        <a:cs typeface="Times New Roman" panose="02020603050405020304" pitchFamily="18" charset="0"/>
+                      </a:endParaRPr>
+                    </a:p>
+                  </a:txBody>
+                  <a:tcPr marL="53270" marR="53270" marT="0" marB="0" anchor="ctr"/>
+                </a:tc>
+                <a:tc>
+                  <a:txBody>
+                    <a:bodyPr/>
+                    <a:lstStyle/>
+                    <a:p>
+                      <a:pPr marL="90170" marR="0" lvl="0" indent="0" algn="ctr" defTabSz="914400" rtl="0" eaLnBrk="1" fontAlgn="auto" latinLnBrk="0" hangingPunct="1">
+                        <a:lnSpc>
+                          <a:spcPct val="100000"/>
+                        </a:lnSpc>
+                        <a:spcBef>
+                          <a:spcPts val="0"/>
+                        </a:spcBef>
+                        <a:spcAft>
+                          <a:spcPts val="0"/>
+                        </a:spcAft>
+                        <a:buClrTx/>
+                        <a:buSzTx/>
+                        <a:buFontTx/>
+                        <a:buNone/>
+                        <a:tabLst/>
+                        <a:defRPr/>
+                      </a:pPr>
+                      <a:r>
+                        <a:rPr lang="en-US" sz="1400" dirty="0">
+                          <a:effectLst/>
+                          <a:latin typeface="Times New Roman" panose="02020603050405020304" pitchFamily="18" charset="0"/>
+                          <a:cs typeface="Times New Roman" panose="02020603050405020304" pitchFamily="18" charset="0"/>
+                        </a:rPr>
+                        <a:t>Assignment 6</a:t>
+                      </a:r>
+                      <a:endParaRPr lang="en-US" sz="1400" dirty="0">
+                        <a:solidFill>
+                          <a:srgbClr val="000000"/>
+                        </a:solidFill>
+                        <a:effectLst/>
+                        <a:latin typeface="Times New Roman" panose="02020603050405020304" pitchFamily="18" charset="0"/>
+                        <a:ea typeface="Calibri" panose="020F0502020204030204" pitchFamily="34" charset="0"/>
+                        <a:cs typeface="Times New Roman" panose="02020603050405020304" pitchFamily="18" charset="0"/>
+                      </a:endParaRPr>
+                    </a:p>
+                  </a:txBody>
+                  <a:tcPr marL="53270" marR="53270" marT="0" marB="0" anchor="ctr"/>
+                </a:tc>
+                <a:extLst>
+                  <a:ext uri="{0D108BD9-81ED-4DB2-BD59-A6C34878D82A}">
+                    <a16:rowId xmlns:a16="http://schemas.microsoft.com/office/drawing/2014/main" val="1930035529"/>
+                  </a:ext>
+                </a:extLst>
+              </a:tr>
+              <a:tr h="214313">
+                <a:tc gridSpan="3">
+                  <a:txBody>
+                    <a:bodyPr/>
+                    <a:lstStyle/>
+                    <a:p>
+                      <a:pPr marL="90170" marR="0" algn="ctr">
+                        <a:spcBef>
+                          <a:spcPts val="0"/>
+                        </a:spcBef>
+                        <a:spcAft>
+                          <a:spcPts val="0"/>
+                        </a:spcAft>
+                      </a:pPr>
+                      <a:r>
+                        <a:rPr lang="en-US" sz="1400" b="1" dirty="0">
+                          <a:effectLst/>
+                          <a:latin typeface="Times New Roman" panose="02020603050405020304" pitchFamily="18" charset="0"/>
+                          <a:cs typeface="Times New Roman" panose="02020603050405020304" pitchFamily="18" charset="0"/>
+                        </a:rPr>
+                        <a:t>Spring Recess</a:t>
+                      </a:r>
+                      <a:endParaRPr lang="en-US" sz="1400" b="1" dirty="0">
+                        <a:solidFill>
+                          <a:srgbClr val="000000"/>
+                        </a:solidFill>
+                        <a:effectLst/>
+                        <a:latin typeface="Times New Roman" panose="02020603050405020304" pitchFamily="18" charset="0"/>
+                        <a:ea typeface="Calibri" panose="020F0502020204030204" pitchFamily="34" charset="0"/>
+                        <a:cs typeface="Times New Roman" panose="02020603050405020304" pitchFamily="18" charset="0"/>
+                      </a:endParaRPr>
+                    </a:p>
+                  </a:txBody>
+                  <a:tcPr marL="53270" marR="53270" marT="0" marB="0" anchor="ctr"/>
+                </a:tc>
+                <a:tc hMerge="1">
+                  <a:txBody>
+                    <a:bodyPr/>
+                    <a:lstStyle/>
+                    <a:p>
+                      <a:endParaRPr lang="en-US"/>
+                    </a:p>
+                  </a:txBody>
+                  <a:tcPr/>
+                </a:tc>
+                <a:tc hMerge="1">
+                  <a:txBody>
+                    <a:bodyPr/>
+                    <a:lstStyle/>
+                    <a:p>
+                      <a:pPr marL="90170" marR="0" algn="ctr">
+                        <a:spcBef>
+                          <a:spcPts val="0"/>
+                        </a:spcBef>
+                        <a:spcAft>
+                          <a:spcPts val="0"/>
+                        </a:spcAft>
+                      </a:pPr>
+                      <a:endParaRPr lang="en-US" sz="1400" b="1" dirty="0">
+                        <a:solidFill>
+                          <a:srgbClr val="000000"/>
+                        </a:solidFill>
+                        <a:effectLst/>
+                        <a:latin typeface="Times New Roman" panose="02020603050405020304" pitchFamily="18" charset="0"/>
+                        <a:ea typeface="Calibri" panose="020F0502020204030204" pitchFamily="34" charset="0"/>
+                        <a:cs typeface="Times New Roman" panose="02020603050405020304" pitchFamily="18" charset="0"/>
+                      </a:endParaRPr>
+                    </a:p>
+                  </a:txBody>
+                  <a:tcPr marL="53270" marR="53270" marT="0" marB="0" anchor="ctr"/>
+                </a:tc>
+                <a:extLst>
+                  <a:ext uri="{0D108BD9-81ED-4DB2-BD59-A6C34878D82A}">
+                    <a16:rowId xmlns:a16="http://schemas.microsoft.com/office/drawing/2014/main" val="3986344043"/>
+                  </a:ext>
+                </a:extLst>
+              </a:tr>
+              <a:tr h="428625">
+                <a:tc>
+                  <a:txBody>
+                    <a:bodyPr/>
+                    <a:lstStyle/>
+                    <a:p>
+                      <a:pPr marL="90170" marR="0" algn="ctr">
+                        <a:spcBef>
+                          <a:spcPts val="0"/>
+                        </a:spcBef>
+                        <a:spcAft>
+                          <a:spcPts val="0"/>
+                        </a:spcAft>
+                      </a:pPr>
+                      <a:r>
+                        <a:rPr lang="en-US" sz="1400" b="1" dirty="0">
+                          <a:effectLst/>
+                          <a:latin typeface="Times New Roman" panose="02020603050405020304" pitchFamily="18" charset="0"/>
+                          <a:cs typeface="Times New Roman" panose="02020603050405020304" pitchFamily="18" charset="0"/>
+                        </a:rPr>
+                        <a:t>Week 8: </a:t>
+                      </a:r>
+                    </a:p>
+                    <a:p>
+                      <a:pPr marL="90170" marR="0" algn="ctr">
+                        <a:spcBef>
+                          <a:spcPts val="0"/>
+                        </a:spcBef>
+                        <a:spcAft>
+                          <a:spcPts val="0"/>
+                        </a:spcAft>
+                      </a:pPr>
+                      <a:r>
+                        <a:rPr lang="en-US" sz="1400" b="1" dirty="0">
+                          <a:effectLst/>
+                          <a:latin typeface="Times New Roman" panose="02020603050405020304" pitchFamily="18" charset="0"/>
+                          <a:cs typeface="Times New Roman" panose="02020603050405020304" pitchFamily="18" charset="0"/>
+                        </a:rPr>
+                        <a:t>Mar 21</a:t>
+                      </a:r>
+                      <a:r>
+                        <a:rPr lang="en-US" sz="1400" b="1" baseline="30000" dirty="0">
+                          <a:effectLst/>
+                          <a:latin typeface="Times New Roman" panose="02020603050405020304" pitchFamily="18" charset="0"/>
+                          <a:cs typeface="Times New Roman" panose="02020603050405020304" pitchFamily="18" charset="0"/>
+                        </a:rPr>
+                        <a:t>st</a:t>
+                      </a:r>
+                      <a:r>
+                        <a:rPr lang="en-US" sz="1400" b="1" dirty="0">
+                          <a:effectLst/>
+                          <a:latin typeface="Times New Roman" panose="02020603050405020304" pitchFamily="18" charset="0"/>
+                          <a:cs typeface="Times New Roman" panose="02020603050405020304" pitchFamily="18" charset="0"/>
+                        </a:rPr>
+                        <a:t>    </a:t>
+                      </a:r>
+                      <a:endParaRPr lang="en-US" sz="1400" b="1" dirty="0">
+                        <a:solidFill>
+                          <a:srgbClr val="000000"/>
+                        </a:solidFill>
+                        <a:effectLst/>
+                        <a:latin typeface="Times New Roman" panose="02020603050405020304" pitchFamily="18" charset="0"/>
+                        <a:ea typeface="Calibri" panose="020F0502020204030204" pitchFamily="34" charset="0"/>
+                        <a:cs typeface="Times New Roman" panose="02020603050405020304" pitchFamily="18" charset="0"/>
+                      </a:endParaRPr>
+                    </a:p>
+                  </a:txBody>
+                  <a:tcPr marL="53270" marR="53270" marT="0" marB="0"/>
+                </a:tc>
+                <a:tc>
+                  <a:txBody>
+                    <a:bodyPr/>
+                    <a:lstStyle/>
+                    <a:p>
+                      <a:pPr marL="90170" marR="0">
+                        <a:spcBef>
+                          <a:spcPts val="0"/>
+                        </a:spcBef>
+                        <a:spcAft>
+                          <a:spcPts val="0"/>
+                        </a:spcAft>
+                      </a:pPr>
+                      <a:r>
+                        <a:rPr lang="en-US" sz="1400" dirty="0">
+                          <a:effectLst/>
+                          <a:latin typeface="Times New Roman" panose="02020603050405020304" pitchFamily="18" charset="0"/>
+                          <a:cs typeface="Times New Roman" panose="02020603050405020304" pitchFamily="18" charset="0"/>
+                        </a:rPr>
+                        <a:t>JavaScript for total beginners</a:t>
+                      </a:r>
+                      <a:endParaRPr lang="en-US" sz="1400" dirty="0">
+                        <a:solidFill>
+                          <a:srgbClr val="000000"/>
+                        </a:solidFill>
+                        <a:effectLst/>
+                        <a:latin typeface="Times New Roman" panose="02020603050405020304" pitchFamily="18" charset="0"/>
+                        <a:ea typeface="Calibri" panose="020F0502020204030204" pitchFamily="34" charset="0"/>
+                        <a:cs typeface="Times New Roman" panose="02020603050405020304" pitchFamily="18" charset="0"/>
+                      </a:endParaRPr>
+                    </a:p>
+                  </a:txBody>
+                  <a:tcPr marL="53270" marR="53270" marT="0" marB="0" anchor="ctr"/>
+                </a:tc>
+                <a:tc>
+                  <a:txBody>
+                    <a:bodyPr/>
+                    <a:lstStyle/>
+                    <a:p>
+                      <a:pPr marL="90170" marR="0" lvl="0" indent="0" algn="ctr" defTabSz="914400" rtl="0" eaLnBrk="1" fontAlgn="auto" latinLnBrk="0" hangingPunct="1">
+                        <a:lnSpc>
+                          <a:spcPct val="100000"/>
+                        </a:lnSpc>
+                        <a:spcBef>
+                          <a:spcPts val="0"/>
+                        </a:spcBef>
+                        <a:spcAft>
+                          <a:spcPts val="0"/>
+                        </a:spcAft>
+                        <a:buClrTx/>
+                        <a:buSzTx/>
+                        <a:buFontTx/>
+                        <a:buNone/>
+                        <a:tabLst/>
+                        <a:defRPr/>
+                      </a:pPr>
+                      <a:r>
+                        <a:rPr lang="en-US" sz="1400" dirty="0">
+                          <a:effectLst/>
+                          <a:latin typeface="Times New Roman" panose="02020603050405020304" pitchFamily="18" charset="0"/>
+                          <a:cs typeface="Times New Roman" panose="02020603050405020304" pitchFamily="18" charset="0"/>
+                        </a:rPr>
+                        <a:t>Assignment 7</a:t>
+                      </a:r>
+                      <a:endParaRPr lang="en-US" sz="1400" dirty="0">
+                        <a:solidFill>
+                          <a:srgbClr val="000000"/>
+                        </a:solidFill>
+                        <a:effectLst/>
+                        <a:latin typeface="Times New Roman" panose="02020603050405020304" pitchFamily="18" charset="0"/>
+                        <a:ea typeface="Calibri" panose="020F0502020204030204" pitchFamily="34" charset="0"/>
+                        <a:cs typeface="Times New Roman" panose="02020603050405020304" pitchFamily="18" charset="0"/>
+                      </a:endParaRPr>
+                    </a:p>
+                  </a:txBody>
+                  <a:tcPr marL="53270" marR="53270" marT="0" marB="0" anchor="ctr"/>
+                </a:tc>
+                <a:extLst>
+                  <a:ext uri="{0D108BD9-81ED-4DB2-BD59-A6C34878D82A}">
+                    <a16:rowId xmlns:a16="http://schemas.microsoft.com/office/drawing/2014/main" val="3862366649"/>
+                  </a:ext>
+                </a:extLst>
+              </a:tr>
+              <a:tr h="428625">
+                <a:tc>
+                  <a:txBody>
+                    <a:bodyPr/>
+                    <a:lstStyle/>
+                    <a:p>
+                      <a:pPr marL="90170" marR="0" algn="ctr">
+                        <a:spcBef>
+                          <a:spcPts val="0"/>
+                        </a:spcBef>
+                        <a:spcAft>
+                          <a:spcPts val="0"/>
+                        </a:spcAft>
+                      </a:pPr>
+                      <a:r>
+                        <a:rPr lang="en-US" sz="1400" b="1" dirty="0">
+                          <a:effectLst/>
+                          <a:latin typeface="Times New Roman" panose="02020603050405020304" pitchFamily="18" charset="0"/>
+                          <a:cs typeface="Times New Roman" panose="02020603050405020304" pitchFamily="18" charset="0"/>
+                        </a:rPr>
+                        <a:t>Week 9:</a:t>
+                      </a:r>
+                    </a:p>
+                    <a:p>
+                      <a:pPr marL="90170" marR="0" algn="ctr">
+                        <a:spcBef>
+                          <a:spcPts val="0"/>
+                        </a:spcBef>
+                        <a:spcAft>
+                          <a:spcPts val="0"/>
+                        </a:spcAft>
+                      </a:pPr>
+                      <a:r>
+                        <a:rPr lang="en-US" sz="1400" b="1" dirty="0">
+                          <a:effectLst/>
+                          <a:latin typeface="Times New Roman" panose="02020603050405020304" pitchFamily="18" charset="0"/>
+                          <a:cs typeface="Times New Roman" panose="02020603050405020304" pitchFamily="18" charset="0"/>
+                        </a:rPr>
+                        <a:t>Mar 28</a:t>
+                      </a:r>
+                      <a:r>
+                        <a:rPr lang="en-US" sz="1400" b="1" baseline="30000" dirty="0">
+                          <a:effectLst/>
+                          <a:latin typeface="Times New Roman" panose="02020603050405020304" pitchFamily="18" charset="0"/>
+                          <a:cs typeface="Times New Roman" panose="02020603050405020304" pitchFamily="18" charset="0"/>
+                        </a:rPr>
+                        <a:t>th</a:t>
+                      </a:r>
+                      <a:endParaRPr lang="en-US" sz="1400" b="1" dirty="0">
+                        <a:solidFill>
+                          <a:srgbClr val="000000"/>
+                        </a:solidFill>
+                        <a:effectLst/>
+                        <a:latin typeface="Times New Roman" panose="02020603050405020304" pitchFamily="18" charset="0"/>
+                        <a:ea typeface="Calibri" panose="020F0502020204030204" pitchFamily="34" charset="0"/>
+                        <a:cs typeface="Times New Roman" panose="02020603050405020304" pitchFamily="18" charset="0"/>
+                      </a:endParaRPr>
+                    </a:p>
+                  </a:txBody>
+                  <a:tcPr marL="53270" marR="53270" marT="0" marB="0"/>
+                </a:tc>
+                <a:tc>
+                  <a:txBody>
+                    <a:bodyPr/>
+                    <a:lstStyle/>
+                    <a:p>
+                      <a:pPr marL="90170" marR="0">
+                        <a:spcBef>
+                          <a:spcPts val="0"/>
+                        </a:spcBef>
+                        <a:spcAft>
+                          <a:spcPts val="0"/>
+                        </a:spcAft>
+                      </a:pPr>
+                      <a:r>
+                        <a:rPr lang="en-US" sz="1400" dirty="0">
+                          <a:effectLst/>
+                          <a:latin typeface="Times New Roman" panose="02020603050405020304" pitchFamily="18" charset="0"/>
+                          <a:cs typeface="Times New Roman" panose="02020603050405020304" pitchFamily="18" charset="0"/>
+                        </a:rPr>
+                        <a:t>Introduction to Google Earth Engine</a:t>
+                      </a:r>
+                    </a:p>
+                    <a:p>
+                      <a:pPr marL="90170" marR="0">
+                        <a:spcBef>
+                          <a:spcPts val="0"/>
+                        </a:spcBef>
+                        <a:spcAft>
+                          <a:spcPts val="0"/>
+                        </a:spcAft>
+                      </a:pPr>
+                      <a:r>
+                        <a:rPr lang="en-US" sz="1400" dirty="0">
+                          <a:effectLst/>
+                          <a:latin typeface="Times New Roman" panose="02020603050405020304" pitchFamily="18" charset="0"/>
+                          <a:cs typeface="Times New Roman" panose="02020603050405020304" pitchFamily="18" charset="0"/>
+                        </a:rPr>
+                        <a:t>(Interface, data catalogue, geospatial data import and visualization etc.)</a:t>
+                      </a:r>
+                      <a:endParaRPr lang="en-US" sz="1400" dirty="0">
+                        <a:solidFill>
+                          <a:srgbClr val="000000"/>
+                        </a:solidFill>
+                        <a:effectLst/>
+                        <a:latin typeface="Times New Roman" panose="02020603050405020304" pitchFamily="18" charset="0"/>
+                        <a:ea typeface="Calibri" panose="020F0502020204030204" pitchFamily="34" charset="0"/>
+                        <a:cs typeface="Times New Roman" panose="02020603050405020304" pitchFamily="18" charset="0"/>
+                      </a:endParaRPr>
+                    </a:p>
+                  </a:txBody>
+                  <a:tcPr marL="53270" marR="53270" marT="0" marB="0" anchor="ctr"/>
+                </a:tc>
+                <a:tc>
+                  <a:txBody>
+                    <a:bodyPr/>
+                    <a:lstStyle/>
+                    <a:p>
+                      <a:pPr marL="90170" marR="0" algn="ctr">
+                        <a:spcBef>
+                          <a:spcPts val="0"/>
+                        </a:spcBef>
+                        <a:spcAft>
+                          <a:spcPts val="0"/>
+                        </a:spcAft>
+                      </a:pPr>
+                      <a:r>
+                        <a:rPr lang="en-US" sz="1400" dirty="0">
+                          <a:effectLst/>
+                          <a:latin typeface="Times New Roman" panose="02020603050405020304" pitchFamily="18" charset="0"/>
+                          <a:cs typeface="Times New Roman" panose="02020603050405020304" pitchFamily="18" charset="0"/>
+                        </a:rPr>
+                        <a:t>Assignment 8</a:t>
+                      </a:r>
+                      <a:endParaRPr lang="en-US" sz="1400" dirty="0">
+                        <a:solidFill>
+                          <a:srgbClr val="000000"/>
+                        </a:solidFill>
+                        <a:effectLst/>
+                        <a:latin typeface="Times New Roman" panose="02020603050405020304" pitchFamily="18" charset="0"/>
+                        <a:ea typeface="Calibri" panose="020F0502020204030204" pitchFamily="34" charset="0"/>
+                        <a:cs typeface="Times New Roman" panose="02020603050405020304" pitchFamily="18" charset="0"/>
+                      </a:endParaRPr>
+                    </a:p>
+                  </a:txBody>
+                  <a:tcPr marL="53270" marR="53270" marT="0" marB="0" anchor="ctr"/>
+                </a:tc>
+                <a:extLst>
+                  <a:ext uri="{0D108BD9-81ED-4DB2-BD59-A6C34878D82A}">
+                    <a16:rowId xmlns:a16="http://schemas.microsoft.com/office/drawing/2014/main" val="2233390585"/>
+                  </a:ext>
+                </a:extLst>
+              </a:tr>
+              <a:tr h="428625">
+                <a:tc>
+                  <a:txBody>
+                    <a:bodyPr/>
+                    <a:lstStyle/>
+                    <a:p>
+                      <a:pPr marL="90170" marR="0" algn="ctr">
+                        <a:spcBef>
+                          <a:spcPts val="0"/>
+                        </a:spcBef>
+                        <a:spcAft>
+                          <a:spcPts val="0"/>
+                        </a:spcAft>
+                      </a:pPr>
+                      <a:r>
+                        <a:rPr lang="en-US" sz="1400" b="1" dirty="0">
+                          <a:effectLst/>
+                          <a:latin typeface="Times New Roman" panose="02020603050405020304" pitchFamily="18" charset="0"/>
+                          <a:cs typeface="Times New Roman" panose="02020603050405020304" pitchFamily="18" charset="0"/>
+                        </a:rPr>
+                        <a:t>Week 10: </a:t>
+                      </a:r>
+                    </a:p>
+                    <a:p>
+                      <a:pPr marL="90170" marR="0" algn="ctr">
+                        <a:spcBef>
+                          <a:spcPts val="0"/>
+                        </a:spcBef>
+                        <a:spcAft>
+                          <a:spcPts val="0"/>
+                        </a:spcAft>
+                      </a:pPr>
+                      <a:r>
+                        <a:rPr lang="en-US" sz="1400" b="1" dirty="0">
+                          <a:effectLst/>
+                          <a:latin typeface="Times New Roman" panose="02020603050405020304" pitchFamily="18" charset="0"/>
+                          <a:cs typeface="Times New Roman" panose="02020603050405020304" pitchFamily="18" charset="0"/>
+                        </a:rPr>
+                        <a:t>Apr 4</a:t>
+                      </a:r>
+                      <a:r>
+                        <a:rPr lang="en-US" sz="1400" b="1" baseline="30000" dirty="0">
+                          <a:effectLst/>
+                          <a:latin typeface="Times New Roman" panose="02020603050405020304" pitchFamily="18" charset="0"/>
+                          <a:cs typeface="Times New Roman" panose="02020603050405020304" pitchFamily="18" charset="0"/>
+                        </a:rPr>
+                        <a:t>th</a:t>
+                      </a:r>
+                      <a:r>
+                        <a:rPr lang="en-US" sz="1400" b="1" dirty="0">
+                          <a:effectLst/>
+                          <a:latin typeface="Times New Roman" panose="02020603050405020304" pitchFamily="18" charset="0"/>
+                          <a:cs typeface="Times New Roman" panose="02020603050405020304" pitchFamily="18" charset="0"/>
+                        </a:rPr>
+                        <a:t> </a:t>
+                      </a:r>
+                      <a:endParaRPr lang="en-US" sz="1400" b="1" dirty="0">
+                        <a:solidFill>
+                          <a:srgbClr val="000000"/>
+                        </a:solidFill>
+                        <a:effectLst/>
+                        <a:latin typeface="Times New Roman" panose="02020603050405020304" pitchFamily="18" charset="0"/>
+                        <a:ea typeface="Calibri" panose="020F0502020204030204" pitchFamily="34" charset="0"/>
+                        <a:cs typeface="Times New Roman" panose="02020603050405020304" pitchFamily="18" charset="0"/>
+                      </a:endParaRPr>
+                    </a:p>
+                  </a:txBody>
+                  <a:tcPr marL="53270" marR="53270" marT="0" marB="0"/>
+                </a:tc>
+                <a:tc>
+                  <a:txBody>
+                    <a:bodyPr/>
+                    <a:lstStyle/>
+                    <a:p>
+                      <a:pPr marL="90170" marR="0">
+                        <a:spcBef>
+                          <a:spcPts val="0"/>
+                        </a:spcBef>
+                        <a:spcAft>
+                          <a:spcPts val="0"/>
+                        </a:spcAft>
+                      </a:pPr>
+                      <a:r>
+                        <a:rPr lang="en-US" sz="1400" dirty="0">
+                          <a:effectLst/>
+                          <a:latin typeface="Times New Roman" panose="02020603050405020304" pitchFamily="18" charset="0"/>
+                          <a:cs typeface="Times New Roman" panose="02020603050405020304" pitchFamily="18" charset="0"/>
+                        </a:rPr>
+                        <a:t>Working with vector and raster data collections in Google Earth Engine  </a:t>
+                      </a:r>
+                      <a:br>
+                        <a:rPr lang="en-US" sz="1400" dirty="0">
+                          <a:effectLst/>
+                          <a:latin typeface="Times New Roman" panose="02020603050405020304" pitchFamily="18" charset="0"/>
+                          <a:cs typeface="Times New Roman" panose="02020603050405020304" pitchFamily="18" charset="0"/>
+                        </a:rPr>
+                      </a:br>
+                      <a:r>
+                        <a:rPr lang="en-US" sz="1400" dirty="0">
+                          <a:effectLst/>
+                          <a:latin typeface="Times New Roman" panose="02020603050405020304" pitchFamily="18" charset="0"/>
+                          <a:cs typeface="Times New Roman" panose="02020603050405020304" pitchFamily="18" charset="0"/>
+                        </a:rPr>
+                        <a:t>(Filtering, reducers, clipping, operators, and loops in Google Earth Engine)</a:t>
+                      </a:r>
+                      <a:endParaRPr lang="en-US" sz="1400" dirty="0">
+                        <a:solidFill>
+                          <a:srgbClr val="000000"/>
+                        </a:solidFill>
+                        <a:effectLst/>
+                        <a:latin typeface="Times New Roman" panose="02020603050405020304" pitchFamily="18" charset="0"/>
+                        <a:ea typeface="Calibri" panose="020F0502020204030204" pitchFamily="34" charset="0"/>
+                        <a:cs typeface="Times New Roman" panose="02020603050405020304" pitchFamily="18" charset="0"/>
+                      </a:endParaRPr>
+                    </a:p>
+                  </a:txBody>
+                  <a:tcPr marL="53270" marR="53270" marT="0" marB="0" anchor="ctr"/>
+                </a:tc>
+                <a:tc>
+                  <a:txBody>
+                    <a:bodyPr/>
+                    <a:lstStyle/>
+                    <a:p>
+                      <a:pPr marL="90170" marR="0" algn="ctr">
+                        <a:spcBef>
+                          <a:spcPts val="0"/>
+                        </a:spcBef>
+                        <a:spcAft>
+                          <a:spcPts val="0"/>
+                        </a:spcAft>
+                      </a:pPr>
+                      <a:r>
+                        <a:rPr lang="en-US" sz="1400" dirty="0">
+                          <a:effectLst/>
+                          <a:latin typeface="Times New Roman" panose="02020603050405020304" pitchFamily="18" charset="0"/>
+                          <a:cs typeface="Times New Roman" panose="02020603050405020304" pitchFamily="18" charset="0"/>
+                        </a:rPr>
+                        <a:t>Assignment 9</a:t>
+                      </a:r>
+                      <a:endParaRPr lang="en-US" sz="1400" dirty="0">
+                        <a:solidFill>
+                          <a:srgbClr val="000000"/>
+                        </a:solidFill>
+                        <a:effectLst/>
+                        <a:latin typeface="Times New Roman" panose="02020603050405020304" pitchFamily="18" charset="0"/>
+                        <a:ea typeface="Calibri" panose="020F0502020204030204" pitchFamily="34" charset="0"/>
+                        <a:cs typeface="Times New Roman" panose="02020603050405020304" pitchFamily="18" charset="0"/>
+                      </a:endParaRPr>
+                    </a:p>
+                  </a:txBody>
+                  <a:tcPr marL="53270" marR="53270" marT="0" marB="0" anchor="ctr"/>
+                </a:tc>
+                <a:extLst>
+                  <a:ext uri="{0D108BD9-81ED-4DB2-BD59-A6C34878D82A}">
+                    <a16:rowId xmlns:a16="http://schemas.microsoft.com/office/drawing/2014/main" val="1322627347"/>
+                  </a:ext>
+                </a:extLst>
+              </a:tr>
+              <a:tr h="428625">
+                <a:tc>
+                  <a:txBody>
+                    <a:bodyPr/>
+                    <a:lstStyle/>
+                    <a:p>
+                      <a:pPr marL="90170" marR="0" algn="ctr">
+                        <a:spcBef>
+                          <a:spcPts val="0"/>
+                        </a:spcBef>
+                        <a:spcAft>
+                          <a:spcPts val="0"/>
+                        </a:spcAft>
+                      </a:pPr>
+                      <a:r>
+                        <a:rPr lang="en-US" sz="1400" b="1" dirty="0">
+                          <a:effectLst/>
+                          <a:latin typeface="Times New Roman" panose="02020603050405020304" pitchFamily="18" charset="0"/>
+                          <a:cs typeface="Times New Roman" panose="02020603050405020304" pitchFamily="18" charset="0"/>
+                        </a:rPr>
+                        <a:t>Week 11: </a:t>
+                      </a:r>
+                    </a:p>
+                    <a:p>
+                      <a:pPr marL="90170" marR="0" algn="ctr">
+                        <a:spcBef>
+                          <a:spcPts val="0"/>
+                        </a:spcBef>
+                        <a:spcAft>
+                          <a:spcPts val="0"/>
+                        </a:spcAft>
+                      </a:pPr>
+                      <a:r>
+                        <a:rPr lang="en-US" sz="1400" b="1" dirty="0">
+                          <a:effectLst/>
+                          <a:latin typeface="Times New Roman" panose="02020603050405020304" pitchFamily="18" charset="0"/>
+                          <a:cs typeface="Times New Roman" panose="02020603050405020304" pitchFamily="18" charset="0"/>
+                        </a:rPr>
+                        <a:t>April 11</a:t>
+                      </a:r>
+                      <a:r>
+                        <a:rPr lang="en-US" sz="1400" b="1" baseline="30000" dirty="0">
+                          <a:effectLst/>
+                          <a:latin typeface="Times New Roman" panose="02020603050405020304" pitchFamily="18" charset="0"/>
+                          <a:cs typeface="Times New Roman" panose="02020603050405020304" pitchFamily="18" charset="0"/>
+                        </a:rPr>
+                        <a:t>th</a:t>
+                      </a:r>
+                      <a:endParaRPr lang="en-US" sz="1400" b="1" dirty="0">
+                        <a:solidFill>
+                          <a:srgbClr val="000000"/>
+                        </a:solidFill>
+                        <a:effectLst/>
+                        <a:latin typeface="Times New Roman" panose="02020603050405020304" pitchFamily="18" charset="0"/>
+                        <a:ea typeface="Calibri" panose="020F0502020204030204" pitchFamily="34" charset="0"/>
+                        <a:cs typeface="Times New Roman" panose="02020603050405020304" pitchFamily="18" charset="0"/>
+                      </a:endParaRPr>
+                    </a:p>
+                  </a:txBody>
+                  <a:tcPr marL="53270" marR="53270" marT="0" marB="0"/>
+                </a:tc>
+                <a:tc>
+                  <a:txBody>
+                    <a:bodyPr/>
+                    <a:lstStyle/>
+                    <a:p>
+                      <a:pPr marL="90170" marR="0">
+                        <a:spcBef>
+                          <a:spcPts val="0"/>
+                        </a:spcBef>
+                        <a:spcAft>
+                          <a:spcPts val="0"/>
+                        </a:spcAft>
+                      </a:pPr>
+                      <a:r>
+                        <a:rPr lang="en-US" sz="1400" dirty="0">
+                          <a:effectLst/>
+                          <a:latin typeface="Times New Roman" panose="02020603050405020304" pitchFamily="18" charset="0"/>
+                          <a:cs typeface="Times New Roman" panose="02020603050405020304" pitchFamily="18" charset="0"/>
+                        </a:rPr>
+                        <a:t>Classification in Google Earth Engine</a:t>
+                      </a:r>
+                      <a:br>
+                        <a:rPr lang="en-US" sz="1400" dirty="0">
+                          <a:effectLst/>
+                          <a:latin typeface="Times New Roman" panose="02020603050405020304" pitchFamily="18" charset="0"/>
+                          <a:cs typeface="Times New Roman" panose="02020603050405020304" pitchFamily="18" charset="0"/>
+                        </a:rPr>
+                      </a:br>
+                      <a:r>
+                        <a:rPr lang="en-US" sz="1400" dirty="0">
+                          <a:effectLst/>
+                          <a:latin typeface="Times New Roman" panose="02020603050405020304" pitchFamily="18" charset="0"/>
+                          <a:cs typeface="Times New Roman" panose="02020603050405020304" pitchFamily="18" charset="0"/>
+                        </a:rPr>
+                        <a:t>(Unsupervised, and Supervised classification)</a:t>
+                      </a:r>
+                      <a:endParaRPr lang="en-US" sz="1400" dirty="0">
+                        <a:solidFill>
+                          <a:srgbClr val="000000"/>
+                        </a:solidFill>
+                        <a:effectLst/>
+                        <a:latin typeface="Times New Roman" panose="02020603050405020304" pitchFamily="18" charset="0"/>
+                        <a:ea typeface="Calibri" panose="020F0502020204030204" pitchFamily="34" charset="0"/>
+                        <a:cs typeface="Times New Roman" panose="02020603050405020304" pitchFamily="18" charset="0"/>
+                      </a:endParaRPr>
+                    </a:p>
+                  </a:txBody>
+                  <a:tcPr marL="53270" marR="53270" marT="0" marB="0" anchor="ctr"/>
+                </a:tc>
+                <a:tc>
+                  <a:txBody>
+                    <a:bodyPr/>
+                    <a:lstStyle/>
+                    <a:p>
+                      <a:pPr marL="90170" marR="0" algn="ctr">
+                        <a:spcBef>
+                          <a:spcPts val="0"/>
+                        </a:spcBef>
+                        <a:spcAft>
+                          <a:spcPts val="0"/>
+                        </a:spcAft>
+                      </a:pPr>
+                      <a:r>
+                        <a:rPr lang="en-US" sz="1400" dirty="0">
+                          <a:effectLst/>
+                          <a:latin typeface="Times New Roman" panose="02020603050405020304" pitchFamily="18" charset="0"/>
+                          <a:cs typeface="Times New Roman" panose="02020603050405020304" pitchFamily="18" charset="0"/>
+                        </a:rPr>
+                        <a:t>Assignment 10</a:t>
+                      </a:r>
+                      <a:endParaRPr lang="en-US" sz="1400" dirty="0">
+                        <a:solidFill>
+                          <a:srgbClr val="000000"/>
+                        </a:solidFill>
+                        <a:effectLst/>
+                        <a:latin typeface="Times New Roman" panose="02020603050405020304" pitchFamily="18" charset="0"/>
+                        <a:ea typeface="Calibri" panose="020F0502020204030204" pitchFamily="34" charset="0"/>
+                        <a:cs typeface="Times New Roman" panose="02020603050405020304" pitchFamily="18" charset="0"/>
+                      </a:endParaRPr>
+                    </a:p>
+                  </a:txBody>
+                  <a:tcPr marL="53270" marR="53270" marT="0" marB="0" anchor="ctr"/>
+                </a:tc>
+                <a:extLst>
+                  <a:ext uri="{0D108BD9-81ED-4DB2-BD59-A6C34878D82A}">
+                    <a16:rowId xmlns:a16="http://schemas.microsoft.com/office/drawing/2014/main" val="2536298045"/>
+                  </a:ext>
+                </a:extLst>
+              </a:tr>
+              <a:tr h="428625">
+                <a:tc>
+                  <a:txBody>
+                    <a:bodyPr/>
+                    <a:lstStyle/>
+                    <a:p>
+                      <a:pPr marL="90170" marR="0" algn="ctr">
+                        <a:spcBef>
+                          <a:spcPts val="0"/>
+                        </a:spcBef>
+                        <a:spcAft>
+                          <a:spcPts val="0"/>
+                        </a:spcAft>
+                      </a:pPr>
+                      <a:r>
+                        <a:rPr lang="en-US" sz="1400" b="1" dirty="0">
+                          <a:effectLst/>
+                          <a:latin typeface="Times New Roman" panose="02020603050405020304" pitchFamily="18" charset="0"/>
+                          <a:cs typeface="Times New Roman" panose="02020603050405020304" pitchFamily="18" charset="0"/>
+                        </a:rPr>
+                        <a:t>Week 12: </a:t>
+                      </a:r>
+                    </a:p>
+                    <a:p>
+                      <a:pPr marL="90170" marR="0" algn="ctr">
+                        <a:spcBef>
+                          <a:spcPts val="0"/>
+                        </a:spcBef>
+                        <a:spcAft>
+                          <a:spcPts val="0"/>
+                        </a:spcAft>
+                      </a:pPr>
+                      <a:r>
+                        <a:rPr lang="en-US" sz="1400" b="1" dirty="0">
+                          <a:effectLst/>
+                          <a:latin typeface="Times New Roman" panose="02020603050405020304" pitchFamily="18" charset="0"/>
+                          <a:cs typeface="Times New Roman" panose="02020603050405020304" pitchFamily="18" charset="0"/>
+                        </a:rPr>
+                        <a:t>Apr 18</a:t>
+                      </a:r>
+                      <a:r>
+                        <a:rPr lang="en-US" sz="1400" b="1" baseline="30000" dirty="0">
+                          <a:effectLst/>
+                          <a:latin typeface="Times New Roman" panose="02020603050405020304" pitchFamily="18" charset="0"/>
+                          <a:cs typeface="Times New Roman" panose="02020603050405020304" pitchFamily="18" charset="0"/>
+                        </a:rPr>
+                        <a:t>th</a:t>
+                      </a:r>
+                      <a:r>
+                        <a:rPr lang="en-US" sz="1400" b="1" dirty="0">
+                          <a:effectLst/>
+                          <a:latin typeface="Times New Roman" panose="02020603050405020304" pitchFamily="18" charset="0"/>
+                          <a:cs typeface="Times New Roman" panose="02020603050405020304" pitchFamily="18" charset="0"/>
+                        </a:rPr>
+                        <a:t> </a:t>
+                      </a:r>
+                      <a:endParaRPr lang="en-US" sz="1400" b="1" dirty="0">
+                        <a:solidFill>
+                          <a:srgbClr val="000000"/>
+                        </a:solidFill>
+                        <a:effectLst/>
+                        <a:latin typeface="Times New Roman" panose="02020603050405020304" pitchFamily="18" charset="0"/>
+                        <a:ea typeface="Calibri" panose="020F0502020204030204" pitchFamily="34" charset="0"/>
+                        <a:cs typeface="Times New Roman" panose="02020603050405020304" pitchFamily="18" charset="0"/>
+                      </a:endParaRPr>
+                    </a:p>
+                  </a:txBody>
+                  <a:tcPr marL="53270" marR="53270" marT="0" marB="0"/>
+                </a:tc>
+                <a:tc>
+                  <a:txBody>
+                    <a:bodyPr/>
+                    <a:lstStyle/>
+                    <a:p>
+                      <a:pPr marL="90170" marR="0">
+                        <a:spcBef>
+                          <a:spcPts val="0"/>
+                        </a:spcBef>
+                        <a:spcAft>
+                          <a:spcPts val="0"/>
+                        </a:spcAft>
+                      </a:pPr>
+                      <a:r>
+                        <a:rPr lang="en-US" sz="1400" dirty="0">
+                          <a:effectLst/>
+                          <a:latin typeface="Times New Roman" panose="02020603050405020304" pitchFamily="18" charset="0"/>
+                          <a:cs typeface="Times New Roman" panose="02020603050405020304" pitchFamily="18" charset="0"/>
+                        </a:rPr>
+                        <a:t>Introduction to the research project</a:t>
+                      </a:r>
+                      <a:endParaRPr lang="en-US" sz="1400" dirty="0">
+                        <a:solidFill>
+                          <a:srgbClr val="000000"/>
+                        </a:solidFill>
+                        <a:effectLst/>
+                        <a:latin typeface="Times New Roman" panose="02020603050405020304" pitchFamily="18" charset="0"/>
+                        <a:ea typeface="Calibri" panose="020F0502020204030204" pitchFamily="34" charset="0"/>
+                        <a:cs typeface="Times New Roman" panose="02020603050405020304" pitchFamily="18" charset="0"/>
+                      </a:endParaRPr>
+                    </a:p>
+                  </a:txBody>
+                  <a:tcPr marL="53270" marR="53270" marT="0" marB="0" anchor="ctr"/>
+                </a:tc>
+                <a:tc>
+                  <a:txBody>
+                    <a:bodyPr/>
+                    <a:lstStyle/>
+                    <a:p>
+                      <a:pPr marL="90170" marR="0" algn="ctr">
+                        <a:spcBef>
+                          <a:spcPts val="0"/>
+                        </a:spcBef>
+                        <a:spcAft>
+                          <a:spcPts val="0"/>
+                        </a:spcAft>
+                      </a:pPr>
+                      <a:r>
+                        <a:rPr lang="en-US" sz="1400" dirty="0">
+                          <a:effectLst/>
+                          <a:latin typeface="Times New Roman" panose="02020603050405020304" pitchFamily="18" charset="0"/>
+                          <a:cs typeface="Times New Roman" panose="02020603050405020304" pitchFamily="18" charset="0"/>
+                        </a:rPr>
+                        <a:t>Coursework project</a:t>
+                      </a:r>
+                      <a:endParaRPr lang="en-US" sz="1400" dirty="0">
+                        <a:solidFill>
+                          <a:srgbClr val="000000"/>
+                        </a:solidFill>
+                        <a:effectLst/>
+                        <a:latin typeface="Times New Roman" panose="02020603050405020304" pitchFamily="18" charset="0"/>
+                        <a:ea typeface="Calibri" panose="020F0502020204030204" pitchFamily="34" charset="0"/>
+                        <a:cs typeface="Times New Roman" panose="02020603050405020304" pitchFamily="18" charset="0"/>
+                      </a:endParaRPr>
+                    </a:p>
+                  </a:txBody>
+                  <a:tcPr marL="53270" marR="53270" marT="0" marB="0" anchor="ctr"/>
+                </a:tc>
+                <a:extLst>
+                  <a:ext uri="{0D108BD9-81ED-4DB2-BD59-A6C34878D82A}">
+                    <a16:rowId xmlns:a16="http://schemas.microsoft.com/office/drawing/2014/main" val="1373517362"/>
+                  </a:ext>
+                </a:extLst>
+              </a:tr>
+              <a:tr h="428625">
+                <a:tc>
+                  <a:txBody>
+                    <a:bodyPr/>
+                    <a:lstStyle/>
+                    <a:p>
+                      <a:pPr marL="90170" marR="0" algn="ctr">
+                        <a:spcBef>
+                          <a:spcPts val="0"/>
+                        </a:spcBef>
+                        <a:spcAft>
+                          <a:spcPts val="0"/>
+                        </a:spcAft>
+                      </a:pPr>
+                      <a:r>
+                        <a:rPr lang="en-US" sz="1400" b="1" dirty="0">
+                          <a:effectLst/>
+                          <a:latin typeface="Times New Roman" panose="02020603050405020304" pitchFamily="18" charset="0"/>
+                          <a:cs typeface="Times New Roman" panose="02020603050405020304" pitchFamily="18" charset="0"/>
+                        </a:rPr>
+                        <a:t>Week 13: </a:t>
+                      </a:r>
+                    </a:p>
+                    <a:p>
+                      <a:pPr marL="90170" marR="0" algn="ctr">
+                        <a:spcBef>
+                          <a:spcPts val="0"/>
+                        </a:spcBef>
+                        <a:spcAft>
+                          <a:spcPts val="0"/>
+                        </a:spcAft>
+                      </a:pPr>
+                      <a:r>
+                        <a:rPr lang="en-US" sz="1400" b="1" dirty="0">
+                          <a:effectLst/>
+                          <a:latin typeface="Times New Roman" panose="02020603050405020304" pitchFamily="18" charset="0"/>
+                          <a:cs typeface="Times New Roman" panose="02020603050405020304" pitchFamily="18" charset="0"/>
+                        </a:rPr>
+                        <a:t>Apr 25</a:t>
+                      </a:r>
+                      <a:r>
+                        <a:rPr lang="en-US" sz="1400" b="1" baseline="30000" dirty="0">
+                          <a:effectLst/>
+                          <a:latin typeface="Times New Roman" panose="02020603050405020304" pitchFamily="18" charset="0"/>
+                          <a:cs typeface="Times New Roman" panose="02020603050405020304" pitchFamily="18" charset="0"/>
+                        </a:rPr>
+                        <a:t>th</a:t>
+                      </a:r>
+                      <a:r>
+                        <a:rPr lang="en-US" sz="1400" b="1" dirty="0">
+                          <a:effectLst/>
+                          <a:latin typeface="Times New Roman" panose="02020603050405020304" pitchFamily="18" charset="0"/>
+                          <a:cs typeface="Times New Roman" panose="02020603050405020304" pitchFamily="18" charset="0"/>
+                        </a:rPr>
+                        <a:t> </a:t>
+                      </a:r>
+                      <a:endParaRPr lang="en-US" sz="1400" b="1" dirty="0">
+                        <a:solidFill>
+                          <a:srgbClr val="000000"/>
+                        </a:solidFill>
+                        <a:effectLst/>
+                        <a:latin typeface="Times New Roman" panose="02020603050405020304" pitchFamily="18" charset="0"/>
+                        <a:ea typeface="Calibri" panose="020F0502020204030204" pitchFamily="34" charset="0"/>
+                        <a:cs typeface="Times New Roman" panose="02020603050405020304" pitchFamily="18" charset="0"/>
+                      </a:endParaRPr>
+                    </a:p>
+                  </a:txBody>
+                  <a:tcPr marL="53270" marR="53270" marT="0" marB="0"/>
+                </a:tc>
+                <a:tc>
+                  <a:txBody>
+                    <a:bodyPr/>
+                    <a:lstStyle/>
+                    <a:p>
+                      <a:pPr marL="90170" marR="0">
+                        <a:spcBef>
+                          <a:spcPts val="0"/>
+                        </a:spcBef>
+                        <a:spcAft>
+                          <a:spcPts val="0"/>
+                        </a:spcAft>
+                      </a:pPr>
+                      <a:r>
+                        <a:rPr lang="en-US" sz="1400" dirty="0">
+                          <a:effectLst/>
+                          <a:latin typeface="Times New Roman" panose="02020603050405020304" pitchFamily="18" charset="0"/>
+                          <a:cs typeface="Times New Roman" panose="02020603050405020304" pitchFamily="18" charset="0"/>
+                        </a:rPr>
+                        <a:t>Supported research project practical time </a:t>
+                      </a:r>
+                      <a:endParaRPr lang="en-US" sz="1400" dirty="0">
+                        <a:solidFill>
+                          <a:srgbClr val="000000"/>
+                        </a:solidFill>
+                        <a:effectLst/>
+                        <a:latin typeface="Times New Roman" panose="02020603050405020304" pitchFamily="18" charset="0"/>
+                        <a:ea typeface="Calibri" panose="020F0502020204030204" pitchFamily="34" charset="0"/>
+                        <a:cs typeface="Times New Roman" panose="02020603050405020304" pitchFamily="18" charset="0"/>
+                      </a:endParaRPr>
+                    </a:p>
+                  </a:txBody>
+                  <a:tcPr marL="53270" marR="53270" marT="0" marB="0" anchor="ctr"/>
+                </a:tc>
+                <a:tc>
+                  <a:txBody>
+                    <a:bodyPr/>
+                    <a:lstStyle/>
+                    <a:p>
+                      <a:pPr marL="90170" marR="0" algn="ctr">
+                        <a:spcBef>
+                          <a:spcPts val="0"/>
+                        </a:spcBef>
+                        <a:spcAft>
+                          <a:spcPts val="0"/>
+                        </a:spcAft>
+                      </a:pPr>
+                      <a:r>
+                        <a:rPr lang="en-US" sz="1400">
+                          <a:effectLst/>
+                          <a:latin typeface="Times New Roman" panose="02020603050405020304" pitchFamily="18" charset="0"/>
+                          <a:cs typeface="Times New Roman" panose="02020603050405020304" pitchFamily="18" charset="0"/>
+                        </a:rPr>
+                        <a:t>Coursework project</a:t>
+                      </a:r>
+                      <a:endParaRPr lang="en-US" sz="1400" dirty="0">
+                        <a:solidFill>
+                          <a:srgbClr val="000000"/>
+                        </a:solidFill>
+                        <a:effectLst/>
+                        <a:latin typeface="Times New Roman" panose="02020603050405020304" pitchFamily="18" charset="0"/>
+                        <a:ea typeface="Calibri" panose="020F0502020204030204" pitchFamily="34" charset="0"/>
+                        <a:cs typeface="Times New Roman" panose="02020603050405020304" pitchFamily="18" charset="0"/>
+                      </a:endParaRPr>
+                    </a:p>
+                  </a:txBody>
+                  <a:tcPr marL="53270" marR="53270" marT="0" marB="0" anchor="ctr"/>
+                </a:tc>
+                <a:extLst>
+                  <a:ext uri="{0D108BD9-81ED-4DB2-BD59-A6C34878D82A}">
+                    <a16:rowId xmlns:a16="http://schemas.microsoft.com/office/drawing/2014/main" val="1165365623"/>
+                  </a:ext>
+                </a:extLst>
+              </a:tr>
+              <a:tr h="428625">
+                <a:tc>
+                  <a:txBody>
+                    <a:bodyPr/>
+                    <a:lstStyle/>
+                    <a:p>
+                      <a:pPr marL="90170" marR="0" algn="ctr">
+                        <a:spcBef>
+                          <a:spcPts val="0"/>
+                        </a:spcBef>
+                        <a:spcAft>
+                          <a:spcPts val="0"/>
+                        </a:spcAft>
+                      </a:pPr>
+                      <a:r>
+                        <a:rPr lang="en-US" sz="1400" b="1" dirty="0">
+                          <a:effectLst/>
+                          <a:latin typeface="Times New Roman" panose="02020603050405020304" pitchFamily="18" charset="0"/>
+                          <a:cs typeface="Times New Roman" panose="02020603050405020304" pitchFamily="18" charset="0"/>
+                        </a:rPr>
+                        <a:t>Week 14:</a:t>
+                      </a:r>
+                    </a:p>
+                    <a:p>
+                      <a:pPr marL="90170" marR="0" algn="ctr">
+                        <a:spcBef>
+                          <a:spcPts val="0"/>
+                        </a:spcBef>
+                        <a:spcAft>
+                          <a:spcPts val="0"/>
+                        </a:spcAft>
+                      </a:pPr>
+                      <a:r>
+                        <a:rPr lang="en-US" sz="1400" b="1" dirty="0">
+                          <a:effectLst/>
+                          <a:latin typeface="Times New Roman" panose="02020603050405020304" pitchFamily="18" charset="0"/>
+                          <a:cs typeface="Times New Roman" panose="02020603050405020304" pitchFamily="18" charset="0"/>
+                        </a:rPr>
+                        <a:t>May 2</a:t>
+                      </a:r>
+                      <a:r>
+                        <a:rPr lang="en-US" sz="1400" b="1" baseline="30000" dirty="0">
+                          <a:effectLst/>
+                          <a:latin typeface="Times New Roman" panose="02020603050405020304" pitchFamily="18" charset="0"/>
+                          <a:cs typeface="Times New Roman" panose="02020603050405020304" pitchFamily="18" charset="0"/>
+                        </a:rPr>
+                        <a:t>nd</a:t>
+                      </a:r>
+                      <a:endParaRPr lang="en-US" sz="1400" b="1" dirty="0">
+                        <a:solidFill>
+                          <a:srgbClr val="000000"/>
+                        </a:solidFill>
+                        <a:effectLst/>
+                        <a:latin typeface="Times New Roman" panose="02020603050405020304" pitchFamily="18" charset="0"/>
+                        <a:ea typeface="Calibri" panose="020F0502020204030204" pitchFamily="34" charset="0"/>
+                        <a:cs typeface="Times New Roman" panose="02020603050405020304" pitchFamily="18" charset="0"/>
+                      </a:endParaRPr>
+                    </a:p>
+                  </a:txBody>
+                  <a:tcPr marL="53270" marR="53270" marT="0" marB="0"/>
+                </a:tc>
+                <a:tc>
+                  <a:txBody>
+                    <a:bodyPr/>
+                    <a:lstStyle/>
+                    <a:p>
+                      <a:pPr marL="90170" marR="0">
+                        <a:spcBef>
+                          <a:spcPts val="0"/>
+                        </a:spcBef>
+                        <a:spcAft>
+                          <a:spcPts val="0"/>
+                        </a:spcAft>
+                      </a:pPr>
+                      <a:r>
+                        <a:rPr lang="en-US" sz="1400" dirty="0">
+                          <a:effectLst/>
+                          <a:latin typeface="Times New Roman" panose="02020603050405020304" pitchFamily="18" charset="0"/>
+                          <a:cs typeface="Times New Roman" panose="02020603050405020304" pitchFamily="18" charset="0"/>
+                        </a:rPr>
+                        <a:t>Supported research project practical time</a:t>
+                      </a:r>
+                      <a:endParaRPr lang="en-US" sz="1400" dirty="0">
+                        <a:solidFill>
+                          <a:srgbClr val="000000"/>
+                        </a:solidFill>
+                        <a:effectLst/>
+                        <a:latin typeface="Times New Roman" panose="02020603050405020304" pitchFamily="18" charset="0"/>
+                        <a:ea typeface="Calibri" panose="020F0502020204030204" pitchFamily="34" charset="0"/>
+                        <a:cs typeface="Times New Roman" panose="02020603050405020304" pitchFamily="18" charset="0"/>
+                      </a:endParaRPr>
+                    </a:p>
+                  </a:txBody>
+                  <a:tcPr marL="53270" marR="53270" marT="0" marB="0" anchor="ctr"/>
+                </a:tc>
+                <a:tc>
+                  <a:txBody>
+                    <a:bodyPr/>
+                    <a:lstStyle/>
+                    <a:p>
+                      <a:pPr marL="90170" marR="0" algn="ctr">
+                        <a:spcBef>
+                          <a:spcPts val="0"/>
+                        </a:spcBef>
+                        <a:spcAft>
+                          <a:spcPts val="0"/>
+                        </a:spcAft>
+                      </a:pPr>
+                      <a:r>
+                        <a:rPr lang="en-US" sz="1400">
+                          <a:effectLst/>
+                          <a:latin typeface="Times New Roman" panose="02020603050405020304" pitchFamily="18" charset="0"/>
+                          <a:cs typeface="Times New Roman" panose="02020603050405020304" pitchFamily="18" charset="0"/>
+                        </a:rPr>
+                        <a:t>Coursework project</a:t>
+                      </a:r>
+                      <a:endParaRPr lang="en-US" sz="1400" dirty="0">
+                        <a:solidFill>
+                          <a:srgbClr val="000000"/>
+                        </a:solidFill>
+                        <a:effectLst/>
+                        <a:latin typeface="Times New Roman" panose="02020603050405020304" pitchFamily="18" charset="0"/>
+                        <a:ea typeface="Calibri" panose="020F0502020204030204" pitchFamily="34" charset="0"/>
+                        <a:cs typeface="Times New Roman" panose="02020603050405020304" pitchFamily="18" charset="0"/>
+                      </a:endParaRPr>
+                    </a:p>
+                  </a:txBody>
+                  <a:tcPr marL="53270" marR="53270" marT="0" marB="0" anchor="ctr"/>
+                </a:tc>
+                <a:extLst>
+                  <a:ext uri="{0D108BD9-81ED-4DB2-BD59-A6C34878D82A}">
+                    <a16:rowId xmlns:a16="http://schemas.microsoft.com/office/drawing/2014/main" val="3509286896"/>
+                  </a:ext>
+                </a:extLst>
+              </a:tr>
+              <a:tr h="428625">
+                <a:tc>
+                  <a:txBody>
+                    <a:bodyPr/>
+                    <a:lstStyle/>
+                    <a:p>
+                      <a:pPr marL="90170" marR="0" algn="ctr">
+                        <a:spcBef>
+                          <a:spcPts val="0"/>
+                        </a:spcBef>
+                        <a:spcAft>
+                          <a:spcPts val="0"/>
+                        </a:spcAft>
+                      </a:pPr>
+                      <a:r>
+                        <a:rPr lang="en-US" sz="1400" b="1" dirty="0">
+                          <a:effectLst/>
+                          <a:latin typeface="Times New Roman" panose="02020603050405020304" pitchFamily="18" charset="0"/>
+                          <a:cs typeface="Times New Roman" panose="02020603050405020304" pitchFamily="18" charset="0"/>
+                        </a:rPr>
+                        <a:t>Finals: </a:t>
+                      </a:r>
+                    </a:p>
+                    <a:p>
+                      <a:pPr marL="90170" marR="0" algn="ctr">
+                        <a:spcBef>
+                          <a:spcPts val="0"/>
+                        </a:spcBef>
+                        <a:spcAft>
+                          <a:spcPts val="0"/>
+                        </a:spcAft>
+                      </a:pPr>
+                      <a:r>
+                        <a:rPr lang="en-US" sz="1400" b="1" dirty="0">
+                          <a:effectLst/>
+                          <a:latin typeface="Times New Roman" panose="02020603050405020304" pitchFamily="18" charset="0"/>
+                          <a:cs typeface="Times New Roman" panose="02020603050405020304" pitchFamily="18" charset="0"/>
+                        </a:rPr>
+                        <a:t>May 9</a:t>
+                      </a:r>
+                      <a:r>
+                        <a:rPr lang="en-US" sz="1400" b="1" baseline="30000" dirty="0">
+                          <a:effectLst/>
+                          <a:latin typeface="Times New Roman" panose="02020603050405020304" pitchFamily="18" charset="0"/>
+                          <a:cs typeface="Times New Roman" panose="02020603050405020304" pitchFamily="18" charset="0"/>
+                        </a:rPr>
+                        <a:t>th</a:t>
+                      </a:r>
+                      <a:r>
+                        <a:rPr lang="en-US" sz="1400" b="1" dirty="0">
+                          <a:effectLst/>
+                          <a:latin typeface="Times New Roman" panose="02020603050405020304" pitchFamily="18" charset="0"/>
+                          <a:cs typeface="Times New Roman" panose="02020603050405020304" pitchFamily="18" charset="0"/>
+                        </a:rPr>
+                        <a:t> </a:t>
+                      </a:r>
+                      <a:endParaRPr lang="en-US" sz="1400" b="1" dirty="0">
+                        <a:solidFill>
+                          <a:srgbClr val="000000"/>
+                        </a:solidFill>
+                        <a:effectLst/>
+                        <a:latin typeface="Times New Roman" panose="02020603050405020304" pitchFamily="18" charset="0"/>
+                        <a:ea typeface="Calibri" panose="020F0502020204030204" pitchFamily="34" charset="0"/>
+                        <a:cs typeface="Times New Roman" panose="02020603050405020304" pitchFamily="18" charset="0"/>
+                      </a:endParaRPr>
+                    </a:p>
+                  </a:txBody>
+                  <a:tcPr marL="53270" marR="53270" marT="0" marB="0"/>
+                </a:tc>
+                <a:tc>
+                  <a:txBody>
+                    <a:bodyPr/>
+                    <a:lstStyle/>
+                    <a:p>
+                      <a:pPr marL="90170" marR="0">
+                        <a:spcBef>
+                          <a:spcPts val="0"/>
+                        </a:spcBef>
+                        <a:spcAft>
+                          <a:spcPts val="0"/>
+                        </a:spcAft>
+                      </a:pPr>
+                      <a:r>
+                        <a:rPr lang="en-US" sz="1400" dirty="0">
+                          <a:effectLst/>
+                          <a:latin typeface="Times New Roman" panose="02020603050405020304" pitchFamily="18" charset="0"/>
+                          <a:cs typeface="Times New Roman" panose="02020603050405020304" pitchFamily="18" charset="0"/>
+                        </a:rPr>
+                        <a:t>Coursework submission </a:t>
+                      </a:r>
+                      <a:endParaRPr lang="en-US" sz="1400" dirty="0">
+                        <a:solidFill>
+                          <a:srgbClr val="000000"/>
+                        </a:solidFill>
+                        <a:effectLst/>
+                        <a:latin typeface="Times New Roman" panose="02020603050405020304" pitchFamily="18" charset="0"/>
+                        <a:ea typeface="Calibri" panose="020F0502020204030204" pitchFamily="34" charset="0"/>
+                        <a:cs typeface="Times New Roman" panose="02020603050405020304" pitchFamily="18" charset="0"/>
+                      </a:endParaRPr>
+                    </a:p>
+                  </a:txBody>
+                  <a:tcPr marL="53270" marR="53270" marT="0" marB="0" anchor="ctr"/>
+                </a:tc>
+                <a:tc>
+                  <a:txBody>
+                    <a:bodyPr/>
+                    <a:lstStyle/>
+                    <a:p>
+                      <a:pPr marL="90170" marR="0" algn="ctr">
+                        <a:spcBef>
+                          <a:spcPts val="0"/>
+                        </a:spcBef>
+                        <a:spcAft>
+                          <a:spcPts val="0"/>
+                        </a:spcAft>
+                      </a:pPr>
+                      <a:r>
+                        <a:rPr lang="en-US" sz="1400" dirty="0">
+                          <a:effectLst/>
+                          <a:latin typeface="Times New Roman" panose="02020603050405020304" pitchFamily="18" charset="0"/>
+                          <a:cs typeface="Times New Roman" panose="02020603050405020304" pitchFamily="18" charset="0"/>
+                        </a:rPr>
+                        <a:t>Coursework project</a:t>
+                      </a:r>
+                      <a:endParaRPr lang="en-US" sz="1400" dirty="0">
+                        <a:solidFill>
+                          <a:srgbClr val="000000"/>
+                        </a:solidFill>
+                        <a:effectLst/>
+                        <a:latin typeface="Times New Roman" panose="02020603050405020304" pitchFamily="18" charset="0"/>
+                        <a:ea typeface="Calibri" panose="020F0502020204030204" pitchFamily="34" charset="0"/>
+                        <a:cs typeface="Times New Roman" panose="02020603050405020304" pitchFamily="18" charset="0"/>
+                      </a:endParaRPr>
+                    </a:p>
+                  </a:txBody>
+                  <a:tcPr marL="53270" marR="53270" marT="0" marB="0" anchor="ctr"/>
+                </a:tc>
+                <a:extLst>
+                  <a:ext uri="{0D108BD9-81ED-4DB2-BD59-A6C34878D82A}">
+                    <a16:rowId xmlns:a16="http://schemas.microsoft.com/office/drawing/2014/main" val="3651470356"/>
+                  </a:ext>
+                </a:extLst>
+              </a:tr>
+            </a:tbl>
+          </a:graphicData>
+        </a:graphic>
+      </p:graphicFrame>
+    </p:spTree>
+    <p:extLst>
+      <p:ext uri="{BB962C8B-B14F-4D97-AF65-F5344CB8AC3E}">
+        <p14:creationId xmlns:p14="http://schemas.microsoft.com/office/powerpoint/2010/main" val="4251559109"/>
+      </p:ext>
+    </p:extLst>
+  </p:cSld>
+  <p:clrMapOvr>
+    <a:masterClrMapping/>
+  </p:clrMapOvr>
+</p:sld>
+</file>
+
+<file path=ppt/slides/slide2.xml><?xml version="1.0" encoding="utf-8"?>
+<p:sld xmlns:a="http://schemas.openxmlformats.org/drawingml/2006/main" xmlns:r="http://schemas.openxmlformats.org/officeDocument/2006/relationships" xmlns:p="http://schemas.openxmlformats.org/presentationml/2006/main">
+  <p:cSld>
+    <p:bg>
+      <p:bgPr>
+        <a:solidFill>
+          <a:schemeClr val="bg1">
+            <a:lumMod val="95000"/>
+          </a:schemeClr>
+        </a:solidFill>
+        <a:effectLst/>
+      </p:bgPr>
+    </p:bg>
+    <p:spTree>
+      <p:nvGrpSpPr>
+        <p:cNvPr id="1" name=""/>
+        <p:cNvGrpSpPr/>
+        <p:nvPr/>
+      </p:nvGrpSpPr>
+      <p:grpSpPr>
+        <a:xfrm>
+          <a:off x="0" y="0"/>
+          <a:ext cx="0" cy="0"/>
+          <a:chOff x="0" y="0"/>
+          <a:chExt cx="0" cy="0"/>
+        </a:xfrm>
+      </p:grpSpPr>
+      <p:graphicFrame>
+        <p:nvGraphicFramePr>
+          <p:cNvPr id="4" name="Table 3">
+            <a:extLst>
+              <a:ext uri="{FF2B5EF4-FFF2-40B4-BE49-F238E27FC236}">
+                <a16:creationId xmlns:a16="http://schemas.microsoft.com/office/drawing/2014/main" id="{D39CC776-B9E2-A542-BC9C-74AEFDF04973}"/>
+              </a:ext>
+            </a:extLst>
+          </p:cNvPr>
+          <p:cNvGraphicFramePr>
+            <a:graphicFrameLocks noGrp="1"/>
+          </p:cNvGraphicFramePr>
+          <p:nvPr>
+            <p:extLst>
+              <p:ext uri="{D42A27DB-BD31-4B8C-83A1-F6EECF244321}">
+                <p14:modId xmlns:p14="http://schemas.microsoft.com/office/powerpoint/2010/main" val="2368488613"/>
               </p:ext>
             </p:extLst>
           </p:nvPr>
@@ -3709,29 +6374,7 @@
                           <a:ea typeface="Calibri" panose="020F0502020204030204" pitchFamily="34" charset="0"/>
                           <a:cs typeface="Times New Roman" panose="02020603050405020304" pitchFamily="18" charset="0"/>
                         </a:rPr>
-                        <a:t>Introduction to feature extraction</a:t>
-                      </a:r>
-                    </a:p>
-                    <a:p>
-                      <a:pPr marL="90170" marR="0">
-                        <a:spcBef>
-                          <a:spcPts val="0"/>
-                        </a:spcBef>
-                        <a:spcAft>
-                          <a:spcPts val="0"/>
-                        </a:spcAft>
-                      </a:pPr>
-                      <a:r>
-                        <a:rPr lang="en-US" sz="1400" dirty="0">
-                          <a:solidFill>
-                            <a:srgbClr val="000000"/>
-                          </a:solidFill>
-                          <a:effectLst/>
-                          <a:latin typeface="Times New Roman" panose="02020603050405020304" pitchFamily="18" charset="0"/>
-                          <a:ea typeface="Calibri" panose="020F0502020204030204" pitchFamily="34" charset="0"/>
-                          <a:cs typeface="Times New Roman" panose="02020603050405020304" pitchFamily="18" charset="0"/>
-                        </a:rPr>
-                        <a:t>(via </a:t>
+                        <a:t>Reading and writing multiband images (Part 1). Image metadata. Compression. (via </a:t>
                       </a:r>
                       <a:r>
                         <a:rPr lang="en-US" sz="1400" dirty="0" err="1">
@@ -3933,39 +6576,16 @@
                       </a:pPr>
                       <a:r>
                         <a:rPr lang="en-US" sz="1400" dirty="0">
-                          <a:effectLst/>
-                          <a:latin typeface="Times New Roman" panose="02020603050405020304" pitchFamily="18" charset="0"/>
-                          <a:cs typeface="Times New Roman" panose="02020603050405020304" pitchFamily="18" charset="0"/>
-                        </a:rPr>
-                        <a:t>Introduction to the OpenCV  </a:t>
-                      </a:r>
-                    </a:p>
-                    <a:p>
-                      <a:pPr marL="90170" marR="0">
-                        <a:spcBef>
-                          <a:spcPts val="0"/>
-                        </a:spcBef>
-                        <a:spcAft>
-                          <a:spcPts val="0"/>
-                        </a:spcAft>
-                      </a:pPr>
-                      <a:r>
-                        <a:rPr lang="en-US" sz="1400" dirty="0">
-                          <a:effectLst/>
-                          <a:latin typeface="Times New Roman" panose="02020603050405020304" pitchFamily="18" charset="0"/>
-                          <a:cs typeface="Times New Roman" panose="02020603050405020304" pitchFamily="18" charset="0"/>
-                        </a:rPr>
-                        <a:t>(Reading, writing, basic core operations etc.)</a:t>
-                      </a:r>
-                      <a:endParaRPr lang="en-US" sz="1400" dirty="0">
-                        <a:solidFill>
-                          <a:srgbClr val="000000"/>
-                        </a:solidFill>
-                        <a:effectLst/>
-                        <a:latin typeface="Times New Roman" panose="02020603050405020304" pitchFamily="18" charset="0"/>
-                        <a:ea typeface="Calibri" panose="020F0502020204030204" pitchFamily="34" charset="0"/>
-                        <a:cs typeface="Times New Roman" panose="02020603050405020304" pitchFamily="18" charset="0"/>
-                      </a:endParaRPr>
+                          <a:solidFill>
+                            <a:srgbClr val="000000"/>
+                          </a:solidFill>
+                          <a:effectLst/>
+                          <a:latin typeface="Times New Roman" panose="02020603050405020304" pitchFamily="18" charset="0"/>
+                          <a:ea typeface="Calibri" panose="020F0502020204030204" pitchFamily="34" charset="0"/>
+                          <a:cs typeface="Times New Roman" panose="02020603050405020304" pitchFamily="18" charset="0"/>
+                        </a:rPr>
+                        <a:t>Reading and writing multiband images (Part 2). Image visualization. Git version control. </a:t>
+                      </a:r>
                     </a:p>
                   </a:txBody>
                   <a:tcPr marL="53270" marR="53270" marT="0" marB="0" anchor="ctr"/>
@@ -4094,55 +6714,16 @@
                       </a:pPr>
                       <a:r>
                         <a:rPr lang="en-US" sz="1400" dirty="0">
-                          <a:effectLst/>
-                          <a:latin typeface="Times New Roman" panose="02020603050405020304" pitchFamily="18" charset="0"/>
-                          <a:cs typeface="Times New Roman" panose="02020603050405020304" pitchFamily="18" charset="0"/>
-                        </a:rPr>
-                        <a:t>Image processing in OpenCV</a:t>
-                      </a:r>
-                    </a:p>
-                    <a:p>
-                      <a:pPr marL="90170" marR="0">
-                        <a:spcBef>
-                          <a:spcPts val="0"/>
-                        </a:spcBef>
-                        <a:spcAft>
-                          <a:spcPts val="0"/>
-                        </a:spcAft>
-                      </a:pPr>
-                      <a:r>
-                        <a:rPr lang="en-US" sz="1400" dirty="0">
-                          <a:effectLst/>
-                          <a:latin typeface="Times New Roman" panose="02020603050405020304" pitchFamily="18" charset="0"/>
-                          <a:cs typeface="Times New Roman" panose="02020603050405020304" pitchFamily="18" charset="0"/>
-                        </a:rPr>
-                        <a:t>(</a:t>
-                      </a:r>
-                      <a:r>
-                        <a:rPr lang="en-US" sz="1400" dirty="0" err="1">
-                          <a:effectLst/>
-                          <a:latin typeface="Times New Roman" panose="02020603050405020304" pitchFamily="18" charset="0"/>
-                          <a:cs typeface="Times New Roman" panose="02020603050405020304" pitchFamily="18" charset="0"/>
-                        </a:rPr>
-                        <a:t>Colorspaces</a:t>
-                      </a:r>
-                      <a:r>
-                        <a:rPr lang="en-US" sz="1400" dirty="0">
-                          <a:effectLst/>
-                          <a:latin typeface="Times New Roman" panose="02020603050405020304" pitchFamily="18" charset="0"/>
-                          <a:cs typeface="Times New Roman" panose="02020603050405020304" pitchFamily="18" charset="0"/>
-                        </a:rPr>
-                        <a:t>, transformations, histograms etc.)</a:t>
-                      </a:r>
-                      <a:endParaRPr lang="en-US" sz="1400" dirty="0">
-                        <a:solidFill>
-                          <a:srgbClr val="000000"/>
-                        </a:solidFill>
-                        <a:effectLst/>
-                        <a:latin typeface="Times New Roman" panose="02020603050405020304" pitchFamily="18" charset="0"/>
-                        <a:ea typeface="Calibri" panose="020F0502020204030204" pitchFamily="34" charset="0"/>
-                        <a:cs typeface="Times New Roman" panose="02020603050405020304" pitchFamily="18" charset="0"/>
-                      </a:endParaRPr>
+                          <a:solidFill>
+                            <a:srgbClr val="000000"/>
+                          </a:solidFill>
+                          <a:effectLst/>
+                          <a:latin typeface="Times New Roman" panose="02020603050405020304" pitchFamily="18" charset="0"/>
+                          <a:ea typeface="Calibri" panose="020F0502020204030204" pitchFamily="34" charset="0"/>
+                          <a:cs typeface="Times New Roman" panose="02020603050405020304" pitchFamily="18" charset="0"/>
+                        </a:rPr>
+                        <a:t>Clipping single images. Looping and clipping over multiple images. </a:t>
+                      </a:r>
                     </a:p>
                   </a:txBody>
                   <a:tcPr marL="53270" marR="53270" marT="0" marB="0" anchor="ctr"/>
@@ -4272,39 +6853,16 @@
                       </a:pPr>
                       <a:r>
                         <a:rPr lang="en-US" sz="1400" dirty="0">
-                          <a:effectLst/>
-                          <a:latin typeface="Times New Roman" panose="02020603050405020304" pitchFamily="18" charset="0"/>
-                          <a:cs typeface="Times New Roman" panose="02020603050405020304" pitchFamily="18" charset="0"/>
-                        </a:rPr>
-                        <a:t>Feature/object detection in OpenCV</a:t>
-                      </a:r>
-                    </a:p>
-                    <a:p>
-                      <a:pPr marL="90170" marR="0">
-                        <a:spcBef>
-                          <a:spcPts val="0"/>
-                        </a:spcBef>
-                        <a:spcAft>
-                          <a:spcPts val="0"/>
-                        </a:spcAft>
-                      </a:pPr>
-                      <a:r>
-                        <a:rPr lang="en-US" sz="1400" dirty="0">
-                          <a:effectLst/>
-                          <a:latin typeface="Times New Roman" panose="02020603050405020304" pitchFamily="18" charset="0"/>
-                          <a:cs typeface="Times New Roman" panose="02020603050405020304" pitchFamily="18" charset="0"/>
-                        </a:rPr>
-                        <a:t>(Basic feature detection examples and extraction)</a:t>
-                      </a:r>
-                      <a:endParaRPr lang="en-US" sz="1400" dirty="0">
-                        <a:solidFill>
-                          <a:srgbClr val="000000"/>
-                        </a:solidFill>
-                        <a:effectLst/>
-                        <a:latin typeface="Times New Roman" panose="02020603050405020304" pitchFamily="18" charset="0"/>
-                        <a:ea typeface="Calibri" panose="020F0502020204030204" pitchFamily="34" charset="0"/>
-                        <a:cs typeface="Times New Roman" panose="02020603050405020304" pitchFamily="18" charset="0"/>
-                      </a:endParaRPr>
+                          <a:solidFill>
+                            <a:srgbClr val="000000"/>
+                          </a:solidFill>
+                          <a:effectLst/>
+                          <a:latin typeface="Times New Roman" panose="02020603050405020304" pitchFamily="18" charset="0"/>
+                          <a:ea typeface="Calibri" panose="020F0502020204030204" pitchFamily="34" charset="0"/>
+                          <a:cs typeface="Times New Roman" panose="02020603050405020304" pitchFamily="18" charset="0"/>
+                        </a:rPr>
+                        <a:t>Histograms and panel plots (Matplotlib)</a:t>
+                      </a:r>
                     </a:p>
                   </a:txBody>
                   <a:tcPr marL="53270" marR="53270" marT="0" marB="0" anchor="ctr"/>
@@ -4523,7 +7081,25 @@
                           <a:latin typeface="Times New Roman" panose="02020603050405020304" pitchFamily="18" charset="0"/>
                           <a:cs typeface="Times New Roman" panose="02020603050405020304" pitchFamily="18" charset="0"/>
                         </a:rPr>
-                        <a:t>JavaScript for total beginners</a:t>
+                        <a:t>Introduction to the OpenCV  </a:t>
+                      </a:r>
+                    </a:p>
+                    <a:p>
+                      <a:pPr marL="90170" marR="0">
+                        <a:spcBef>
+                          <a:spcPts val="0"/>
+                        </a:spcBef>
+                        <a:spcAft>
+                          <a:spcPts val="0"/>
+                        </a:spcAft>
+                      </a:pPr>
+                      <a:r>
+                        <a:rPr lang="en-US" sz="1400" dirty="0">
+                          <a:effectLst/>
+                          <a:latin typeface="Times New Roman" panose="02020603050405020304" pitchFamily="18" charset="0"/>
+                          <a:cs typeface="Times New Roman" panose="02020603050405020304" pitchFamily="18" charset="0"/>
+                        </a:rPr>
+                        <a:t>(Reading, writing, basic core operations etc.)</a:t>
                       </a:r>
                       <a:endParaRPr lang="en-US" sz="1400" dirty="0">
                         <a:solidFill>
@@ -4667,7 +7243,7 @@
                           <a:latin typeface="Times New Roman" panose="02020603050405020304" pitchFamily="18" charset="0"/>
                           <a:cs typeface="Times New Roman" panose="02020603050405020304" pitchFamily="18" charset="0"/>
                         </a:rPr>
-                        <a:t>Introduction to Google Earth Engine</a:t>
+                        <a:t>Image processing in OpenCV</a:t>
                       </a:r>
                     </a:p>
                     <a:p>
@@ -4685,7 +7261,23 @@
                           <a:latin typeface="Times New Roman" panose="02020603050405020304" pitchFamily="18" charset="0"/>
                           <a:cs typeface="Times New Roman" panose="02020603050405020304" pitchFamily="18" charset="0"/>
                         </a:rPr>
-                        <a:t>(Interface, data catalogue, geospatial data import and visualization etc.)</a:t>
+                        <a:t>(</a:t>
+                      </a:r>
+                      <a:r>
+                        <a:rPr lang="en-US" sz="1400" dirty="0" err="1">
+                          <a:effectLst/>
+                          <a:latin typeface="Times New Roman" panose="02020603050405020304" pitchFamily="18" charset="0"/>
+                          <a:cs typeface="Times New Roman" panose="02020603050405020304" pitchFamily="18" charset="0"/>
+                        </a:rPr>
+                        <a:t>Colorspaces</a:t>
+                      </a:r>
+                      <a:r>
+                        <a:rPr lang="en-US" sz="1400" dirty="0">
+                          <a:effectLst/>
+                          <a:latin typeface="Times New Roman" panose="02020603050405020304" pitchFamily="18" charset="0"/>
+                          <a:cs typeface="Times New Roman" panose="02020603050405020304" pitchFamily="18" charset="0"/>
+                        </a:rPr>
+                        <a:t>, transformations, histograms etc.)</a:t>
                       </a:r>
                       <a:endParaRPr lang="en-US" sz="1400" dirty="0">
                         <a:solidFill>
@@ -4828,22 +7420,25 @@
                           <a:latin typeface="Times New Roman" panose="02020603050405020304" pitchFamily="18" charset="0"/>
                           <a:cs typeface="Times New Roman" panose="02020603050405020304" pitchFamily="18" charset="0"/>
                         </a:rPr>
-                        <a:t>Working with vector and raster data collections in Google Earth Engine  </a:t>
-                      </a:r>
-                      <a:br>
+                        <a:t>Feature/object detection in OpenCV</a:t>
+                      </a:r>
+                    </a:p>
+                    <a:p>
+                      <a:pPr marL="90170" marR="0">
+                        <a:spcBef>
+                          <a:spcPts val="0"/>
+                        </a:spcBef>
+                        <a:spcAft>
+                          <a:spcPts val="0"/>
+                        </a:spcAft>
+                      </a:pPr>
+                      <a:r>
                         <a:rPr lang="en-US" sz="1400" dirty="0">
                           <a:effectLst/>
                           <a:latin typeface="Times New Roman" panose="02020603050405020304" pitchFamily="18" charset="0"/>
                           <a:cs typeface="Times New Roman" panose="02020603050405020304" pitchFamily="18" charset="0"/>
                         </a:rPr>
-                      </a:br>
-                      <a:r>
-                        <a:rPr lang="en-US" sz="1400" dirty="0">
-                          <a:effectLst/>
-                          <a:latin typeface="Times New Roman" panose="02020603050405020304" pitchFamily="18" charset="0"/>
-                          <a:cs typeface="Times New Roman" panose="02020603050405020304" pitchFamily="18" charset="0"/>
-                        </a:rPr>
-                        <a:t>(Filtering, reducers, clipping, operators, and loops in Google Earth Engine)</a:t>
+                        <a:t>(Basic feature detection examples and extraction)</a:t>
                       </a:r>
                       <a:endParaRPr lang="en-US" sz="1400" dirty="0">
                         <a:solidFill>
@@ -4972,29 +7567,6 @@
                           <a:spcPts val="0"/>
                         </a:spcAft>
                       </a:pPr>
-                      <a:r>
-                        <a:rPr lang="en-US" sz="1400" dirty="0">
-                          <a:effectLst/>
-                          <a:latin typeface="Times New Roman" panose="02020603050405020304" pitchFamily="18" charset="0"/>
-                          <a:cs typeface="Times New Roman" panose="02020603050405020304" pitchFamily="18" charset="0"/>
-                        </a:rPr>
-                        <a:t>Classification in Google Earth Engine</a:t>
-                      </a:r>
-                      <a:br>
-                        <a:rPr lang="en-US" sz="1400" dirty="0">
-                          <a:effectLst/>
-                          <a:latin typeface="Times New Roman" panose="02020603050405020304" pitchFamily="18" charset="0"/>
-                          <a:cs typeface="Times New Roman" panose="02020603050405020304" pitchFamily="18" charset="0"/>
-                        </a:rPr>
-                      </a:br>
-                      <a:r>
-                        <a:rPr lang="en-US" sz="1400" dirty="0">
-                          <a:effectLst/>
-                          <a:latin typeface="Times New Roman" panose="02020603050405020304" pitchFamily="18" charset="0"/>
-                          <a:cs typeface="Times New Roman" panose="02020603050405020304" pitchFamily="18" charset="0"/>
-                        </a:rPr>
-                        <a:t>(Unsupervised, and Supervised classification)</a:t>
-                      </a:r>
                       <a:endParaRPr lang="en-US" sz="1400" dirty="0">
                         <a:solidFill>
                           <a:srgbClr val="000000"/>
@@ -5619,7 +8191,7 @@
     </p:spTree>
     <p:extLst>
       <p:ext uri="{BB962C8B-B14F-4D97-AF65-F5344CB8AC3E}">
-        <p14:creationId xmlns:p14="http://schemas.microsoft.com/office/powerpoint/2010/main" val="4251559109"/>
+        <p14:creationId xmlns:p14="http://schemas.microsoft.com/office/powerpoint/2010/main" val="3392208958"/>
       </p:ext>
     </p:extLst>
   </p:cSld>

</xml_diff>

<commit_message>
Update syllabus and course project
</commit_message>
<xml_diff>
--- a/syllabus/format.pptx
+++ b/syllabus/format.pptx
@@ -254,7 +254,7 @@
           <a:p>
             <a:fld id="{48CDFCA1-6601-C943-AA02-89F09BE97B91}" type="datetimeFigureOut">
               <a:rPr lang="en-US" smtClean="0"/>
-              <a:t>4/7/2022</a:t>
+              <a:t>8/17/2022</a:t>
             </a:fld>
             <a:endParaRPr lang="en-US"/>
           </a:p>
@@ -424,7 +424,7 @@
           <a:p>
             <a:fld id="{48CDFCA1-6601-C943-AA02-89F09BE97B91}" type="datetimeFigureOut">
               <a:rPr lang="en-US" smtClean="0"/>
-              <a:t>4/7/2022</a:t>
+              <a:t>8/17/2022</a:t>
             </a:fld>
             <a:endParaRPr lang="en-US"/>
           </a:p>
@@ -604,7 +604,7 @@
           <a:p>
             <a:fld id="{48CDFCA1-6601-C943-AA02-89F09BE97B91}" type="datetimeFigureOut">
               <a:rPr lang="en-US" smtClean="0"/>
-              <a:t>4/7/2022</a:t>
+              <a:t>8/17/2022</a:t>
             </a:fld>
             <a:endParaRPr lang="en-US"/>
           </a:p>
@@ -774,7 +774,7 @@
           <a:p>
             <a:fld id="{48CDFCA1-6601-C943-AA02-89F09BE97B91}" type="datetimeFigureOut">
               <a:rPr lang="en-US" smtClean="0"/>
-              <a:t>4/7/2022</a:t>
+              <a:t>8/17/2022</a:t>
             </a:fld>
             <a:endParaRPr lang="en-US"/>
           </a:p>
@@ -1018,7 +1018,7 @@
           <a:p>
             <a:fld id="{48CDFCA1-6601-C943-AA02-89F09BE97B91}" type="datetimeFigureOut">
               <a:rPr lang="en-US" smtClean="0"/>
-              <a:t>4/7/2022</a:t>
+              <a:t>8/17/2022</a:t>
             </a:fld>
             <a:endParaRPr lang="en-US"/>
           </a:p>
@@ -1250,7 +1250,7 @@
           <a:p>
             <a:fld id="{48CDFCA1-6601-C943-AA02-89F09BE97B91}" type="datetimeFigureOut">
               <a:rPr lang="en-US" smtClean="0"/>
-              <a:t>4/7/2022</a:t>
+              <a:t>8/17/2022</a:t>
             </a:fld>
             <a:endParaRPr lang="en-US"/>
           </a:p>
@@ -1617,7 +1617,7 @@
           <a:p>
             <a:fld id="{48CDFCA1-6601-C943-AA02-89F09BE97B91}" type="datetimeFigureOut">
               <a:rPr lang="en-US" smtClean="0"/>
-              <a:t>4/7/2022</a:t>
+              <a:t>8/17/2022</a:t>
             </a:fld>
             <a:endParaRPr lang="en-US"/>
           </a:p>
@@ -1735,7 +1735,7 @@
           <a:p>
             <a:fld id="{48CDFCA1-6601-C943-AA02-89F09BE97B91}" type="datetimeFigureOut">
               <a:rPr lang="en-US" smtClean="0"/>
-              <a:t>4/7/2022</a:t>
+              <a:t>8/17/2022</a:t>
             </a:fld>
             <a:endParaRPr lang="en-US"/>
           </a:p>
@@ -1830,7 +1830,7 @@
           <a:p>
             <a:fld id="{48CDFCA1-6601-C943-AA02-89F09BE97B91}" type="datetimeFigureOut">
               <a:rPr lang="en-US" smtClean="0"/>
-              <a:t>4/7/2022</a:t>
+              <a:t>8/17/2022</a:t>
             </a:fld>
             <a:endParaRPr lang="en-US"/>
           </a:p>
@@ -2107,7 +2107,7 @@
           <a:p>
             <a:fld id="{48CDFCA1-6601-C943-AA02-89F09BE97B91}" type="datetimeFigureOut">
               <a:rPr lang="en-US" smtClean="0"/>
-              <a:t>4/7/2022</a:t>
+              <a:t>8/17/2022</a:t>
             </a:fld>
             <a:endParaRPr lang="en-US"/>
           </a:p>
@@ -2364,7 +2364,7 @@
           <a:p>
             <a:fld id="{48CDFCA1-6601-C943-AA02-89F09BE97B91}" type="datetimeFigureOut">
               <a:rPr lang="en-US" smtClean="0"/>
-              <a:t>4/7/2022</a:t>
+              <a:t>8/17/2022</a:t>
             </a:fld>
             <a:endParaRPr lang="en-US"/>
           </a:p>
@@ -2577,7 +2577,7 @@
           <a:p>
             <a:fld id="{48CDFCA1-6601-C943-AA02-89F09BE97B91}" type="datetimeFigureOut">
               <a:rPr lang="en-US" smtClean="0"/>
-              <a:t>4/7/2022</a:t>
+              <a:t>8/17/2022</a:t>
             </a:fld>
             <a:endParaRPr lang="en-US"/>
           </a:p>
@@ -3007,14 +3007,14 @@
           <p:nvPr>
             <p:extLst>
               <p:ext uri="{D42A27DB-BD31-4B8C-83A1-F6EECF244321}">
-                <p14:modId xmlns:p14="http://schemas.microsoft.com/office/powerpoint/2010/main" val="1165769752"/>
+                <p14:modId xmlns:p14="http://schemas.microsoft.com/office/powerpoint/2010/main" val="979568454"/>
               </p:ext>
             </p:extLst>
           </p:nvPr>
         </p:nvGraphicFramePr>
         <p:xfrm>
           <a:off x="0" y="0"/>
-          <a:ext cx="9144002" cy="6858001"/>
+          <a:ext cx="9144002" cy="6855365"/>
         </p:xfrm>
         <a:graphic>
           <a:graphicData uri="http://schemas.openxmlformats.org/drawingml/2006/table">
@@ -3045,7 +3045,7 @@
                   </a:extLst>
                 </a:gridCol>
               </a:tblGrid>
-              <a:tr h="214313">
+              <a:tr h="208368">
                 <a:tc>
                   <a:txBody>
                     <a:bodyPr/>
@@ -3154,7 +3154,7 @@
                   </a:ext>
                 </a:extLst>
               </a:tr>
-              <a:tr h="428625">
+              <a:tr h="416736">
                 <a:tc>
                   <a:txBody>
                     <a:bodyPr/>
@@ -3192,7 +3192,7 @@
                           <a:latin typeface="Times New Roman" panose="02020603050405020304" pitchFamily="18" charset="0"/>
                           <a:cs typeface="Times New Roman" panose="02020603050405020304" pitchFamily="18" charset="0"/>
                         </a:rPr>
-                        <a:t>Jan 24</a:t>
+                        <a:t>Aug 22</a:t>
                       </a:r>
                       <a:r>
                         <a:rPr lang="en-US" sz="1400" b="1" baseline="30000" dirty="0">
@@ -3200,7 +3200,15 @@
                           <a:latin typeface="Times New Roman" panose="02020603050405020304" pitchFamily="18" charset="0"/>
                           <a:cs typeface="Times New Roman" panose="02020603050405020304" pitchFamily="18" charset="0"/>
                         </a:rPr>
-                        <a:t>th</a:t>
+                        <a:t>nd</a:t>
+                      </a:r>
+                      <a:r>
+                        <a:rPr lang="en-US" sz="1400" b="1" dirty="0">
+                          <a:effectLst/>
+                          <a:latin typeface="Times New Roman" panose="02020603050405020304" pitchFamily="18" charset="0"/>
+                          <a:cs typeface="Times New Roman" panose="02020603050405020304" pitchFamily="18" charset="0"/>
+                        </a:rPr>
+                        <a:t> </a:t>
                       </a:r>
                       <a:endParaRPr lang="en-US" sz="1400" b="1" dirty="0">
                         <a:solidFill>
@@ -3234,7 +3242,7 @@
                           <a:latin typeface="Times New Roman" panose="02020603050405020304" pitchFamily="18" charset="0"/>
                           <a:cs typeface="Times New Roman" panose="02020603050405020304" pitchFamily="18" charset="0"/>
                         </a:rPr>
-                        <a:t>Introduction and course overview</a:t>
+                        <a:t>Introduction and course overview.</a:t>
                       </a:r>
                     </a:p>
                     <a:p>
@@ -3252,7 +3260,7 @@
                           <a:latin typeface="Times New Roman" panose="02020603050405020304" pitchFamily="18" charset="0"/>
                           <a:cs typeface="Times New Roman" panose="02020603050405020304" pitchFamily="18" charset="0"/>
                         </a:rPr>
-                        <a:t>Installing Anaconda + </a:t>
+                        <a:t>Getting started with Google </a:t>
                       </a:r>
                       <a:r>
                         <a:rPr lang="en-US" sz="1400" dirty="0" err="1">
@@ -3260,7 +3268,7 @@
                           <a:latin typeface="Times New Roman" panose="02020603050405020304" pitchFamily="18" charset="0"/>
                           <a:cs typeface="Times New Roman" panose="02020603050405020304" pitchFamily="18" charset="0"/>
                         </a:rPr>
-                        <a:t>Jupyter</a:t>
+                        <a:t>Colab</a:t>
                       </a:r>
                       <a:r>
                         <a:rPr lang="en-US" sz="1400" dirty="0">
@@ -3268,7 +3276,7 @@
                           <a:latin typeface="Times New Roman" panose="02020603050405020304" pitchFamily="18" charset="0"/>
                           <a:cs typeface="Times New Roman" panose="02020603050405020304" pitchFamily="18" charset="0"/>
                         </a:rPr>
-                        <a:t> notebooks.</a:t>
+                        <a:t>.</a:t>
                       </a:r>
                       <a:endParaRPr lang="en-US" sz="1400" dirty="0">
                         <a:solidFill>
@@ -3296,14 +3304,6 @@
                           <a:spcPts val="0"/>
                         </a:spcAft>
                       </a:pPr>
-                      <a:r>
-                        <a:rPr lang="en-US" sz="1400" dirty="0">
-                          <a:effectLst/>
-                          <a:latin typeface="Times New Roman" panose="02020603050405020304" pitchFamily="18" charset="0"/>
-                          <a:cs typeface="Times New Roman" panose="02020603050405020304" pitchFamily="18" charset="0"/>
-                        </a:rPr>
-                        <a:t>Assignment 1</a:t>
-                      </a:r>
                       <a:endParaRPr lang="en-US" sz="1400" dirty="0">
                         <a:solidFill>
                           <a:srgbClr val="000000"/>
@@ -3323,7 +3323,7 @@
                   </a:ext>
                 </a:extLst>
               </a:tr>
-              <a:tr h="428625">
+              <a:tr h="416736">
                 <a:tc>
                   <a:txBody>
                     <a:bodyPr/>
@@ -3361,7 +3361,7 @@
                           <a:latin typeface="Times New Roman" panose="02020603050405020304" pitchFamily="18" charset="0"/>
                           <a:cs typeface="Times New Roman" panose="02020603050405020304" pitchFamily="18" charset="0"/>
                         </a:rPr>
-                        <a:t>Jan 31</a:t>
+                        <a:t>Aug 29</a:t>
                       </a:r>
                       <a:r>
                         <a:rPr lang="en-US" sz="1400" b="1" baseline="30000" dirty="0">
@@ -3369,7 +3369,7 @@
                           <a:latin typeface="Times New Roman" panose="02020603050405020304" pitchFamily="18" charset="0"/>
                           <a:cs typeface="Times New Roman" panose="02020603050405020304" pitchFamily="18" charset="0"/>
                         </a:rPr>
-                        <a:t>st</a:t>
+                        <a:t>th</a:t>
                       </a:r>
                       <a:r>
                         <a:rPr lang="en-US" sz="1400" b="1" dirty="0">
@@ -3411,7 +3411,7 @@
                           <a:latin typeface="Times New Roman" panose="02020603050405020304" pitchFamily="18" charset="0"/>
                           <a:cs typeface="Times New Roman" panose="02020603050405020304" pitchFamily="18" charset="0"/>
                         </a:rPr>
-                        <a:t>Python for beginners (file paths, operators, functions, loops etc.).</a:t>
+                        <a:t>Python for beginners (packages, data structures, file paths, operators, functions, loops etc.).</a:t>
                       </a:r>
                       <a:endParaRPr lang="en-US" sz="1400" dirty="0">
                         <a:solidFill>
@@ -3445,7 +3445,7 @@
                           <a:latin typeface="Times New Roman" panose="02020603050405020304" pitchFamily="18" charset="0"/>
                           <a:cs typeface="Times New Roman" panose="02020603050405020304" pitchFamily="18" charset="0"/>
                         </a:rPr>
-                        <a:t>Assignment 2</a:t>
+                        <a:t>Assignment 1</a:t>
                       </a:r>
                       <a:endParaRPr lang="en-US" sz="1400" dirty="0">
                         <a:solidFill>
@@ -3466,7 +3466,7 @@
                   </a:ext>
                 </a:extLst>
               </a:tr>
-              <a:tr h="428625">
+              <a:tr h="416736">
                 <a:tc>
                   <a:txBody>
                     <a:bodyPr/>
@@ -3504,7 +3504,7 @@
                           <a:latin typeface="Times New Roman" panose="02020603050405020304" pitchFamily="18" charset="0"/>
                           <a:cs typeface="Times New Roman" panose="02020603050405020304" pitchFamily="18" charset="0"/>
                         </a:rPr>
-                        <a:t>Feb 7</a:t>
+                        <a:t>Sept 5</a:t>
                       </a:r>
                       <a:r>
                         <a:rPr lang="en-US" sz="1400" b="1" baseline="30000" dirty="0">
@@ -3532,21 +3532,58 @@
                     <a:bodyPr/>
                     <a:lstStyle/>
                     <a:p>
-                      <a:pPr marL="90170" marR="0">
-                        <a:spcBef>
-                          <a:spcPts val="0"/>
-                        </a:spcBef>
-                        <a:spcAft>
-                          <a:spcPts val="0"/>
-                        </a:spcAft>
+                      <a:pPr marL="90170" marR="0" lvl="0" indent="0" algn="l" defTabSz="914400" rtl="0" eaLnBrk="1" fontAlgn="auto" latinLnBrk="0" hangingPunct="1">
+                        <a:lnSpc>
+                          <a:spcPct val="100000"/>
+                        </a:lnSpc>
+                        <a:spcBef>
+                          <a:spcPts val="0"/>
+                        </a:spcBef>
+                        <a:spcAft>
+                          <a:spcPts val="0"/>
+                        </a:spcAft>
+                        <a:buClrTx/>
+                        <a:buSzTx/>
+                        <a:buFontTx/>
+                        <a:buNone/>
+                        <a:tabLst/>
+                        <a:defRPr/>
                       </a:pPr>
                       <a:r>
                         <a:rPr lang="en-US" sz="1400" dirty="0">
-                          <a:effectLst/>
-                          <a:latin typeface="Times New Roman" panose="02020603050405020304" pitchFamily="18" charset="0"/>
-                          <a:cs typeface="Times New Roman" panose="02020603050405020304" pitchFamily="18" charset="0"/>
-                        </a:rPr>
-                        <a:t>Obtaining satellite imagery via API scripting.</a:t>
+                          <a:solidFill>
+                            <a:srgbClr val="000000"/>
+                          </a:solidFill>
+                          <a:effectLst/>
+                          <a:latin typeface="Times New Roman" panose="02020603050405020304" pitchFamily="18" charset="0"/>
+                          <a:ea typeface="Calibri" panose="020F0502020204030204" pitchFamily="34" charset="0"/>
+                          <a:cs typeface="Times New Roman" panose="02020603050405020304" pitchFamily="18" charset="0"/>
+                        </a:rPr>
+                        <a:t>What is an image? Metadata. Reading and writing multiband images. Compression. </a:t>
+                      </a:r>
+                      <a:r>
+                        <a:rPr lang="en-US" sz="1400" dirty="0">
+                          <a:effectLst/>
+                          <a:latin typeface="Times New Roman" panose="02020603050405020304" pitchFamily="18" charset="0"/>
+                          <a:cs typeface="Times New Roman" panose="02020603050405020304" pitchFamily="18" charset="0"/>
+                        </a:rPr>
+                        <a:t>(NB. Labor Day 5</a:t>
+                      </a:r>
+                      <a:r>
+                        <a:rPr lang="en-US" sz="1400" baseline="30000" dirty="0">
+                          <a:effectLst/>
+                          <a:latin typeface="Times New Roman" panose="02020603050405020304" pitchFamily="18" charset="0"/>
+                          <a:cs typeface="Times New Roman" panose="02020603050405020304" pitchFamily="18" charset="0"/>
+                        </a:rPr>
+                        <a:t>th</a:t>
+                      </a:r>
+                      <a:r>
+                        <a:rPr lang="en-US" sz="1400" dirty="0">
+                          <a:effectLst/>
+                          <a:latin typeface="Times New Roman" panose="02020603050405020304" pitchFamily="18" charset="0"/>
+                          <a:cs typeface="Times New Roman" panose="02020603050405020304" pitchFamily="18" charset="0"/>
+                        </a:rPr>
+                        <a:t> Sept: No Class)</a:t>
                       </a:r>
                       <a:endParaRPr lang="en-US" sz="1400" dirty="0">
                         <a:solidFill>
@@ -3576,16 +3613,21 @@
                       </a:pPr>
                       <a:r>
                         <a:rPr lang="en-US" sz="1400" dirty="0">
-                          <a:solidFill>
-                            <a:srgbClr val="000000"/>
-                          </a:solidFill>
-                          <a:effectLst/>
-                          <a:latin typeface="Times New Roman" panose="02020603050405020304" pitchFamily="18" charset="0"/>
-                          <a:ea typeface="Calibri" panose="020F0502020204030204" pitchFamily="34" charset="0"/>
-                          <a:cs typeface="Times New Roman" panose="02020603050405020304" pitchFamily="18" charset="0"/>
-                        </a:rPr>
-                        <a:t>-</a:t>
-                      </a:r>
+                          <a:effectLst/>
+                          <a:latin typeface="Times New Roman" panose="02020603050405020304" pitchFamily="18" charset="0"/>
+                          <a:cs typeface="Times New Roman" panose="02020603050405020304" pitchFamily="18" charset="0"/>
+                        </a:rPr>
+                        <a:t>Assignment 2</a:t>
+                      </a:r>
+                      <a:endParaRPr lang="en-US" sz="1400" dirty="0">
+                        <a:solidFill>
+                          <a:srgbClr val="000000"/>
+                        </a:solidFill>
+                        <a:effectLst/>
+                        <a:latin typeface="Times New Roman" panose="02020603050405020304" pitchFamily="18" charset="0"/>
+                        <a:ea typeface="Calibri" panose="020F0502020204030204" pitchFamily="34" charset="0"/>
+                        <a:cs typeface="Times New Roman" panose="02020603050405020304" pitchFamily="18" charset="0"/>
+                      </a:endParaRPr>
                     </a:p>
                   </a:txBody>
                   <a:tcPr marL="53270" marR="53270" marT="0" marB="0" anchor="ctr"/>
@@ -3596,7 +3638,7 @@
                   </a:ext>
                 </a:extLst>
               </a:tr>
-              <a:tr h="428625">
+              <a:tr h="454565">
                 <a:tc>
                   <a:txBody>
                     <a:bodyPr/>
@@ -3638,7 +3680,7 @@
                           <a:ea typeface="Calibri" panose="020F0502020204030204" pitchFamily="34" charset="0"/>
                           <a:cs typeface="Times New Roman" panose="02020603050405020304" pitchFamily="18" charset="0"/>
                         </a:rPr>
-                        <a:t>Feb 14</a:t>
+                        <a:t>Sept 12</a:t>
                       </a:r>
                       <a:r>
                         <a:rPr lang="en-US" sz="1400" b="1" baseline="30000" dirty="0">
@@ -3691,79 +3733,7 @@
                           <a:ea typeface="Calibri" panose="020F0502020204030204" pitchFamily="34" charset="0"/>
                           <a:cs typeface="Times New Roman" panose="02020603050405020304" pitchFamily="18" charset="0"/>
                         </a:rPr>
-                        <a:t>Image metadata. Reading and writing multiband images. Compression. (via </a:t>
-                      </a:r>
-                      <a:r>
-                        <a:rPr lang="en-US" sz="1400" dirty="0" err="1">
-                          <a:solidFill>
-                            <a:srgbClr val="000000"/>
-                          </a:solidFill>
-                          <a:effectLst/>
-                          <a:latin typeface="Times New Roman" panose="02020603050405020304" pitchFamily="18" charset="0"/>
-                          <a:ea typeface="Calibri" panose="020F0502020204030204" pitchFamily="34" charset="0"/>
-                          <a:cs typeface="Times New Roman" panose="02020603050405020304" pitchFamily="18" charset="0"/>
-                        </a:rPr>
-                        <a:t>numpy</a:t>
-                      </a:r>
-                      <a:r>
-                        <a:rPr lang="en-US" sz="1400" dirty="0">
-                          <a:solidFill>
-                            <a:srgbClr val="000000"/>
-                          </a:solidFill>
-                          <a:effectLst/>
-                          <a:latin typeface="Times New Roman" panose="02020603050405020304" pitchFamily="18" charset="0"/>
-                          <a:ea typeface="Calibri" panose="020F0502020204030204" pitchFamily="34" charset="0"/>
-                          <a:cs typeface="Times New Roman" panose="02020603050405020304" pitchFamily="18" charset="0"/>
-                        </a:rPr>
-                        <a:t>, </a:t>
-                      </a:r>
-                      <a:r>
-                        <a:rPr lang="en-US" sz="1400" dirty="0" err="1">
-                          <a:solidFill>
-                            <a:srgbClr val="000000"/>
-                          </a:solidFill>
-                          <a:effectLst/>
-                          <a:latin typeface="Times New Roman" panose="02020603050405020304" pitchFamily="18" charset="0"/>
-                          <a:ea typeface="Calibri" panose="020F0502020204030204" pitchFamily="34" charset="0"/>
-                          <a:cs typeface="Times New Roman" panose="02020603050405020304" pitchFamily="18" charset="0"/>
-                        </a:rPr>
-                        <a:t>rasterio</a:t>
-                      </a:r>
-                      <a:r>
-                        <a:rPr lang="en-US" sz="1400" dirty="0">
-                          <a:solidFill>
-                            <a:srgbClr val="000000"/>
-                          </a:solidFill>
-                          <a:effectLst/>
-                          <a:latin typeface="Times New Roman" panose="02020603050405020304" pitchFamily="18" charset="0"/>
-                          <a:ea typeface="Calibri" panose="020F0502020204030204" pitchFamily="34" charset="0"/>
-                          <a:cs typeface="Times New Roman" panose="02020603050405020304" pitchFamily="18" charset="0"/>
-                        </a:rPr>
-                        <a:t> and </a:t>
-                      </a:r>
-                      <a:r>
-                        <a:rPr lang="en-US" sz="1400" dirty="0" err="1">
-                          <a:solidFill>
-                            <a:srgbClr val="000000"/>
-                          </a:solidFill>
-                          <a:effectLst/>
-                          <a:latin typeface="Times New Roman" panose="02020603050405020304" pitchFamily="18" charset="0"/>
-                          <a:ea typeface="Calibri" panose="020F0502020204030204" pitchFamily="34" charset="0"/>
-                          <a:cs typeface="Times New Roman" panose="02020603050405020304" pitchFamily="18" charset="0"/>
-                        </a:rPr>
-                        <a:t>geopandas</a:t>
-                      </a:r>
-                      <a:r>
-                        <a:rPr lang="en-US" sz="1400" dirty="0">
-                          <a:solidFill>
-                            <a:srgbClr val="000000"/>
-                          </a:solidFill>
-                          <a:effectLst/>
-                          <a:latin typeface="Times New Roman" panose="02020603050405020304" pitchFamily="18" charset="0"/>
-                          <a:ea typeface="Calibri" panose="020F0502020204030204" pitchFamily="34" charset="0"/>
-                          <a:cs typeface="Times New Roman" panose="02020603050405020304" pitchFamily="18" charset="0"/>
-                        </a:rPr>
-                        <a:t>).</a:t>
+                        <a:t>Coordinate Reference Systems. Image reprojection.</a:t>
                       </a:r>
                     </a:p>
                   </a:txBody>
@@ -3809,7 +3779,7 @@
                   </a:ext>
                 </a:extLst>
               </a:tr>
-              <a:tr h="428625">
+              <a:tr h="416736">
                 <a:tc>
                   <a:txBody>
                     <a:bodyPr/>
@@ -3847,7 +3817,7 @@
                           <a:latin typeface="Times New Roman" panose="02020603050405020304" pitchFamily="18" charset="0"/>
                           <a:cs typeface="Times New Roman" panose="02020603050405020304" pitchFamily="18" charset="0"/>
                         </a:rPr>
-                        <a:t>Feb 21</a:t>
+                        <a:t>Sep 19</a:t>
                       </a:r>
                       <a:r>
                         <a:rPr lang="en-US" sz="1400" b="1" baseline="30000" dirty="0">
@@ -3855,7 +3825,7 @@
                           <a:latin typeface="Times New Roman" panose="02020603050405020304" pitchFamily="18" charset="0"/>
                           <a:cs typeface="Times New Roman" panose="02020603050405020304" pitchFamily="18" charset="0"/>
                         </a:rPr>
-                        <a:t>st</a:t>
+                        <a:t>th</a:t>
                       </a:r>
                       <a:r>
                         <a:rPr lang="en-US" sz="1400" b="1" dirty="0">
@@ -3863,7 +3833,7 @@
                           <a:latin typeface="Times New Roman" panose="02020603050405020304" pitchFamily="18" charset="0"/>
                           <a:cs typeface="Times New Roman" panose="02020603050405020304" pitchFamily="18" charset="0"/>
                         </a:rPr>
-                        <a:t>   </a:t>
+                        <a:t> </a:t>
                       </a:r>
                       <a:endParaRPr lang="en-US" sz="1400" b="1" dirty="0">
                         <a:solidFill>
@@ -3893,15 +3863,11 @@
                       </a:pPr>
                       <a:r>
                         <a:rPr lang="en-US" sz="1400" dirty="0">
-                          <a:solidFill>
-                            <a:srgbClr val="000000"/>
-                          </a:solidFill>
-                          <a:effectLst/>
-                          <a:latin typeface="Times New Roman" panose="02020603050405020304" pitchFamily="18" charset="0"/>
-                          <a:ea typeface="Calibri" panose="020F0502020204030204" pitchFamily="34" charset="0"/>
-                          <a:cs typeface="Times New Roman" panose="02020603050405020304" pitchFamily="18" charset="0"/>
-                        </a:rPr>
-                        <a:t>Git version control. </a:t>
+                          <a:effectLst/>
+                          <a:latin typeface="Times New Roman" panose="02020603050405020304" pitchFamily="18" charset="0"/>
+                          <a:cs typeface="Times New Roman" panose="02020603050405020304" pitchFamily="18" charset="0"/>
+                        </a:rPr>
+                        <a:t>Obtaining satellite imagery via API scripting. </a:t>
                       </a:r>
                     </a:p>
                   </a:txBody>
@@ -3947,7 +3913,7 @@
                   </a:ext>
                 </a:extLst>
               </a:tr>
-              <a:tr h="428625">
+              <a:tr h="416736">
                 <a:tc>
                   <a:txBody>
                     <a:bodyPr/>
@@ -3985,7 +3951,7 @@
                           <a:latin typeface="Times New Roman" panose="02020603050405020304" pitchFamily="18" charset="0"/>
                           <a:cs typeface="Times New Roman" panose="02020603050405020304" pitchFamily="18" charset="0"/>
                         </a:rPr>
-                        <a:t>Feb 28</a:t>
+                        <a:t>Sept 26</a:t>
                       </a:r>
                       <a:r>
                         <a:rPr lang="en-US" sz="1400" b="1" baseline="30000" dirty="0">
@@ -4021,13 +3987,22 @@
                     <a:bodyPr/>
                     <a:lstStyle/>
                     <a:p>
-                      <a:pPr marL="90170" marR="0">
-                        <a:spcBef>
-                          <a:spcPts val="0"/>
-                        </a:spcBef>
-                        <a:spcAft>
-                          <a:spcPts val="0"/>
-                        </a:spcAft>
+                      <a:pPr marL="90170" marR="0" lvl="0" indent="0" algn="l" defTabSz="914400" rtl="0" eaLnBrk="1" fontAlgn="auto" latinLnBrk="0" hangingPunct="1">
+                        <a:lnSpc>
+                          <a:spcPct val="100000"/>
+                        </a:lnSpc>
+                        <a:spcBef>
+                          <a:spcPts val="0"/>
+                        </a:spcBef>
+                        <a:spcAft>
+                          <a:spcPts val="0"/>
+                        </a:spcAft>
+                        <a:buClrTx/>
+                        <a:buSzTx/>
+                        <a:buFontTx/>
+                        <a:buNone/>
+                        <a:tabLst/>
+                        <a:defRPr/>
                       </a:pPr>
                       <a:r>
                         <a:rPr lang="en-US" sz="1400" dirty="0">
@@ -4050,22 +4025,13 @@
                     <a:bodyPr/>
                     <a:lstStyle/>
                     <a:p>
-                      <a:pPr marL="90170" marR="0" lvl="0" indent="0" algn="ctr" defTabSz="914400" rtl="0" eaLnBrk="1" fontAlgn="auto" latinLnBrk="0" hangingPunct="1">
-                        <a:lnSpc>
-                          <a:spcPct val="100000"/>
-                        </a:lnSpc>
-                        <a:spcBef>
-                          <a:spcPts val="0"/>
-                        </a:spcBef>
-                        <a:spcAft>
-                          <a:spcPts val="0"/>
-                        </a:spcAft>
-                        <a:buClrTx/>
-                        <a:buSzTx/>
-                        <a:buFontTx/>
-                        <a:buNone/>
-                        <a:tabLst/>
-                        <a:defRPr/>
+                      <a:pPr marL="90170" marR="0" algn="ctr">
+                        <a:spcBef>
+                          <a:spcPts val="0"/>
+                        </a:spcBef>
+                        <a:spcAft>
+                          <a:spcPts val="0"/>
+                        </a:spcAft>
                       </a:pPr>
                       <a:r>
                         <a:rPr lang="en-US" sz="1400" dirty="0">
@@ -4094,7 +4060,7 @@
                   </a:ext>
                 </a:extLst>
               </a:tr>
-              <a:tr h="428625">
+              <a:tr h="416736">
                 <a:tc>
                   <a:txBody>
                     <a:bodyPr/>
@@ -4132,7 +4098,7 @@
                           <a:latin typeface="Times New Roman" panose="02020603050405020304" pitchFamily="18" charset="0"/>
                           <a:cs typeface="Times New Roman" panose="02020603050405020304" pitchFamily="18" charset="0"/>
                         </a:rPr>
-                        <a:t>Mar 7</a:t>
+                        <a:t>Oct 3</a:t>
                       </a:r>
                       <a:r>
                         <a:rPr lang="en-US" sz="1400" b="1" baseline="30000" dirty="0">
@@ -4140,7 +4106,7 @@
                           <a:latin typeface="Times New Roman" panose="02020603050405020304" pitchFamily="18" charset="0"/>
                           <a:cs typeface="Times New Roman" panose="02020603050405020304" pitchFamily="18" charset="0"/>
                         </a:rPr>
-                        <a:t>th</a:t>
+                        <a:t>rd</a:t>
                       </a:r>
                       <a:endParaRPr lang="en-US" sz="1400" b="1" dirty="0">
                         <a:solidFill>
@@ -4178,7 +4144,7 @@
                           <a:ea typeface="Calibri" panose="020F0502020204030204" pitchFamily="34" charset="0"/>
                           <a:cs typeface="Times New Roman" panose="02020603050405020304" pitchFamily="18" charset="0"/>
                         </a:rPr>
-                        <a:t>Histograms and panel plots (Matplotlib).</a:t>
+                        <a:t>Image enhancement. </a:t>
                       </a:r>
                     </a:p>
                   </a:txBody>
@@ -4233,7 +4199,7 @@
                   </a:ext>
                 </a:extLst>
               </a:tr>
-              <a:tr h="214313">
+              <a:tr h="208368">
                 <a:tc gridSpan="3">
                   <a:txBody>
                     <a:bodyPr/>
@@ -4253,7 +4219,7 @@
                           <a:latin typeface="Times New Roman" panose="02020603050405020304" pitchFamily="18" charset="0"/>
                           <a:cs typeface="Times New Roman" panose="02020603050405020304" pitchFamily="18" charset="0"/>
                         </a:rPr>
-                        <a:t>Spring Recess</a:t>
+                        <a:t>Fall Break</a:t>
                       </a:r>
                       <a:endParaRPr lang="en-US" sz="1400" b="1" dirty="0">
                         <a:solidFill>
@@ -4310,7 +4276,7 @@
                   </a:ext>
                 </a:extLst>
               </a:tr>
-              <a:tr h="428625">
+              <a:tr h="416736">
                 <a:tc>
                   <a:txBody>
                     <a:bodyPr/>
@@ -4348,7 +4314,7 @@
                           <a:latin typeface="Times New Roman" panose="02020603050405020304" pitchFamily="18" charset="0"/>
                           <a:cs typeface="Times New Roman" panose="02020603050405020304" pitchFamily="18" charset="0"/>
                         </a:rPr>
-                        <a:t>Mar 21</a:t>
+                        <a:t>Oct 17</a:t>
                       </a:r>
                       <a:r>
                         <a:rPr lang="en-US" sz="1400" b="1" baseline="30000" dirty="0">
@@ -4356,7 +4322,7 @@
                           <a:latin typeface="Times New Roman" panose="02020603050405020304" pitchFamily="18" charset="0"/>
                           <a:cs typeface="Times New Roman" panose="02020603050405020304" pitchFamily="18" charset="0"/>
                         </a:rPr>
-                        <a:t>st</a:t>
+                        <a:t>th</a:t>
                       </a:r>
                       <a:r>
                         <a:rPr lang="en-US" sz="1400" b="1" dirty="0">
@@ -4364,7 +4330,7 @@
                           <a:latin typeface="Times New Roman" panose="02020603050405020304" pitchFamily="18" charset="0"/>
                           <a:cs typeface="Times New Roman" panose="02020603050405020304" pitchFamily="18" charset="0"/>
                         </a:rPr>
-                        <a:t>    </a:t>
+                        <a:t> </a:t>
                       </a:r>
                       <a:endParaRPr lang="en-US" sz="1400" b="1" dirty="0">
                         <a:solidFill>
@@ -4384,13 +4350,60 @@
                     <a:bodyPr/>
                     <a:lstStyle/>
                     <a:p>
-                      <a:pPr marL="90170" marR="0">
-                        <a:spcBef>
-                          <a:spcPts val="0"/>
-                        </a:spcBef>
-                        <a:spcAft>
-                          <a:spcPts val="0"/>
-                        </a:spcAft>
+                      <a:pPr marL="90170" marR="0" lvl="0" indent="0" algn="l" defTabSz="914400" rtl="0" eaLnBrk="1" fontAlgn="auto" latinLnBrk="0" hangingPunct="1">
+                        <a:lnSpc>
+                          <a:spcPct val="100000"/>
+                        </a:lnSpc>
+                        <a:spcBef>
+                          <a:spcPts val="0"/>
+                        </a:spcBef>
+                        <a:spcAft>
+                          <a:spcPts val="0"/>
+                        </a:spcAft>
+                        <a:buClrTx/>
+                        <a:buSzTx/>
+                        <a:buFontTx/>
+                        <a:buNone/>
+                        <a:tabLst/>
+                        <a:defRPr/>
+                      </a:pPr>
+                      <a:r>
+                        <a:rPr lang="en-US" sz="1400" kern="1200" dirty="0">
+                          <a:solidFill>
+                            <a:schemeClr val="tx1"/>
+                          </a:solidFill>
+                          <a:effectLst/>
+                          <a:latin typeface="Times New Roman" panose="02020603050405020304" pitchFamily="18" charset="0"/>
+                          <a:ea typeface="+mn-ea"/>
+                          <a:cs typeface="Times New Roman" panose="02020603050405020304" pitchFamily="18" charset="0"/>
+                        </a:rPr>
+                        <a:t>Histograms and panel plots (Matplotlib).</a:t>
+                      </a:r>
+                    </a:p>
+                  </a:txBody>
+                  <a:tcPr marL="53270" marR="53270" marT="0" marB="0" anchor="ctr"/>
+                </a:tc>
+                <a:tc>
+                  <a:txBody>
+                    <a:bodyPr/>
+                    <a:lstStyle/>
+                    <a:p>
+                      <a:pPr marL="90170" marR="0" lvl="0" indent="0" algn="ctr" defTabSz="914400" rtl="0" eaLnBrk="1" fontAlgn="auto" latinLnBrk="0" hangingPunct="1">
+                        <a:lnSpc>
+                          <a:spcPct val="100000"/>
+                        </a:lnSpc>
+                        <a:spcBef>
+                          <a:spcPts val="0"/>
+                        </a:spcBef>
+                        <a:spcAft>
+                          <a:spcPts val="0"/>
+                        </a:spcAft>
+                        <a:buClrTx/>
+                        <a:buSzTx/>
+                        <a:buFontTx/>
+                        <a:buNone/>
+                        <a:tabLst/>
+                        <a:defRPr/>
                       </a:pPr>
                       <a:r>
                         <a:rPr lang="en-US" sz="1400" dirty="0">
@@ -4398,7 +4411,7 @@
                           <a:latin typeface="Times New Roman" panose="02020603050405020304" pitchFamily="18" charset="0"/>
                           <a:cs typeface="Times New Roman" panose="02020603050405020304" pitchFamily="18" charset="0"/>
                         </a:rPr>
-                        <a:t>Object/layer extraction from imagery. </a:t>
+                        <a:t>Assignment 7</a:t>
                       </a:r>
                       <a:endParaRPr lang="en-US" sz="1400" dirty="0">
                         <a:solidFill>
@@ -4413,12 +4426,79 @@
                   </a:txBody>
                   <a:tcPr marL="53270" marR="53270" marT="0" marB="0" anchor="ctr"/>
                 </a:tc>
+                <a:extLst>
+                  <a:ext uri="{0D108BD9-81ED-4DB2-BD59-A6C34878D82A}">
+                    <a16:rowId xmlns:a16="http://schemas.microsoft.com/office/drawing/2014/main" val="3862366649"/>
+                  </a:ext>
+                </a:extLst>
+              </a:tr>
+              <a:tr h="416736">
                 <a:tc>
                   <a:txBody>
                     <a:bodyPr/>
                     <a:lstStyle/>
                     <a:p>
-                      <a:pPr marL="90170" marR="0" lvl="0" indent="0" algn="ctr" defTabSz="914400" rtl="0" eaLnBrk="1" fontAlgn="auto" latinLnBrk="0" hangingPunct="1">
+                      <a:pPr marL="90170" marR="0" algn="ctr">
+                        <a:spcBef>
+                          <a:spcPts val="0"/>
+                        </a:spcBef>
+                        <a:spcAft>
+                          <a:spcPts val="0"/>
+                        </a:spcAft>
+                      </a:pPr>
+                      <a:r>
+                        <a:rPr lang="en-US" sz="1400" b="1" dirty="0">
+                          <a:effectLst/>
+                          <a:latin typeface="Times New Roman" panose="02020603050405020304" pitchFamily="18" charset="0"/>
+                          <a:cs typeface="Times New Roman" panose="02020603050405020304" pitchFamily="18" charset="0"/>
+                        </a:rPr>
+                        <a:t>Week 9:</a:t>
+                      </a:r>
+                    </a:p>
+                    <a:p>
+                      <a:pPr marL="90170" marR="0" algn="ctr">
+                        <a:spcBef>
+                          <a:spcPts val="0"/>
+                        </a:spcBef>
+                        <a:spcAft>
+                          <a:spcPts val="0"/>
+                        </a:spcAft>
+                      </a:pPr>
+                      <a:r>
+                        <a:rPr lang="en-US" sz="1400" b="1" dirty="0">
+                          <a:effectLst/>
+                          <a:latin typeface="Times New Roman" panose="02020603050405020304" pitchFamily="18" charset="0"/>
+                          <a:cs typeface="Times New Roman" panose="02020603050405020304" pitchFamily="18" charset="0"/>
+                        </a:rPr>
+                        <a:t>Oct 24</a:t>
+                      </a:r>
+                      <a:r>
+                        <a:rPr lang="en-US" sz="1400" b="1" baseline="30000" dirty="0">
+                          <a:effectLst/>
+                          <a:latin typeface="Times New Roman" panose="02020603050405020304" pitchFamily="18" charset="0"/>
+                          <a:cs typeface="Times New Roman" panose="02020603050405020304" pitchFamily="18" charset="0"/>
+                        </a:rPr>
+                        <a:t>th</a:t>
+                      </a:r>
+                      <a:endParaRPr lang="en-US" sz="1400" b="1" dirty="0">
+                        <a:solidFill>
+                          <a:srgbClr val="000000"/>
+                        </a:solidFill>
+                        <a:effectLst/>
+                        <a:latin typeface="Times New Roman" panose="02020603050405020304" pitchFamily="18" charset="0"/>
+                        <a:ea typeface="Calibri" panose="020F0502020204030204" pitchFamily="34" charset="0"/>
+                        <a:cs typeface="Times New Roman" panose="02020603050405020304" pitchFamily="18" charset="0"/>
+                      </a:endParaRPr>
+                    </a:p>
+                  </a:txBody>
+                  <a:tcPr marL="53270" marR="53270" marT="0" marB="0"/>
+                </a:tc>
+                <a:tc>
+                  <a:txBody>
+                    <a:bodyPr/>
+                    <a:lstStyle/>
+                    <a:p>
+                      <a:pPr marL="90170" marR="0" lvl="0" indent="0" algn="l" defTabSz="914400" rtl="0" eaLnBrk="1" fontAlgn="auto" latinLnBrk="0" hangingPunct="1">
                         <a:lnSpc>
                           <a:spcPct val="100000"/>
                         </a:lnSpc>
@@ -4437,11 +4517,49 @@
                       </a:pPr>
                       <a:r>
                         <a:rPr lang="en-US" sz="1400" dirty="0">
-                          <a:effectLst/>
-                          <a:latin typeface="Times New Roman" panose="02020603050405020304" pitchFamily="18" charset="0"/>
-                          <a:cs typeface="Times New Roman" panose="02020603050405020304" pitchFamily="18" charset="0"/>
-                        </a:rPr>
-                        <a:t>Assignment 7</a:t>
+                          <a:solidFill>
+                            <a:srgbClr val="000000"/>
+                          </a:solidFill>
+                          <a:effectLst/>
+                          <a:latin typeface="Times New Roman" panose="02020603050405020304" pitchFamily="18" charset="0"/>
+                          <a:ea typeface="Calibri" panose="020F0502020204030204" pitchFamily="34" charset="0"/>
+                          <a:cs typeface="Times New Roman" panose="02020603050405020304" pitchFamily="18" charset="0"/>
+                        </a:rPr>
+                        <a:t>Git version control. </a:t>
+                      </a:r>
+                    </a:p>
+                  </a:txBody>
+                  <a:tcPr marL="53270" marR="53270" marT="0" marB="0" anchor="ctr"/>
+                </a:tc>
+                <a:tc>
+                  <a:txBody>
+                    <a:bodyPr/>
+                    <a:lstStyle/>
+                    <a:p>
+                      <a:pPr marL="90170" marR="0" lvl="0" indent="0" algn="ctr" defTabSz="914400" rtl="0" eaLnBrk="1" fontAlgn="auto" latinLnBrk="0" hangingPunct="1">
+                        <a:lnSpc>
+                          <a:spcPct val="100000"/>
+                        </a:lnSpc>
+                        <a:spcBef>
+                          <a:spcPts val="0"/>
+                        </a:spcBef>
+                        <a:spcAft>
+                          <a:spcPts val="0"/>
+                        </a:spcAft>
+                        <a:buClrTx/>
+                        <a:buSzTx/>
+                        <a:buFontTx/>
+                        <a:buNone/>
+                        <a:tabLst/>
+                        <a:defRPr/>
+                      </a:pPr>
+                      <a:r>
+                        <a:rPr lang="en-US" sz="1400" dirty="0">
+                          <a:effectLst/>
+                          <a:latin typeface="Times New Roman" panose="02020603050405020304" pitchFamily="18" charset="0"/>
+                          <a:cs typeface="Times New Roman" panose="02020603050405020304" pitchFamily="18" charset="0"/>
+                        </a:rPr>
+                        <a:t>Assignment 8</a:t>
                       </a:r>
                       <a:endParaRPr lang="en-US" sz="1400" dirty="0">
                         <a:solidFill>
@@ -4458,11 +4576,11 @@
                 </a:tc>
                 <a:extLst>
                   <a:ext uri="{0D108BD9-81ED-4DB2-BD59-A6C34878D82A}">
-                    <a16:rowId xmlns:a16="http://schemas.microsoft.com/office/drawing/2014/main" val="3862366649"/>
+                    <a16:rowId xmlns:a16="http://schemas.microsoft.com/office/drawing/2014/main" val="2233390585"/>
                   </a:ext>
                 </a:extLst>
               </a:tr>
-              <a:tr h="428625">
+              <a:tr h="416736">
                 <a:tc>
                   <a:txBody>
                     <a:bodyPr/>
@@ -4482,7 +4600,7 @@
                           <a:latin typeface="Times New Roman" panose="02020603050405020304" pitchFamily="18" charset="0"/>
                           <a:cs typeface="Times New Roman" panose="02020603050405020304" pitchFamily="18" charset="0"/>
                         </a:rPr>
-                        <a:t>Week 9:</a:t>
+                        <a:t>Week 10: </a:t>
                       </a:r>
                     </a:p>
                     <a:p>
@@ -4500,7 +4618,7 @@
                           <a:latin typeface="Times New Roman" panose="02020603050405020304" pitchFamily="18" charset="0"/>
                           <a:cs typeface="Times New Roman" panose="02020603050405020304" pitchFamily="18" charset="0"/>
                         </a:rPr>
-                        <a:t>Mar 28</a:t>
+                        <a:t>Oct 31</a:t>
                       </a:r>
                       <a:r>
                         <a:rPr lang="en-US" sz="1400" b="1" baseline="30000" dirty="0">
@@ -4508,7 +4626,15 @@
                           <a:latin typeface="Times New Roman" panose="02020603050405020304" pitchFamily="18" charset="0"/>
                           <a:cs typeface="Times New Roman" panose="02020603050405020304" pitchFamily="18" charset="0"/>
                         </a:rPr>
-                        <a:t>th</a:t>
+                        <a:t>st</a:t>
+                      </a:r>
+                      <a:r>
+                        <a:rPr lang="en-US" sz="1400" b="1" dirty="0">
+                          <a:effectLst/>
+                          <a:latin typeface="Times New Roman" panose="02020603050405020304" pitchFamily="18" charset="0"/>
+                          <a:cs typeface="Times New Roman" panose="02020603050405020304" pitchFamily="18" charset="0"/>
+                        </a:rPr>
+                        <a:t>  </a:t>
                       </a:r>
                       <a:endParaRPr lang="en-US" sz="1400" b="1" dirty="0">
                         <a:solidFill>
@@ -4528,13 +4654,22 @@
                     <a:bodyPr/>
                     <a:lstStyle/>
                     <a:p>
-                      <a:pPr marL="90170" marR="0">
-                        <a:spcBef>
-                          <a:spcPts val="0"/>
-                        </a:spcBef>
-                        <a:spcAft>
-                          <a:spcPts val="0"/>
-                        </a:spcAft>
+                      <a:pPr marL="90170" marR="0" lvl="0" indent="0" algn="l" defTabSz="914400" rtl="0" eaLnBrk="1" fontAlgn="auto" latinLnBrk="0" hangingPunct="1">
+                        <a:lnSpc>
+                          <a:spcPct val="100000"/>
+                        </a:lnSpc>
+                        <a:spcBef>
+                          <a:spcPts val="0"/>
+                        </a:spcBef>
+                        <a:spcAft>
+                          <a:spcPts val="0"/>
+                        </a:spcAft>
+                        <a:buClrTx/>
+                        <a:buSzTx/>
+                        <a:buFontTx/>
+                        <a:buNone/>
+                        <a:tabLst/>
+                        <a:defRPr/>
                       </a:pPr>
                       <a:r>
                         <a:rPr lang="en-US" sz="1400" dirty="0">
@@ -4542,23 +4677,7 @@
                           <a:latin typeface="Times New Roman" panose="02020603050405020304" pitchFamily="18" charset="0"/>
                           <a:cs typeface="Times New Roman" panose="02020603050405020304" pitchFamily="18" charset="0"/>
                         </a:rPr>
-                        <a:t>Introduction to </a:t>
-                      </a:r>
-                      <a:r>
-                        <a:rPr lang="en-US" sz="1400" dirty="0" err="1">
-                          <a:effectLst/>
-                          <a:latin typeface="Times New Roman" panose="02020603050405020304" pitchFamily="18" charset="0"/>
-                          <a:cs typeface="Times New Roman" panose="02020603050405020304" pitchFamily="18" charset="0"/>
-                        </a:rPr>
-                        <a:t>GeoPandas</a:t>
-                      </a:r>
-                      <a:r>
-                        <a:rPr lang="en-US" sz="1400" dirty="0">
-                          <a:effectLst/>
-                          <a:latin typeface="Times New Roman" panose="02020603050405020304" pitchFamily="18" charset="0"/>
-                          <a:cs typeface="Times New Roman" panose="02020603050405020304" pitchFamily="18" charset="0"/>
-                        </a:rPr>
-                        <a:t> (manipulation of spatial imagery layers and data) + coursework planning</a:t>
+                        <a:t>Feature extraction from imagery. </a:t>
                       </a:r>
                       <a:endParaRPr lang="en-US" sz="1400" dirty="0">
                         <a:solidFill>
@@ -4592,7 +4711,7 @@
                           <a:latin typeface="Times New Roman" panose="02020603050405020304" pitchFamily="18" charset="0"/>
                           <a:cs typeface="Times New Roman" panose="02020603050405020304" pitchFamily="18" charset="0"/>
                         </a:rPr>
-                        <a:t>Assignment 8</a:t>
+                        <a:t>Assignment 9</a:t>
                       </a:r>
                       <a:endParaRPr lang="en-US" sz="1400" dirty="0">
                         <a:solidFill>
@@ -4609,11 +4728,11 @@
                 </a:tc>
                 <a:extLst>
                   <a:ext uri="{0D108BD9-81ED-4DB2-BD59-A6C34878D82A}">
-                    <a16:rowId xmlns:a16="http://schemas.microsoft.com/office/drawing/2014/main" val="2233390585"/>
+                    <a16:rowId xmlns:a16="http://schemas.microsoft.com/office/drawing/2014/main" val="1322627347"/>
                   </a:ext>
                 </a:extLst>
               </a:tr>
-              <a:tr h="428625">
+              <a:tr h="416736">
                 <a:tc>
                   <a:txBody>
                     <a:bodyPr/>
@@ -4633,7 +4752,7 @@
                           <a:latin typeface="Times New Roman" panose="02020603050405020304" pitchFamily="18" charset="0"/>
                           <a:cs typeface="Times New Roman" panose="02020603050405020304" pitchFamily="18" charset="0"/>
                         </a:rPr>
-                        <a:t>Week 10: </a:t>
+                        <a:t>Week 11: </a:t>
                       </a:r>
                     </a:p>
                     <a:p>
@@ -4651,7 +4770,7 @@
                           <a:latin typeface="Times New Roman" panose="02020603050405020304" pitchFamily="18" charset="0"/>
                           <a:cs typeface="Times New Roman" panose="02020603050405020304" pitchFamily="18" charset="0"/>
                         </a:rPr>
-                        <a:t>Apr 4</a:t>
+                        <a:t>Nov 7</a:t>
                       </a:r>
                       <a:r>
                         <a:rPr lang="en-US" sz="1400" b="1" baseline="30000" dirty="0">
@@ -4660,14 +4779,6 @@
                           <a:cs typeface="Times New Roman" panose="02020603050405020304" pitchFamily="18" charset="0"/>
                         </a:rPr>
                         <a:t>th</a:t>
-                      </a:r>
-                      <a:r>
-                        <a:rPr lang="en-US" sz="1400" b="1" dirty="0">
-                          <a:effectLst/>
-                          <a:latin typeface="Times New Roman" panose="02020603050405020304" pitchFamily="18" charset="0"/>
-                          <a:cs typeface="Times New Roman" panose="02020603050405020304" pitchFamily="18" charset="0"/>
-                        </a:rPr>
-                        <a:t> </a:t>
                       </a:r>
                       <a:endParaRPr lang="en-US" sz="1400" b="1" dirty="0">
                         <a:solidFill>
@@ -4701,7 +4812,7 @@
                           <a:latin typeface="Times New Roman" panose="02020603050405020304" pitchFamily="18" charset="0"/>
                           <a:cs typeface="Times New Roman" panose="02020603050405020304" pitchFamily="18" charset="0"/>
                         </a:rPr>
-                        <a:t>Image processing using </a:t>
+                        <a:t>Introduction to </a:t>
                       </a:r>
                       <a:r>
                         <a:rPr lang="en-US" sz="1400" dirty="0" err="1">
@@ -4717,7 +4828,7 @@
                           <a:latin typeface="Times New Roman" panose="02020603050405020304" pitchFamily="18" charset="0"/>
                           <a:cs typeface="Times New Roman" panose="02020603050405020304" pitchFamily="18" charset="0"/>
                         </a:rPr>
-                        <a:t> functions and tools. </a:t>
+                        <a:t> (manipulation of spatial imagery layers and data). Coursework planning.</a:t>
                       </a:r>
                       <a:endParaRPr lang="en-US" sz="1400" dirty="0">
                         <a:solidFill>
@@ -4751,7 +4862,7 @@
                           <a:latin typeface="Times New Roman" panose="02020603050405020304" pitchFamily="18" charset="0"/>
                           <a:cs typeface="Times New Roman" panose="02020603050405020304" pitchFamily="18" charset="0"/>
                         </a:rPr>
-                        <a:t>Assignment 9</a:t>
+                        <a:t>Assignment 10</a:t>
                       </a:r>
                       <a:endParaRPr lang="en-US" sz="1400" dirty="0">
                         <a:solidFill>
@@ -4768,11 +4879,11 @@
                 </a:tc>
                 <a:extLst>
                   <a:ext uri="{0D108BD9-81ED-4DB2-BD59-A6C34878D82A}">
-                    <a16:rowId xmlns:a16="http://schemas.microsoft.com/office/drawing/2014/main" val="1322627347"/>
+                    <a16:rowId xmlns:a16="http://schemas.microsoft.com/office/drawing/2014/main" val="2536298045"/>
                   </a:ext>
                 </a:extLst>
               </a:tr>
-              <a:tr h="428625">
+              <a:tr h="416736">
                 <a:tc>
                   <a:txBody>
                     <a:bodyPr/>
@@ -4792,7 +4903,7 @@
                           <a:latin typeface="Times New Roman" panose="02020603050405020304" pitchFamily="18" charset="0"/>
                           <a:cs typeface="Times New Roman" panose="02020603050405020304" pitchFamily="18" charset="0"/>
                         </a:rPr>
-                        <a:t>Week 11: </a:t>
+                        <a:t>Week 12: </a:t>
                       </a:r>
                     </a:p>
                     <a:p>
@@ -4810,7 +4921,7 @@
                           <a:latin typeface="Times New Roman" panose="02020603050405020304" pitchFamily="18" charset="0"/>
                           <a:cs typeface="Times New Roman" panose="02020603050405020304" pitchFamily="18" charset="0"/>
                         </a:rPr>
-                        <a:t>April 11</a:t>
+                        <a:t>Nov 14</a:t>
                       </a:r>
                       <a:r>
                         <a:rPr lang="en-US" sz="1400" b="1" baseline="30000" dirty="0">
@@ -4819,6 +4930,14 @@
                           <a:cs typeface="Times New Roman" panose="02020603050405020304" pitchFamily="18" charset="0"/>
                         </a:rPr>
                         <a:t>th</a:t>
+                      </a:r>
+                      <a:r>
+                        <a:rPr lang="en-US" sz="1400" b="1" dirty="0">
+                          <a:effectLst/>
+                          <a:latin typeface="Times New Roman" panose="02020603050405020304" pitchFamily="18" charset="0"/>
+                          <a:cs typeface="Times New Roman" panose="02020603050405020304" pitchFamily="18" charset="0"/>
+                        </a:rPr>
+                        <a:t> </a:t>
                       </a:r>
                       <a:endParaRPr lang="en-US" sz="1400" b="1" dirty="0">
                         <a:solidFill>
@@ -4852,7 +4971,23 @@
                           <a:latin typeface="Times New Roman" panose="02020603050405020304" pitchFamily="18" charset="0"/>
                           <a:cs typeface="Times New Roman" panose="02020603050405020304" pitchFamily="18" charset="0"/>
                         </a:rPr>
-                        <a:t>Supported research project practical time </a:t>
+                        <a:t>Image processing using </a:t>
+                      </a:r>
+                      <a:r>
+                        <a:rPr lang="en-US" sz="1400" dirty="0" err="1">
+                          <a:effectLst/>
+                          <a:latin typeface="Times New Roman" panose="02020603050405020304" pitchFamily="18" charset="0"/>
+                          <a:cs typeface="Times New Roman" panose="02020603050405020304" pitchFamily="18" charset="0"/>
+                        </a:rPr>
+                        <a:t>GeoPandas</a:t>
+                      </a:r>
+                      <a:r>
+                        <a:rPr lang="en-US" sz="1400" dirty="0">
+                          <a:effectLst/>
+                          <a:latin typeface="Times New Roman" panose="02020603050405020304" pitchFamily="18" charset="0"/>
+                          <a:cs typeface="Times New Roman" panose="02020603050405020304" pitchFamily="18" charset="0"/>
+                        </a:rPr>
+                        <a:t> functions and tools. </a:t>
                       </a:r>
                       <a:endParaRPr lang="en-US" sz="1400" dirty="0">
                         <a:solidFill>
@@ -4886,7 +5021,7 @@
                           <a:latin typeface="Times New Roman" panose="02020603050405020304" pitchFamily="18" charset="0"/>
                           <a:cs typeface="Times New Roman" panose="02020603050405020304" pitchFamily="18" charset="0"/>
                         </a:rPr>
-                        <a:t>Assignment 10</a:t>
+                        <a:t>Coursework project</a:t>
                       </a:r>
                       <a:endParaRPr lang="en-US" sz="1400" dirty="0">
                         <a:solidFill>
@@ -4903,11 +5038,11 @@
                 </a:tc>
                 <a:extLst>
                   <a:ext uri="{0D108BD9-81ED-4DB2-BD59-A6C34878D82A}">
-                    <a16:rowId xmlns:a16="http://schemas.microsoft.com/office/drawing/2014/main" val="2536298045"/>
+                    <a16:rowId xmlns:a16="http://schemas.microsoft.com/office/drawing/2014/main" val="1373517362"/>
                   </a:ext>
                 </a:extLst>
               </a:tr>
-              <a:tr h="428625">
+              <a:tr h="416736">
                 <a:tc>
                   <a:txBody>
                     <a:bodyPr/>
@@ -4927,7 +5062,7 @@
                           <a:latin typeface="Times New Roman" panose="02020603050405020304" pitchFamily="18" charset="0"/>
                           <a:cs typeface="Times New Roman" panose="02020603050405020304" pitchFamily="18" charset="0"/>
                         </a:rPr>
-                        <a:t>Week 12: </a:t>
+                        <a:t>Week 13: </a:t>
                       </a:r>
                     </a:p>
                     <a:p>
@@ -4945,7 +5080,7 @@
                           <a:latin typeface="Times New Roman" panose="02020603050405020304" pitchFamily="18" charset="0"/>
                           <a:cs typeface="Times New Roman" panose="02020603050405020304" pitchFamily="18" charset="0"/>
                         </a:rPr>
-                        <a:t>Apr 18</a:t>
+                        <a:t>Nov 21</a:t>
                       </a:r>
                       <a:r>
                         <a:rPr lang="en-US" sz="1400" b="1" baseline="30000" dirty="0">
@@ -4953,7 +5088,7 @@
                           <a:latin typeface="Times New Roman" panose="02020603050405020304" pitchFamily="18" charset="0"/>
                           <a:cs typeface="Times New Roman" panose="02020603050405020304" pitchFamily="18" charset="0"/>
                         </a:rPr>
-                        <a:t>th</a:t>
+                        <a:t>st</a:t>
                       </a:r>
                       <a:r>
                         <a:rPr lang="en-US" sz="1400" b="1" dirty="0">
@@ -4995,7 +5130,7 @@
                           <a:latin typeface="Times New Roman" panose="02020603050405020304" pitchFamily="18" charset="0"/>
                           <a:cs typeface="Times New Roman" panose="02020603050405020304" pitchFamily="18" charset="0"/>
                         </a:rPr>
-                        <a:t>Supported research project practical time </a:t>
+                        <a:t>Supported research project practical time. </a:t>
                       </a:r>
                       <a:endParaRPr lang="en-US" sz="1400" dirty="0">
                         <a:solidFill>
@@ -5024,7 +5159,7 @@
                         </a:spcAft>
                       </a:pPr>
                       <a:r>
-                        <a:rPr lang="en-US" sz="1400" dirty="0">
+                        <a:rPr lang="en-US" sz="1400">
                           <a:effectLst/>
                           <a:latin typeface="Times New Roman" panose="02020603050405020304" pitchFamily="18" charset="0"/>
                           <a:cs typeface="Times New Roman" panose="02020603050405020304" pitchFamily="18" charset="0"/>
@@ -5046,11 +5181,11 @@
                 </a:tc>
                 <a:extLst>
                   <a:ext uri="{0D108BD9-81ED-4DB2-BD59-A6C34878D82A}">
-                    <a16:rowId xmlns:a16="http://schemas.microsoft.com/office/drawing/2014/main" val="1373517362"/>
+                    <a16:rowId xmlns:a16="http://schemas.microsoft.com/office/drawing/2014/main" val="1165365623"/>
                   </a:ext>
                 </a:extLst>
               </a:tr>
-              <a:tr h="428625">
+              <a:tr h="416736">
                 <a:tc>
                   <a:txBody>
                     <a:bodyPr/>
@@ -5070,7 +5205,7 @@
                           <a:latin typeface="Times New Roman" panose="02020603050405020304" pitchFamily="18" charset="0"/>
                           <a:cs typeface="Times New Roman" panose="02020603050405020304" pitchFamily="18" charset="0"/>
                         </a:rPr>
-                        <a:t>Week 13: </a:t>
+                        <a:t>Week 14:</a:t>
                       </a:r>
                     </a:p>
                     <a:p>
@@ -5088,7 +5223,7 @@
                           <a:latin typeface="Times New Roman" panose="02020603050405020304" pitchFamily="18" charset="0"/>
                           <a:cs typeface="Times New Roman" panose="02020603050405020304" pitchFamily="18" charset="0"/>
                         </a:rPr>
-                        <a:t>Apr 25</a:t>
+                        <a:t>Nov 28</a:t>
                       </a:r>
                       <a:r>
                         <a:rPr lang="en-US" sz="1400" b="1" baseline="30000" dirty="0">
@@ -5097,14 +5232,6 @@
                           <a:cs typeface="Times New Roman" panose="02020603050405020304" pitchFamily="18" charset="0"/>
                         </a:rPr>
                         <a:t>th</a:t>
-                      </a:r>
-                      <a:r>
-                        <a:rPr lang="en-US" sz="1400" b="1" dirty="0">
-                          <a:effectLst/>
-                          <a:latin typeface="Times New Roman" panose="02020603050405020304" pitchFamily="18" charset="0"/>
-                          <a:cs typeface="Times New Roman" panose="02020603050405020304" pitchFamily="18" charset="0"/>
-                        </a:rPr>
-                        <a:t> </a:t>
                       </a:r>
                       <a:endParaRPr lang="en-US" sz="1400" b="1" dirty="0">
                         <a:solidFill>
@@ -5124,13 +5251,22 @@
                     <a:bodyPr/>
                     <a:lstStyle/>
                     <a:p>
-                      <a:pPr marL="90170" marR="0">
-                        <a:spcBef>
-                          <a:spcPts val="0"/>
-                        </a:spcBef>
-                        <a:spcAft>
-                          <a:spcPts val="0"/>
-                        </a:spcAft>
+                      <a:pPr marL="90170" marR="0" lvl="0" indent="0" algn="l" defTabSz="914400" rtl="0" eaLnBrk="1" fontAlgn="auto" latinLnBrk="0" hangingPunct="1">
+                        <a:lnSpc>
+                          <a:spcPct val="100000"/>
+                        </a:lnSpc>
+                        <a:spcBef>
+                          <a:spcPts val="0"/>
+                        </a:spcBef>
+                        <a:spcAft>
+                          <a:spcPts val="0"/>
+                        </a:spcAft>
+                        <a:buClrTx/>
+                        <a:buSzTx/>
+                        <a:buFontTx/>
+                        <a:buNone/>
+                        <a:tabLst/>
+                        <a:defRPr/>
                       </a:pPr>
                       <a:r>
                         <a:rPr lang="en-US" sz="1400" dirty="0">
@@ -5138,7 +5274,7 @@
                           <a:latin typeface="Times New Roman" panose="02020603050405020304" pitchFamily="18" charset="0"/>
                           <a:cs typeface="Times New Roman" panose="02020603050405020304" pitchFamily="18" charset="0"/>
                         </a:rPr>
-                        <a:t>Supported research project practical time </a:t>
+                        <a:t>Supported research project practical time. Coursework submission. </a:t>
                       </a:r>
                       <a:endParaRPr lang="en-US" sz="1400" dirty="0">
                         <a:solidFill>
@@ -5189,11 +5325,11 @@
                 </a:tc>
                 <a:extLst>
                   <a:ext uri="{0D108BD9-81ED-4DB2-BD59-A6C34878D82A}">
-                    <a16:rowId xmlns:a16="http://schemas.microsoft.com/office/drawing/2014/main" val="1165365623"/>
+                    <a16:rowId xmlns:a16="http://schemas.microsoft.com/office/drawing/2014/main" val="3509286896"/>
                   </a:ext>
                 </a:extLst>
               </a:tr>
-              <a:tr h="428625">
+              <a:tr h="416736">
                 <a:tc>
                   <a:txBody>
                     <a:bodyPr/>
@@ -5213,7 +5349,7 @@
                           <a:latin typeface="Times New Roman" panose="02020603050405020304" pitchFamily="18" charset="0"/>
                           <a:cs typeface="Times New Roman" panose="02020603050405020304" pitchFamily="18" charset="0"/>
                         </a:rPr>
-                        <a:t>Week 14:</a:t>
+                        <a:t>Finals: </a:t>
                       </a:r>
                     </a:p>
                     <a:p>
@@ -5231,7 +5367,7 @@
                           <a:latin typeface="Times New Roman" panose="02020603050405020304" pitchFamily="18" charset="0"/>
                           <a:cs typeface="Times New Roman" panose="02020603050405020304" pitchFamily="18" charset="0"/>
                         </a:rPr>
-                        <a:t>May 2</a:t>
+                        <a:t>Dec 5</a:t>
                       </a:r>
                       <a:r>
                         <a:rPr lang="en-US" sz="1400" b="1" baseline="30000" dirty="0">
@@ -5239,7 +5375,15 @@
                           <a:latin typeface="Times New Roman" panose="02020603050405020304" pitchFamily="18" charset="0"/>
                           <a:cs typeface="Times New Roman" panose="02020603050405020304" pitchFamily="18" charset="0"/>
                         </a:rPr>
-                        <a:t>nd</a:t>
+                        <a:t>th</a:t>
+                      </a:r>
+                      <a:r>
+                        <a:rPr lang="en-US" sz="1400" b="1" dirty="0">
+                          <a:effectLst/>
+                          <a:latin typeface="Times New Roman" panose="02020603050405020304" pitchFamily="18" charset="0"/>
+                          <a:cs typeface="Times New Roman" panose="02020603050405020304" pitchFamily="18" charset="0"/>
+                        </a:rPr>
+                        <a:t> </a:t>
                       </a:r>
                       <a:endParaRPr lang="en-US" sz="1400" b="1" dirty="0">
                         <a:solidFill>
@@ -5259,174 +5403,35 @@
                     <a:bodyPr/>
                     <a:lstStyle/>
                     <a:p>
-                      <a:pPr marL="90170" marR="0">
-                        <a:spcBef>
-                          <a:spcPts val="0"/>
-                        </a:spcBef>
-                        <a:spcAft>
-                          <a:spcPts val="0"/>
-                        </a:spcAft>
+                      <a:pPr marL="90170" marR="0" lvl="0" indent="0" algn="l" defTabSz="914400" rtl="0" eaLnBrk="1" fontAlgn="auto" latinLnBrk="0" hangingPunct="1">
+                        <a:lnSpc>
+                          <a:spcPct val="100000"/>
+                        </a:lnSpc>
+                        <a:spcBef>
+                          <a:spcPts val="0"/>
+                        </a:spcBef>
+                        <a:spcAft>
+                          <a:spcPts val="0"/>
+                        </a:spcAft>
+                        <a:buClrTx/>
+                        <a:buSzTx/>
+                        <a:buFontTx/>
+                        <a:buNone/>
+                        <a:tabLst/>
+                        <a:defRPr/>
                       </a:pPr>
                       <a:r>
                         <a:rPr lang="en-US" sz="1400" dirty="0">
-                          <a:effectLst/>
-                          <a:latin typeface="Times New Roman" panose="02020603050405020304" pitchFamily="18" charset="0"/>
-                          <a:cs typeface="Times New Roman" panose="02020603050405020304" pitchFamily="18" charset="0"/>
-                        </a:rPr>
-                        <a:t>Supported research project practical time</a:t>
-                      </a:r>
-                      <a:endParaRPr lang="en-US" sz="1400" dirty="0">
-                        <a:solidFill>
-                          <a:srgbClr val="000000"/>
-                        </a:solidFill>
-                        <a:effectLst/>
-                        <a:latin typeface="Times New Roman" panose="02020603050405020304" pitchFamily="18" charset="0"/>
-                        <a:ea typeface="Calibri" panose="020F0502020204030204" pitchFamily="34" charset="0"/>
-                        <a:cs typeface="Times New Roman" panose="02020603050405020304" pitchFamily="18" charset="0"/>
-                      </a:endParaRPr>
-                    </a:p>
-                  </a:txBody>
-                  <a:tcPr marL="53270" marR="53270" marT="0" marB="0" anchor="ctr"/>
-                </a:tc>
-                <a:tc>
-                  <a:txBody>
-                    <a:bodyPr/>
-                    <a:lstStyle/>
-                    <a:p>
-                      <a:pPr marL="90170" marR="0" algn="ctr">
-                        <a:spcBef>
-                          <a:spcPts val="0"/>
-                        </a:spcBef>
-                        <a:spcAft>
-                          <a:spcPts val="0"/>
-                        </a:spcAft>
-                      </a:pPr>
-                      <a:r>
-                        <a:rPr lang="en-US" sz="1400">
-                          <a:effectLst/>
-                          <a:latin typeface="Times New Roman" panose="02020603050405020304" pitchFamily="18" charset="0"/>
-                          <a:cs typeface="Times New Roman" panose="02020603050405020304" pitchFamily="18" charset="0"/>
-                        </a:rPr>
-                        <a:t>Coursework project</a:t>
-                      </a:r>
-                      <a:endParaRPr lang="en-US" sz="1400" dirty="0">
-                        <a:solidFill>
-                          <a:srgbClr val="000000"/>
-                        </a:solidFill>
-                        <a:effectLst/>
-                        <a:latin typeface="Times New Roman" panose="02020603050405020304" pitchFamily="18" charset="0"/>
-                        <a:ea typeface="Calibri" panose="020F0502020204030204" pitchFamily="34" charset="0"/>
-                        <a:cs typeface="Times New Roman" panose="02020603050405020304" pitchFamily="18" charset="0"/>
-                      </a:endParaRPr>
-                    </a:p>
-                  </a:txBody>
-                  <a:tcPr marL="53270" marR="53270" marT="0" marB="0" anchor="ctr"/>
-                </a:tc>
-                <a:extLst>
-                  <a:ext uri="{0D108BD9-81ED-4DB2-BD59-A6C34878D82A}">
-                    <a16:rowId xmlns:a16="http://schemas.microsoft.com/office/drawing/2014/main" val="3509286896"/>
-                  </a:ext>
-                </a:extLst>
-              </a:tr>
-              <a:tr h="428625">
-                <a:tc>
-                  <a:txBody>
-                    <a:bodyPr/>
-                    <a:lstStyle/>
-                    <a:p>
-                      <a:pPr marL="90170" marR="0" algn="ctr">
-                        <a:spcBef>
-                          <a:spcPts val="0"/>
-                        </a:spcBef>
-                        <a:spcAft>
-                          <a:spcPts val="0"/>
-                        </a:spcAft>
-                      </a:pPr>
-                      <a:r>
-                        <a:rPr lang="en-US" sz="1400" b="1" dirty="0">
-                          <a:effectLst/>
-                          <a:latin typeface="Times New Roman" panose="02020603050405020304" pitchFamily="18" charset="0"/>
-                          <a:cs typeface="Times New Roman" panose="02020603050405020304" pitchFamily="18" charset="0"/>
-                        </a:rPr>
-                        <a:t>Finals: </a:t>
-                      </a:r>
-                    </a:p>
-                    <a:p>
-                      <a:pPr marL="90170" marR="0" algn="ctr">
-                        <a:spcBef>
-                          <a:spcPts val="0"/>
-                        </a:spcBef>
-                        <a:spcAft>
-                          <a:spcPts val="0"/>
-                        </a:spcAft>
-                      </a:pPr>
-                      <a:r>
-                        <a:rPr lang="en-US" sz="1400" b="1" dirty="0">
-                          <a:effectLst/>
-                          <a:latin typeface="Times New Roman" panose="02020603050405020304" pitchFamily="18" charset="0"/>
-                          <a:cs typeface="Times New Roman" panose="02020603050405020304" pitchFamily="18" charset="0"/>
-                        </a:rPr>
-                        <a:t>May 9</a:t>
-                      </a:r>
-                      <a:r>
-                        <a:rPr lang="en-US" sz="1400" b="1" baseline="30000" dirty="0">
-                          <a:effectLst/>
-                          <a:latin typeface="Times New Roman" panose="02020603050405020304" pitchFamily="18" charset="0"/>
-                          <a:cs typeface="Times New Roman" panose="02020603050405020304" pitchFamily="18" charset="0"/>
-                        </a:rPr>
-                        <a:t>th</a:t>
-                      </a:r>
-                      <a:r>
-                        <a:rPr lang="en-US" sz="1400" b="1" dirty="0">
-                          <a:effectLst/>
-                          <a:latin typeface="Times New Roman" panose="02020603050405020304" pitchFamily="18" charset="0"/>
-                          <a:cs typeface="Times New Roman" panose="02020603050405020304" pitchFamily="18" charset="0"/>
-                        </a:rPr>
-                        <a:t> </a:t>
-                      </a:r>
-                      <a:endParaRPr lang="en-US" sz="1400" b="1" dirty="0">
-                        <a:solidFill>
-                          <a:srgbClr val="000000"/>
-                        </a:solidFill>
-                        <a:effectLst/>
-                        <a:latin typeface="Times New Roman" panose="02020603050405020304" pitchFamily="18" charset="0"/>
-                        <a:ea typeface="Calibri" panose="020F0502020204030204" pitchFamily="34" charset="0"/>
-                        <a:cs typeface="Times New Roman" panose="02020603050405020304" pitchFamily="18" charset="0"/>
-                      </a:endParaRPr>
-                    </a:p>
-                  </a:txBody>
-                  <a:tcPr marL="53270" marR="53270" marT="0" marB="0"/>
-                </a:tc>
-                <a:tc>
-                  <a:txBody>
-                    <a:bodyPr/>
-                    <a:lstStyle/>
-                    <a:p>
-                      <a:pPr marL="90170" marR="0">
-                        <a:spcBef>
-                          <a:spcPts val="0"/>
-                        </a:spcBef>
-                        <a:spcAft>
-                          <a:spcPts val="0"/>
-                        </a:spcAft>
-                      </a:pPr>
-                      <a:r>
-                        <a:rPr lang="en-US" sz="1400" dirty="0">
-                          <a:effectLst/>
-                          <a:latin typeface="Times New Roman" panose="02020603050405020304" pitchFamily="18" charset="0"/>
-                          <a:cs typeface="Times New Roman" panose="02020603050405020304" pitchFamily="18" charset="0"/>
-                        </a:rPr>
-                        <a:t>Coursework submission </a:t>
-                      </a:r>
-                      <a:endParaRPr lang="en-US" sz="1400" dirty="0">
-                        <a:solidFill>
-                          <a:srgbClr val="000000"/>
-                        </a:solidFill>
-                        <a:effectLst/>
-                        <a:latin typeface="Times New Roman" panose="02020603050405020304" pitchFamily="18" charset="0"/>
-                        <a:ea typeface="Calibri" panose="020F0502020204030204" pitchFamily="34" charset="0"/>
-                        <a:cs typeface="Times New Roman" panose="02020603050405020304" pitchFamily="18" charset="0"/>
-                      </a:endParaRPr>
+                          <a:solidFill>
+                            <a:srgbClr val="000000"/>
+                          </a:solidFill>
+                          <a:effectLst/>
+                          <a:latin typeface="Times New Roman" panose="02020603050405020304" pitchFamily="18" charset="0"/>
+                          <a:ea typeface="Calibri" panose="020F0502020204030204" pitchFamily="34" charset="0"/>
+                          <a:cs typeface="Times New Roman" panose="02020603050405020304" pitchFamily="18" charset="0"/>
+                        </a:rPr>
+                        <a:t>Finals week</a:t>
+                      </a:r>
                     </a:p>
                   </a:txBody>
                   <a:tcPr marL="53270" marR="53270" marT="0" marB="0" anchor="ctr"/>

</xml_diff>

<commit_message>
Add week 9 and assignment 6
</commit_message>
<xml_diff>
--- a/syllabus/format.pptx
+++ b/syllabus/format.pptx
@@ -6,6 +6,7 @@
   </p:sldMasterIdLst>
   <p:sldIdLst>
     <p:sldId id="257" r:id="rId2"/>
+    <p:sldId id="256" r:id="rId3"/>
   </p:sldIdLst>
   <p:sldSz cx="9144000" cy="6858000" type="screen4x3"/>
   <p:notesSz cx="6858000" cy="9144000"/>
@@ -254,7 +255,7 @@
           <a:p>
             <a:fld id="{48CDFCA1-6601-C943-AA02-89F09BE97B91}" type="datetimeFigureOut">
               <a:rPr lang="en-US" smtClean="0"/>
-              <a:t>8/17/2022</a:t>
+              <a:t>10/17/2022</a:t>
             </a:fld>
             <a:endParaRPr lang="en-US"/>
           </a:p>
@@ -424,7 +425,7 @@
           <a:p>
             <a:fld id="{48CDFCA1-6601-C943-AA02-89F09BE97B91}" type="datetimeFigureOut">
               <a:rPr lang="en-US" smtClean="0"/>
-              <a:t>8/17/2022</a:t>
+              <a:t>10/17/2022</a:t>
             </a:fld>
             <a:endParaRPr lang="en-US"/>
           </a:p>
@@ -604,7 +605,7 @@
           <a:p>
             <a:fld id="{48CDFCA1-6601-C943-AA02-89F09BE97B91}" type="datetimeFigureOut">
               <a:rPr lang="en-US" smtClean="0"/>
-              <a:t>8/17/2022</a:t>
+              <a:t>10/17/2022</a:t>
             </a:fld>
             <a:endParaRPr lang="en-US"/>
           </a:p>
@@ -774,7 +775,7 @@
           <a:p>
             <a:fld id="{48CDFCA1-6601-C943-AA02-89F09BE97B91}" type="datetimeFigureOut">
               <a:rPr lang="en-US" smtClean="0"/>
-              <a:t>8/17/2022</a:t>
+              <a:t>10/17/2022</a:t>
             </a:fld>
             <a:endParaRPr lang="en-US"/>
           </a:p>
@@ -1018,7 +1019,7 @@
           <a:p>
             <a:fld id="{48CDFCA1-6601-C943-AA02-89F09BE97B91}" type="datetimeFigureOut">
               <a:rPr lang="en-US" smtClean="0"/>
-              <a:t>8/17/2022</a:t>
+              <a:t>10/17/2022</a:t>
             </a:fld>
             <a:endParaRPr lang="en-US"/>
           </a:p>
@@ -1250,7 +1251,7 @@
           <a:p>
             <a:fld id="{48CDFCA1-6601-C943-AA02-89F09BE97B91}" type="datetimeFigureOut">
               <a:rPr lang="en-US" smtClean="0"/>
-              <a:t>8/17/2022</a:t>
+              <a:t>10/17/2022</a:t>
             </a:fld>
             <a:endParaRPr lang="en-US"/>
           </a:p>
@@ -1617,7 +1618,7 @@
           <a:p>
             <a:fld id="{48CDFCA1-6601-C943-AA02-89F09BE97B91}" type="datetimeFigureOut">
               <a:rPr lang="en-US" smtClean="0"/>
-              <a:t>8/17/2022</a:t>
+              <a:t>10/17/2022</a:t>
             </a:fld>
             <a:endParaRPr lang="en-US"/>
           </a:p>
@@ -1735,7 +1736,7 @@
           <a:p>
             <a:fld id="{48CDFCA1-6601-C943-AA02-89F09BE97B91}" type="datetimeFigureOut">
               <a:rPr lang="en-US" smtClean="0"/>
-              <a:t>8/17/2022</a:t>
+              <a:t>10/17/2022</a:t>
             </a:fld>
             <a:endParaRPr lang="en-US"/>
           </a:p>
@@ -1830,7 +1831,7 @@
           <a:p>
             <a:fld id="{48CDFCA1-6601-C943-AA02-89F09BE97B91}" type="datetimeFigureOut">
               <a:rPr lang="en-US" smtClean="0"/>
-              <a:t>8/17/2022</a:t>
+              <a:t>10/17/2022</a:t>
             </a:fld>
             <a:endParaRPr lang="en-US"/>
           </a:p>
@@ -2107,7 +2108,7 @@
           <a:p>
             <a:fld id="{48CDFCA1-6601-C943-AA02-89F09BE97B91}" type="datetimeFigureOut">
               <a:rPr lang="en-US" smtClean="0"/>
-              <a:t>8/17/2022</a:t>
+              <a:t>10/17/2022</a:t>
             </a:fld>
             <a:endParaRPr lang="en-US"/>
           </a:p>
@@ -2364,7 +2365,7 @@
           <a:p>
             <a:fld id="{48CDFCA1-6601-C943-AA02-89F09BE97B91}" type="datetimeFigureOut">
               <a:rPr lang="en-US" smtClean="0"/>
-              <a:t>8/17/2022</a:t>
+              <a:t>10/17/2022</a:t>
             </a:fld>
             <a:endParaRPr lang="en-US"/>
           </a:p>
@@ -2577,7 +2578,7 @@
           <a:p>
             <a:fld id="{48CDFCA1-6601-C943-AA02-89F09BE97B91}" type="datetimeFigureOut">
               <a:rPr lang="en-US" smtClean="0"/>
-              <a:t>8/17/2022</a:t>
+              <a:t>10/17/2022</a:t>
             </a:fld>
             <a:endParaRPr lang="en-US"/>
           </a:p>
@@ -5493,6 +5494,1329 @@
 </p:sld>
 </file>
 
+<file path=ppt/slides/slide2.xml><?xml version="1.0" encoding="utf-8"?>
+<p:sld xmlns:a="http://schemas.openxmlformats.org/drawingml/2006/main" xmlns:r="http://schemas.openxmlformats.org/officeDocument/2006/relationships" xmlns:p="http://schemas.openxmlformats.org/presentationml/2006/main">
+  <p:cSld>
+    <p:bg>
+      <p:bgPr>
+        <a:solidFill>
+          <a:schemeClr val="bg1">
+            <a:lumMod val="95000"/>
+          </a:schemeClr>
+        </a:solidFill>
+        <a:effectLst/>
+      </p:bgPr>
+    </p:bg>
+    <p:spTree>
+      <p:nvGrpSpPr>
+        <p:cNvPr id="1" name=""/>
+        <p:cNvGrpSpPr/>
+        <p:nvPr/>
+      </p:nvGrpSpPr>
+      <p:grpSpPr>
+        <a:xfrm>
+          <a:off x="0" y="0"/>
+          <a:ext cx="0" cy="0"/>
+          <a:chOff x="0" y="0"/>
+          <a:chExt cx="0" cy="0"/>
+        </a:xfrm>
+      </p:grpSpPr>
+      <p:sp>
+        <p:nvSpPr>
+          <p:cNvPr id="4" name="TextBox 3">
+            <a:extLst>
+              <a:ext uri="{FF2B5EF4-FFF2-40B4-BE49-F238E27FC236}">
+                <a16:creationId xmlns:a16="http://schemas.microsoft.com/office/drawing/2014/main" id="{058F02D7-3E70-067E-BF48-3821716A87C0}"/>
+              </a:ext>
+            </a:extLst>
+          </p:cNvPr>
+          <p:cNvSpPr txBox="1"/>
+          <p:nvPr/>
+        </p:nvSpPr>
+        <p:spPr>
+          <a:xfrm>
+            <a:off x="6975834" y="1369342"/>
+            <a:ext cx="1508289" cy="1282045"/>
+          </a:xfrm>
+          <a:prstGeom prst="rect">
+            <a:avLst/>
+          </a:prstGeom>
+          <a:noFill/>
+          <a:ln>
+            <a:solidFill>
+              <a:schemeClr val="tx1"/>
+            </a:solidFill>
+          </a:ln>
+        </p:spPr>
+        <p:txBody>
+          <a:bodyPr wrap="square" rtlCol="0" anchor="ctr">
+            <a:noAutofit/>
+          </a:bodyPr>
+          <a:lstStyle/>
+          <a:p>
+            <a:pPr marL="0" marR="0" lvl="0" indent="0" algn="ctr" defTabSz="457200" rtl="0" eaLnBrk="1" fontAlgn="auto" latinLnBrk="0" hangingPunct="1">
+              <a:lnSpc>
+                <a:spcPct val="100000"/>
+              </a:lnSpc>
+              <a:spcBef>
+                <a:spcPts val="0"/>
+              </a:spcBef>
+              <a:spcAft>
+                <a:spcPts val="0"/>
+              </a:spcAft>
+              <a:buClrTx/>
+              <a:buSzTx/>
+              <a:buFontTx/>
+              <a:buNone/>
+              <a:tabLst/>
+              <a:defRPr/>
+            </a:pPr>
+            <a:r>
+              <a:rPr kumimoji="0" lang="en-US" sz="1800" b="0" i="0" u="none" strike="noStrike" kern="1200" cap="none" spc="0" normalizeH="0" baseline="0" noProof="0" dirty="0">
+                <a:ln>
+                  <a:noFill/>
+                </a:ln>
+                <a:solidFill>
+                  <a:prstClr val="black"/>
+                </a:solidFill>
+                <a:effectLst/>
+                <a:uLnTx/>
+                <a:uFillTx/>
+                <a:latin typeface="Times New Roman" panose="02020603050405020304" pitchFamily="18" charset="0"/>
+                <a:cs typeface="Times New Roman" panose="02020603050405020304" pitchFamily="18" charset="0"/>
+              </a:rPr>
+              <a:t>Intro to API Extraction of Imagery</a:t>
+            </a:r>
+          </a:p>
+        </p:txBody>
+      </p:sp>
+      <p:sp>
+        <p:nvSpPr>
+          <p:cNvPr id="5" name="TextBox 4">
+            <a:extLst>
+              <a:ext uri="{FF2B5EF4-FFF2-40B4-BE49-F238E27FC236}">
+                <a16:creationId xmlns:a16="http://schemas.microsoft.com/office/drawing/2014/main" id="{55C408E3-135E-CD36-8F25-D33C9C0CAB91}"/>
+              </a:ext>
+            </a:extLst>
+          </p:cNvPr>
+          <p:cNvSpPr txBox="1"/>
+          <p:nvPr/>
+        </p:nvSpPr>
+        <p:spPr>
+          <a:xfrm>
+            <a:off x="2828040" y="1340669"/>
+            <a:ext cx="1508289" cy="1282045"/>
+          </a:xfrm>
+          <a:prstGeom prst="rect">
+            <a:avLst/>
+          </a:prstGeom>
+          <a:noFill/>
+          <a:ln>
+            <a:solidFill>
+              <a:schemeClr val="tx1"/>
+            </a:solidFill>
+          </a:ln>
+        </p:spPr>
+        <p:txBody>
+          <a:bodyPr wrap="square" rtlCol="0" anchor="ctr">
+            <a:noAutofit/>
+          </a:bodyPr>
+          <a:lstStyle/>
+          <a:p>
+            <a:pPr marL="0" marR="0" lvl="0" indent="0" algn="ctr" defTabSz="457200" rtl="0" eaLnBrk="1" fontAlgn="auto" latinLnBrk="0" hangingPunct="1">
+              <a:lnSpc>
+                <a:spcPct val="100000"/>
+              </a:lnSpc>
+              <a:spcBef>
+                <a:spcPts val="0"/>
+              </a:spcBef>
+              <a:spcAft>
+                <a:spcPts val="0"/>
+              </a:spcAft>
+              <a:buClrTx/>
+              <a:buSzTx/>
+              <a:buFontTx/>
+              <a:buNone/>
+              <a:tabLst/>
+              <a:defRPr/>
+            </a:pPr>
+            <a:r>
+              <a:rPr kumimoji="0" lang="en-US" sz="1800" b="0" i="0" u="none" strike="noStrike" kern="1200" cap="none" spc="0" normalizeH="0" baseline="0" noProof="0" dirty="0">
+                <a:ln>
+                  <a:noFill/>
+                </a:ln>
+                <a:solidFill>
+                  <a:prstClr val="black"/>
+                </a:solidFill>
+                <a:effectLst/>
+                <a:uLnTx/>
+                <a:uFillTx/>
+                <a:latin typeface="Times New Roman" panose="02020603050405020304" pitchFamily="18" charset="0"/>
+                <a:cs typeface="Times New Roman" panose="02020603050405020304" pitchFamily="18" charset="0"/>
+              </a:rPr>
+              <a:t>Intro to Python Programing</a:t>
+            </a:r>
+          </a:p>
+        </p:txBody>
+      </p:sp>
+      <p:sp>
+        <p:nvSpPr>
+          <p:cNvPr id="6" name="TextBox 5">
+            <a:extLst>
+              <a:ext uri="{FF2B5EF4-FFF2-40B4-BE49-F238E27FC236}">
+                <a16:creationId xmlns:a16="http://schemas.microsoft.com/office/drawing/2014/main" id="{D85622EC-D694-02EF-3EB1-7F9B8BE25303}"/>
+              </a:ext>
+            </a:extLst>
+          </p:cNvPr>
+          <p:cNvSpPr txBox="1"/>
+          <p:nvPr/>
+        </p:nvSpPr>
+        <p:spPr>
+          <a:xfrm>
+            <a:off x="6975833" y="3064005"/>
+            <a:ext cx="1508289" cy="1282045"/>
+          </a:xfrm>
+          <a:prstGeom prst="rect">
+            <a:avLst/>
+          </a:prstGeom>
+          <a:noFill/>
+          <a:ln>
+            <a:solidFill>
+              <a:schemeClr val="tx1"/>
+            </a:solidFill>
+          </a:ln>
+        </p:spPr>
+        <p:txBody>
+          <a:bodyPr wrap="square" rtlCol="0" anchor="ctr">
+            <a:noAutofit/>
+          </a:bodyPr>
+          <a:lstStyle/>
+          <a:p>
+            <a:pPr marL="0" marR="0" lvl="0" indent="0" algn="ctr" defTabSz="457200" rtl="0" eaLnBrk="1" fontAlgn="auto" latinLnBrk="0" hangingPunct="1">
+              <a:lnSpc>
+                <a:spcPct val="100000"/>
+              </a:lnSpc>
+              <a:spcBef>
+                <a:spcPts val="0"/>
+              </a:spcBef>
+              <a:spcAft>
+                <a:spcPts val="0"/>
+              </a:spcAft>
+              <a:buClrTx/>
+              <a:buSzTx/>
+              <a:buFontTx/>
+              <a:buNone/>
+              <a:tabLst/>
+              <a:defRPr/>
+            </a:pPr>
+            <a:r>
+              <a:rPr kumimoji="0" lang="en-US" sz="1800" b="0" i="0" u="none" strike="noStrike" kern="1200" cap="none" spc="0" normalizeH="0" baseline="0" noProof="0" dirty="0">
+                <a:ln>
+                  <a:noFill/>
+                </a:ln>
+                <a:solidFill>
+                  <a:prstClr val="black"/>
+                </a:solidFill>
+                <a:effectLst/>
+                <a:uLnTx/>
+                <a:uFillTx/>
+                <a:latin typeface="Times New Roman" panose="02020603050405020304" pitchFamily="18" charset="0"/>
+                <a:cs typeface="Times New Roman" panose="02020603050405020304" pitchFamily="18" charset="0"/>
+              </a:rPr>
+              <a:t>Intro to Visualizing Multi-Band Imagery</a:t>
+            </a:r>
+          </a:p>
+        </p:txBody>
+      </p:sp>
+      <p:sp>
+        <p:nvSpPr>
+          <p:cNvPr id="7" name="TextBox 6">
+            <a:extLst>
+              <a:ext uri="{FF2B5EF4-FFF2-40B4-BE49-F238E27FC236}">
+                <a16:creationId xmlns:a16="http://schemas.microsoft.com/office/drawing/2014/main" id="{3223C827-0715-2108-88D4-8B64FF2AB0B1}"/>
+              </a:ext>
+            </a:extLst>
+          </p:cNvPr>
+          <p:cNvSpPr txBox="1"/>
+          <p:nvPr/>
+        </p:nvSpPr>
+        <p:spPr>
+          <a:xfrm>
+            <a:off x="2828039" y="3064005"/>
+            <a:ext cx="1508289" cy="1282045"/>
+          </a:xfrm>
+          <a:prstGeom prst="rect">
+            <a:avLst/>
+          </a:prstGeom>
+          <a:noFill/>
+          <a:ln>
+            <a:solidFill>
+              <a:schemeClr val="tx1"/>
+            </a:solidFill>
+          </a:ln>
+        </p:spPr>
+        <p:txBody>
+          <a:bodyPr wrap="square" rtlCol="0" anchor="ctr">
+            <a:noAutofit/>
+          </a:bodyPr>
+          <a:lstStyle/>
+          <a:p>
+            <a:pPr marL="0" marR="0" lvl="0" indent="0" algn="ctr" defTabSz="457200" rtl="0" eaLnBrk="1" fontAlgn="auto" latinLnBrk="0" hangingPunct="1">
+              <a:lnSpc>
+                <a:spcPct val="100000"/>
+              </a:lnSpc>
+              <a:spcBef>
+                <a:spcPts val="0"/>
+              </a:spcBef>
+              <a:spcAft>
+                <a:spcPts val="0"/>
+              </a:spcAft>
+              <a:buClrTx/>
+              <a:buSzTx/>
+              <a:buFontTx/>
+              <a:buNone/>
+              <a:tabLst/>
+              <a:defRPr/>
+            </a:pPr>
+            <a:r>
+              <a:rPr kumimoji="0" lang="en-US" sz="1800" b="0" i="0" u="none" strike="noStrike" kern="1200" cap="none" spc="0" normalizeH="0" baseline="0" noProof="0" dirty="0">
+                <a:ln>
+                  <a:noFill/>
+                </a:ln>
+                <a:solidFill>
+                  <a:prstClr val="black"/>
+                </a:solidFill>
+                <a:effectLst/>
+                <a:uLnTx/>
+                <a:uFillTx/>
+                <a:latin typeface="Times New Roman" panose="02020603050405020304" pitchFamily="18" charset="0"/>
+                <a:cs typeface="Times New Roman" panose="02020603050405020304" pitchFamily="18" charset="0"/>
+              </a:rPr>
+              <a:t>Intro to Pixel/Object Extraction</a:t>
+            </a:r>
+          </a:p>
+        </p:txBody>
+      </p:sp>
+      <p:sp>
+        <p:nvSpPr>
+          <p:cNvPr id="8" name="TextBox 7">
+            <a:extLst>
+              <a:ext uri="{FF2B5EF4-FFF2-40B4-BE49-F238E27FC236}">
+                <a16:creationId xmlns:a16="http://schemas.microsoft.com/office/drawing/2014/main" id="{6E85287F-C703-3311-EB51-740C0BEB6155}"/>
+              </a:ext>
+            </a:extLst>
+          </p:cNvPr>
+          <p:cNvSpPr txBox="1"/>
+          <p:nvPr/>
+        </p:nvSpPr>
+        <p:spPr>
+          <a:xfrm>
+            <a:off x="763567" y="3071075"/>
+            <a:ext cx="1508289" cy="1282045"/>
+          </a:xfrm>
+          <a:prstGeom prst="rect">
+            <a:avLst/>
+          </a:prstGeom>
+          <a:noFill/>
+          <a:ln>
+            <a:solidFill>
+              <a:schemeClr val="tx1"/>
+            </a:solidFill>
+          </a:ln>
+        </p:spPr>
+        <p:txBody>
+          <a:bodyPr wrap="square" rtlCol="0" anchor="ctr">
+            <a:noAutofit/>
+          </a:bodyPr>
+          <a:lstStyle/>
+          <a:p>
+            <a:pPr marL="0" marR="0" lvl="0" indent="0" algn="ctr" defTabSz="457200" rtl="0" eaLnBrk="1" fontAlgn="auto" latinLnBrk="0" hangingPunct="1">
+              <a:lnSpc>
+                <a:spcPct val="100000"/>
+              </a:lnSpc>
+              <a:spcBef>
+                <a:spcPts val="0"/>
+              </a:spcBef>
+              <a:spcAft>
+                <a:spcPts val="0"/>
+              </a:spcAft>
+              <a:buClrTx/>
+              <a:buSzTx/>
+              <a:buFontTx/>
+              <a:buNone/>
+              <a:tabLst/>
+              <a:defRPr/>
+            </a:pPr>
+            <a:r>
+              <a:rPr kumimoji="0" lang="en-US" sz="1800" b="0" i="0" u="none" strike="noStrike" kern="1200" cap="none" spc="0" normalizeH="0" baseline="0" noProof="0" dirty="0">
+                <a:ln>
+                  <a:noFill/>
+                </a:ln>
+                <a:solidFill>
+                  <a:prstClr val="black"/>
+                </a:solidFill>
+                <a:effectLst/>
+                <a:uLnTx/>
+                <a:uFillTx/>
+                <a:latin typeface="Times New Roman" panose="02020603050405020304" pitchFamily="18" charset="0"/>
+                <a:cs typeface="Times New Roman" panose="02020603050405020304" pitchFamily="18" charset="0"/>
+              </a:rPr>
+              <a:t>Intro to Visualizing Extracted Data</a:t>
+            </a:r>
+          </a:p>
+        </p:txBody>
+      </p:sp>
+      <p:sp>
+        <p:nvSpPr>
+          <p:cNvPr id="9" name="TextBox 8">
+            <a:extLst>
+              <a:ext uri="{FF2B5EF4-FFF2-40B4-BE49-F238E27FC236}">
+                <a16:creationId xmlns:a16="http://schemas.microsoft.com/office/drawing/2014/main" id="{D4716F1E-41A8-22EF-8517-D405CAD42563}"/>
+              </a:ext>
+            </a:extLst>
+          </p:cNvPr>
+          <p:cNvSpPr txBox="1"/>
+          <p:nvPr/>
+        </p:nvSpPr>
+        <p:spPr>
+          <a:xfrm>
+            <a:off x="4901939" y="1340669"/>
+            <a:ext cx="1508289" cy="1272619"/>
+          </a:xfrm>
+          <a:prstGeom prst="rect">
+            <a:avLst/>
+          </a:prstGeom>
+          <a:noFill/>
+          <a:ln>
+            <a:solidFill>
+              <a:schemeClr val="tx1"/>
+            </a:solidFill>
+          </a:ln>
+        </p:spPr>
+        <p:txBody>
+          <a:bodyPr wrap="square" rtlCol="0" anchor="ctr">
+            <a:noAutofit/>
+          </a:bodyPr>
+          <a:lstStyle/>
+          <a:p>
+            <a:pPr marL="0" marR="0" lvl="0" indent="0" algn="ctr" defTabSz="457200" rtl="0" eaLnBrk="1" fontAlgn="auto" latinLnBrk="0" hangingPunct="1">
+              <a:lnSpc>
+                <a:spcPct val="100000"/>
+              </a:lnSpc>
+              <a:spcBef>
+                <a:spcPts val="0"/>
+              </a:spcBef>
+              <a:spcAft>
+                <a:spcPts val="0"/>
+              </a:spcAft>
+              <a:buClrTx/>
+              <a:buSzTx/>
+              <a:buFontTx/>
+              <a:buNone/>
+              <a:tabLst/>
+              <a:defRPr/>
+            </a:pPr>
+            <a:r>
+              <a:rPr kumimoji="0" lang="en-US" sz="1800" b="0" i="0" u="none" strike="noStrike" kern="1200" cap="none" spc="0" normalizeH="0" baseline="0" noProof="0" dirty="0">
+                <a:ln>
+                  <a:noFill/>
+                </a:ln>
+                <a:solidFill>
+                  <a:prstClr val="black"/>
+                </a:solidFill>
+                <a:effectLst/>
+                <a:uLnTx/>
+                <a:uFillTx/>
+                <a:latin typeface="Times New Roman" panose="02020603050405020304" pitchFamily="18" charset="0"/>
+                <a:cs typeface="Times New Roman" panose="02020603050405020304" pitchFamily="18" charset="0"/>
+              </a:rPr>
+              <a:t>Intro to Imagery Sources</a:t>
+            </a:r>
+          </a:p>
+        </p:txBody>
+      </p:sp>
+      <p:sp>
+        <p:nvSpPr>
+          <p:cNvPr id="10" name="TextBox 9">
+            <a:extLst>
+              <a:ext uri="{FF2B5EF4-FFF2-40B4-BE49-F238E27FC236}">
+                <a16:creationId xmlns:a16="http://schemas.microsoft.com/office/drawing/2014/main" id="{4F08A37D-62DB-6A76-7972-B234A5FA2116}"/>
+              </a:ext>
+            </a:extLst>
+          </p:cNvPr>
+          <p:cNvSpPr txBox="1"/>
+          <p:nvPr/>
+        </p:nvSpPr>
+        <p:spPr>
+          <a:xfrm>
+            <a:off x="763567" y="4801480"/>
+            <a:ext cx="1508289" cy="1282045"/>
+          </a:xfrm>
+          <a:prstGeom prst="rect">
+            <a:avLst/>
+          </a:prstGeom>
+          <a:noFill/>
+          <a:ln>
+            <a:solidFill>
+              <a:schemeClr val="tx1"/>
+            </a:solidFill>
+          </a:ln>
+        </p:spPr>
+        <p:txBody>
+          <a:bodyPr wrap="square" rtlCol="0" anchor="ctr">
+            <a:noAutofit/>
+          </a:bodyPr>
+          <a:lstStyle/>
+          <a:p>
+            <a:pPr marL="0" marR="0" lvl="0" indent="0" algn="ctr" defTabSz="457200" rtl="0" eaLnBrk="1" fontAlgn="auto" latinLnBrk="0" hangingPunct="1">
+              <a:lnSpc>
+                <a:spcPct val="100000"/>
+              </a:lnSpc>
+              <a:spcBef>
+                <a:spcPts val="0"/>
+              </a:spcBef>
+              <a:spcAft>
+                <a:spcPts val="0"/>
+              </a:spcAft>
+              <a:buClrTx/>
+              <a:buSzTx/>
+              <a:buFontTx/>
+              <a:buNone/>
+              <a:tabLst/>
+              <a:defRPr/>
+            </a:pPr>
+            <a:r>
+              <a:rPr kumimoji="0" lang="en-US" sz="1800" b="0" i="0" u="none" strike="noStrike" kern="1200" cap="none" spc="0" normalizeH="0" baseline="0" noProof="0" dirty="0">
+                <a:ln>
+                  <a:noFill/>
+                </a:ln>
+                <a:solidFill>
+                  <a:prstClr val="black"/>
+                </a:solidFill>
+                <a:effectLst/>
+                <a:uLnTx/>
+                <a:uFillTx/>
+                <a:latin typeface="Times New Roman" panose="02020603050405020304" pitchFamily="18" charset="0"/>
+                <a:cs typeface="Times New Roman" panose="02020603050405020304" pitchFamily="18" charset="0"/>
+              </a:rPr>
+              <a:t>Intro to </a:t>
+            </a:r>
+            <a:r>
+              <a:rPr kumimoji="0" lang="en-US" sz="1800" b="0" i="0" u="none" strike="noStrike" kern="1200" cap="none" spc="0" normalizeH="0" baseline="0" noProof="0" dirty="0" err="1">
+                <a:ln>
+                  <a:noFill/>
+                </a:ln>
+                <a:solidFill>
+                  <a:prstClr val="black"/>
+                </a:solidFill>
+                <a:effectLst/>
+                <a:uLnTx/>
+                <a:uFillTx/>
+                <a:latin typeface="Times New Roman" panose="02020603050405020304" pitchFamily="18" charset="0"/>
+                <a:cs typeface="Times New Roman" panose="02020603050405020304" pitchFamily="18" charset="0"/>
+              </a:rPr>
+              <a:t>Spatio</a:t>
+            </a:r>
+            <a:r>
+              <a:rPr kumimoji="0" lang="en-US" sz="1800" b="0" i="0" u="none" strike="noStrike" kern="1200" cap="none" spc="0" normalizeH="0" baseline="0" noProof="0" dirty="0">
+                <a:ln>
+                  <a:noFill/>
+                </a:ln>
+                <a:solidFill>
+                  <a:prstClr val="black"/>
+                </a:solidFill>
+                <a:effectLst/>
+                <a:uLnTx/>
+                <a:uFillTx/>
+                <a:latin typeface="Times New Roman" panose="02020603050405020304" pitchFamily="18" charset="0"/>
+                <a:cs typeface="Times New Roman" panose="02020603050405020304" pitchFamily="18" charset="0"/>
+              </a:rPr>
+              <a:t>-Temporal Analysis</a:t>
+            </a:r>
+          </a:p>
+        </p:txBody>
+      </p:sp>
+      <p:sp>
+        <p:nvSpPr>
+          <p:cNvPr id="11" name="TextBox 10">
+            <a:extLst>
+              <a:ext uri="{FF2B5EF4-FFF2-40B4-BE49-F238E27FC236}">
+                <a16:creationId xmlns:a16="http://schemas.microsoft.com/office/drawing/2014/main" id="{0C86E894-D470-6554-A012-02F207E17C5B}"/>
+              </a:ext>
+            </a:extLst>
+          </p:cNvPr>
+          <p:cNvSpPr txBox="1"/>
+          <p:nvPr/>
+        </p:nvSpPr>
+        <p:spPr>
+          <a:xfrm>
+            <a:off x="4901937" y="4796768"/>
+            <a:ext cx="1508289" cy="1282045"/>
+          </a:xfrm>
+          <a:prstGeom prst="rect">
+            <a:avLst/>
+          </a:prstGeom>
+          <a:noFill/>
+          <a:ln>
+            <a:solidFill>
+              <a:schemeClr val="tx1"/>
+            </a:solidFill>
+          </a:ln>
+        </p:spPr>
+        <p:txBody>
+          <a:bodyPr wrap="square" rtlCol="0" anchor="ctr">
+            <a:noAutofit/>
+          </a:bodyPr>
+          <a:lstStyle/>
+          <a:p>
+            <a:pPr marL="0" marR="0" lvl="0" indent="0" algn="ctr" defTabSz="457200" rtl="0" eaLnBrk="1" fontAlgn="auto" latinLnBrk="0" hangingPunct="1">
+              <a:lnSpc>
+                <a:spcPct val="100000"/>
+              </a:lnSpc>
+              <a:spcBef>
+                <a:spcPts val="0"/>
+              </a:spcBef>
+              <a:spcAft>
+                <a:spcPts val="0"/>
+              </a:spcAft>
+              <a:buClrTx/>
+              <a:buSzTx/>
+              <a:buFontTx/>
+              <a:buNone/>
+              <a:tabLst/>
+              <a:defRPr/>
+            </a:pPr>
+            <a:r>
+              <a:rPr kumimoji="0" lang="en-US" sz="1800" b="0" i="0" u="none" strike="noStrike" kern="1200" cap="none" spc="0" normalizeH="0" baseline="0" noProof="0" dirty="0">
+                <a:ln>
+                  <a:noFill/>
+                </a:ln>
+                <a:solidFill>
+                  <a:prstClr val="black"/>
+                </a:solidFill>
+                <a:effectLst/>
+                <a:uLnTx/>
+                <a:uFillTx/>
+                <a:latin typeface="Times New Roman" panose="02020603050405020304" pitchFamily="18" charset="0"/>
+                <a:cs typeface="Times New Roman" panose="02020603050405020304" pitchFamily="18" charset="0"/>
+              </a:rPr>
+              <a:t>Coursework Project</a:t>
+            </a:r>
+          </a:p>
+        </p:txBody>
+      </p:sp>
+      <p:sp>
+        <p:nvSpPr>
+          <p:cNvPr id="12" name="TextBox 11">
+            <a:extLst>
+              <a:ext uri="{FF2B5EF4-FFF2-40B4-BE49-F238E27FC236}">
+                <a16:creationId xmlns:a16="http://schemas.microsoft.com/office/drawing/2014/main" id="{7D8BFEC5-76A9-8FB7-D268-AA1042986ADA}"/>
+              </a:ext>
+            </a:extLst>
+          </p:cNvPr>
+          <p:cNvSpPr txBox="1"/>
+          <p:nvPr/>
+        </p:nvSpPr>
+        <p:spPr>
+          <a:xfrm>
+            <a:off x="763568" y="1340670"/>
+            <a:ext cx="1508289" cy="1282045"/>
+          </a:xfrm>
+          <a:prstGeom prst="rect">
+            <a:avLst/>
+          </a:prstGeom>
+          <a:noFill/>
+          <a:ln>
+            <a:solidFill>
+              <a:schemeClr val="tx1"/>
+            </a:solidFill>
+          </a:ln>
+        </p:spPr>
+        <p:txBody>
+          <a:bodyPr wrap="square" rtlCol="0" anchor="ctr">
+            <a:noAutofit/>
+          </a:bodyPr>
+          <a:lstStyle/>
+          <a:p>
+            <a:pPr marL="0" marR="0" lvl="0" indent="0" algn="ctr" defTabSz="457200" rtl="0" eaLnBrk="1" fontAlgn="auto" latinLnBrk="0" hangingPunct="1">
+              <a:lnSpc>
+                <a:spcPct val="100000"/>
+              </a:lnSpc>
+              <a:spcBef>
+                <a:spcPts val="0"/>
+              </a:spcBef>
+              <a:spcAft>
+                <a:spcPts val="0"/>
+              </a:spcAft>
+              <a:buClrTx/>
+              <a:buSzTx/>
+              <a:buFontTx/>
+              <a:buNone/>
+              <a:tabLst/>
+              <a:defRPr/>
+            </a:pPr>
+            <a:r>
+              <a:rPr kumimoji="0" lang="en-US" sz="1800" b="0" i="0" u="none" strike="noStrike" kern="1200" cap="none" spc="0" normalizeH="0" baseline="0" noProof="0" dirty="0">
+                <a:ln>
+                  <a:noFill/>
+                </a:ln>
+                <a:solidFill>
+                  <a:prstClr val="black"/>
+                </a:solidFill>
+                <a:effectLst/>
+                <a:uLnTx/>
+                <a:uFillTx/>
+                <a:latin typeface="Times New Roman" panose="02020603050405020304" pitchFamily="18" charset="0"/>
+                <a:cs typeface="Times New Roman" panose="02020603050405020304" pitchFamily="18" charset="0"/>
+              </a:rPr>
+              <a:t>Intro to Scientific Computing via Anaconda</a:t>
+            </a:r>
+          </a:p>
+        </p:txBody>
+      </p:sp>
+      <p:sp>
+        <p:nvSpPr>
+          <p:cNvPr id="13" name="TextBox 12">
+            <a:extLst>
+              <a:ext uri="{FF2B5EF4-FFF2-40B4-BE49-F238E27FC236}">
+                <a16:creationId xmlns:a16="http://schemas.microsoft.com/office/drawing/2014/main" id="{ECE89388-6D56-0A93-67A2-4D0088C4B740}"/>
+              </a:ext>
+            </a:extLst>
+          </p:cNvPr>
+          <p:cNvSpPr txBox="1"/>
+          <p:nvPr/>
+        </p:nvSpPr>
+        <p:spPr>
+          <a:xfrm>
+            <a:off x="2828040" y="4796768"/>
+            <a:ext cx="1508289" cy="1282045"/>
+          </a:xfrm>
+          <a:prstGeom prst="rect">
+            <a:avLst/>
+          </a:prstGeom>
+          <a:noFill/>
+          <a:ln>
+            <a:solidFill>
+              <a:schemeClr val="tx1"/>
+            </a:solidFill>
+          </a:ln>
+        </p:spPr>
+        <p:txBody>
+          <a:bodyPr wrap="square" rtlCol="0" anchor="ctr">
+            <a:noAutofit/>
+          </a:bodyPr>
+          <a:lstStyle/>
+          <a:p>
+            <a:pPr marL="0" marR="0" lvl="0" indent="0" algn="ctr" defTabSz="457200" rtl="0" eaLnBrk="1" fontAlgn="auto" latinLnBrk="0" hangingPunct="1">
+              <a:lnSpc>
+                <a:spcPct val="100000"/>
+              </a:lnSpc>
+              <a:spcBef>
+                <a:spcPts val="0"/>
+              </a:spcBef>
+              <a:spcAft>
+                <a:spcPts val="0"/>
+              </a:spcAft>
+              <a:buClrTx/>
+              <a:buSzTx/>
+              <a:buFontTx/>
+              <a:buNone/>
+              <a:tabLst/>
+              <a:defRPr/>
+            </a:pPr>
+            <a:r>
+              <a:rPr kumimoji="0" lang="en-US" sz="1800" b="0" i="0" u="none" strike="noStrike" kern="1200" cap="none" spc="0" normalizeH="0" baseline="0" noProof="0" dirty="0">
+                <a:ln>
+                  <a:noFill/>
+                </a:ln>
+                <a:solidFill>
+                  <a:prstClr val="black"/>
+                </a:solidFill>
+                <a:effectLst/>
+                <a:uLnTx/>
+                <a:uFillTx/>
+                <a:latin typeface="Times New Roman" panose="02020603050405020304" pitchFamily="18" charset="0"/>
+                <a:cs typeface="Times New Roman" panose="02020603050405020304" pitchFamily="18" charset="0"/>
+              </a:rPr>
+              <a:t>Intro to Git and GitHub</a:t>
+            </a:r>
+          </a:p>
+        </p:txBody>
+      </p:sp>
+      <p:sp>
+        <p:nvSpPr>
+          <p:cNvPr id="14" name="TextBox 13">
+            <a:extLst>
+              <a:ext uri="{FF2B5EF4-FFF2-40B4-BE49-F238E27FC236}">
+                <a16:creationId xmlns:a16="http://schemas.microsoft.com/office/drawing/2014/main" id="{27FF8CBD-20AE-EF4F-5C32-4EAE456AD600}"/>
+              </a:ext>
+            </a:extLst>
+          </p:cNvPr>
+          <p:cNvSpPr txBox="1"/>
+          <p:nvPr/>
+        </p:nvSpPr>
+        <p:spPr>
+          <a:xfrm>
+            <a:off x="4883083" y="3064005"/>
+            <a:ext cx="1508289" cy="1282045"/>
+          </a:xfrm>
+          <a:prstGeom prst="rect">
+            <a:avLst/>
+          </a:prstGeom>
+          <a:noFill/>
+          <a:ln>
+            <a:solidFill>
+              <a:schemeClr val="tx1"/>
+            </a:solidFill>
+          </a:ln>
+        </p:spPr>
+        <p:txBody>
+          <a:bodyPr wrap="square" rtlCol="0" anchor="ctr">
+            <a:noAutofit/>
+          </a:bodyPr>
+          <a:lstStyle/>
+          <a:p>
+            <a:pPr marL="0" marR="0" lvl="0" indent="0" algn="ctr" defTabSz="457200" rtl="0" eaLnBrk="1" fontAlgn="auto" latinLnBrk="0" hangingPunct="1">
+              <a:lnSpc>
+                <a:spcPct val="100000"/>
+              </a:lnSpc>
+              <a:spcBef>
+                <a:spcPts val="0"/>
+              </a:spcBef>
+              <a:spcAft>
+                <a:spcPts val="0"/>
+              </a:spcAft>
+              <a:buClrTx/>
+              <a:buSzTx/>
+              <a:buFontTx/>
+              <a:buNone/>
+              <a:tabLst/>
+              <a:defRPr/>
+            </a:pPr>
+            <a:r>
+              <a:rPr kumimoji="0" lang="en-US" sz="1800" b="0" i="0" u="none" strike="noStrike" kern="1200" cap="none" spc="0" normalizeH="0" baseline="0" noProof="0" dirty="0">
+                <a:ln>
+                  <a:noFill/>
+                </a:ln>
+                <a:solidFill>
+                  <a:prstClr val="black"/>
+                </a:solidFill>
+                <a:effectLst/>
+                <a:uLnTx/>
+                <a:uFillTx/>
+                <a:latin typeface="Times New Roman" panose="02020603050405020304" pitchFamily="18" charset="0"/>
+                <a:cs typeface="Times New Roman" panose="02020603050405020304" pitchFamily="18" charset="0"/>
+              </a:rPr>
+              <a:t>Intro to Clipping Imagery</a:t>
+            </a:r>
+          </a:p>
+        </p:txBody>
+      </p:sp>
+      <p:cxnSp>
+        <p:nvCxnSpPr>
+          <p:cNvPr id="16" name="Straight Arrow Connector 15">
+            <a:extLst>
+              <a:ext uri="{FF2B5EF4-FFF2-40B4-BE49-F238E27FC236}">
+                <a16:creationId xmlns:a16="http://schemas.microsoft.com/office/drawing/2014/main" id="{B7360C28-7307-6619-E595-7FB07FBFDDCE}"/>
+              </a:ext>
+            </a:extLst>
+          </p:cNvPr>
+          <p:cNvCxnSpPr>
+            <a:stCxn id="12" idx="3"/>
+            <a:endCxn id="5" idx="1"/>
+          </p:cNvCxnSpPr>
+          <p:nvPr/>
+        </p:nvCxnSpPr>
+        <p:spPr>
+          <a:xfrm flipV="1">
+            <a:off x="2271857" y="1981692"/>
+            <a:ext cx="556183" cy="1"/>
+          </a:xfrm>
+          <a:prstGeom prst="straightConnector1">
+            <a:avLst/>
+          </a:prstGeom>
+          <a:ln w="38100">
+            <a:tailEnd type="triangle"/>
+          </a:ln>
+        </p:spPr>
+        <p:style>
+          <a:lnRef idx="1">
+            <a:schemeClr val="accent1"/>
+          </a:lnRef>
+          <a:fillRef idx="0">
+            <a:schemeClr val="accent1"/>
+          </a:fillRef>
+          <a:effectRef idx="0">
+            <a:schemeClr val="accent1"/>
+          </a:effectRef>
+          <a:fontRef idx="minor">
+            <a:schemeClr val="tx1"/>
+          </a:fontRef>
+        </p:style>
+      </p:cxnSp>
+      <p:cxnSp>
+        <p:nvCxnSpPr>
+          <p:cNvPr id="17" name="Straight Arrow Connector 16">
+            <a:extLst>
+              <a:ext uri="{FF2B5EF4-FFF2-40B4-BE49-F238E27FC236}">
+                <a16:creationId xmlns:a16="http://schemas.microsoft.com/office/drawing/2014/main" id="{9CA75634-707B-B6D2-E84F-BC6958F215BC}"/>
+              </a:ext>
+            </a:extLst>
+          </p:cNvPr>
+          <p:cNvCxnSpPr>
+            <a:cxnSpLocks/>
+            <a:stCxn id="5" idx="3"/>
+            <a:endCxn id="9" idx="1"/>
+          </p:cNvCxnSpPr>
+          <p:nvPr/>
+        </p:nvCxnSpPr>
+        <p:spPr>
+          <a:xfrm flipV="1">
+            <a:off x="4336329" y="1976979"/>
+            <a:ext cx="565610" cy="4713"/>
+          </a:xfrm>
+          <a:prstGeom prst="straightConnector1">
+            <a:avLst/>
+          </a:prstGeom>
+          <a:ln w="38100">
+            <a:tailEnd type="triangle"/>
+          </a:ln>
+        </p:spPr>
+        <p:style>
+          <a:lnRef idx="1">
+            <a:schemeClr val="accent1"/>
+          </a:lnRef>
+          <a:fillRef idx="0">
+            <a:schemeClr val="accent1"/>
+          </a:fillRef>
+          <a:effectRef idx="0">
+            <a:schemeClr val="accent1"/>
+          </a:effectRef>
+          <a:fontRef idx="minor">
+            <a:schemeClr val="tx1"/>
+          </a:fontRef>
+        </p:style>
+      </p:cxnSp>
+      <p:cxnSp>
+        <p:nvCxnSpPr>
+          <p:cNvPr id="21" name="Straight Arrow Connector 20">
+            <a:extLst>
+              <a:ext uri="{FF2B5EF4-FFF2-40B4-BE49-F238E27FC236}">
+                <a16:creationId xmlns:a16="http://schemas.microsoft.com/office/drawing/2014/main" id="{AD305074-9C0E-3D21-39CD-0146D84195A7}"/>
+              </a:ext>
+            </a:extLst>
+          </p:cNvPr>
+          <p:cNvCxnSpPr>
+            <a:cxnSpLocks/>
+            <a:endCxn id="4" idx="1"/>
+          </p:cNvCxnSpPr>
+          <p:nvPr/>
+        </p:nvCxnSpPr>
+        <p:spPr>
+          <a:xfrm flipV="1">
+            <a:off x="6410226" y="2010365"/>
+            <a:ext cx="565608" cy="4713"/>
+          </a:xfrm>
+          <a:prstGeom prst="straightConnector1">
+            <a:avLst/>
+          </a:prstGeom>
+          <a:ln w="38100">
+            <a:tailEnd type="triangle"/>
+          </a:ln>
+        </p:spPr>
+        <p:style>
+          <a:lnRef idx="1">
+            <a:schemeClr val="accent1"/>
+          </a:lnRef>
+          <a:fillRef idx="0">
+            <a:schemeClr val="accent1"/>
+          </a:fillRef>
+          <a:effectRef idx="0">
+            <a:schemeClr val="accent1"/>
+          </a:effectRef>
+          <a:fontRef idx="minor">
+            <a:schemeClr val="tx1"/>
+          </a:fontRef>
+        </p:style>
+      </p:cxnSp>
+      <p:cxnSp>
+        <p:nvCxnSpPr>
+          <p:cNvPr id="24" name="Straight Arrow Connector 23">
+            <a:extLst>
+              <a:ext uri="{FF2B5EF4-FFF2-40B4-BE49-F238E27FC236}">
+                <a16:creationId xmlns:a16="http://schemas.microsoft.com/office/drawing/2014/main" id="{1C9A9F0B-DE06-817A-82F6-0F7DE2BC6776}"/>
+              </a:ext>
+            </a:extLst>
+          </p:cNvPr>
+          <p:cNvCxnSpPr>
+            <a:cxnSpLocks/>
+            <a:stCxn id="4" idx="2"/>
+            <a:endCxn id="6" idx="0"/>
+          </p:cNvCxnSpPr>
+          <p:nvPr/>
+        </p:nvCxnSpPr>
+        <p:spPr>
+          <a:xfrm flipH="1">
+            <a:off x="7729978" y="2651387"/>
+            <a:ext cx="1" cy="412618"/>
+          </a:xfrm>
+          <a:prstGeom prst="straightConnector1">
+            <a:avLst/>
+          </a:prstGeom>
+          <a:ln w="38100">
+            <a:tailEnd type="triangle"/>
+          </a:ln>
+        </p:spPr>
+        <p:style>
+          <a:lnRef idx="1">
+            <a:schemeClr val="accent1"/>
+          </a:lnRef>
+          <a:fillRef idx="0">
+            <a:schemeClr val="accent1"/>
+          </a:fillRef>
+          <a:effectRef idx="0">
+            <a:schemeClr val="accent1"/>
+          </a:effectRef>
+          <a:fontRef idx="minor">
+            <a:schemeClr val="tx1"/>
+          </a:fontRef>
+        </p:style>
+      </p:cxnSp>
+      <p:cxnSp>
+        <p:nvCxnSpPr>
+          <p:cNvPr id="28" name="Straight Arrow Connector 27">
+            <a:extLst>
+              <a:ext uri="{FF2B5EF4-FFF2-40B4-BE49-F238E27FC236}">
+                <a16:creationId xmlns:a16="http://schemas.microsoft.com/office/drawing/2014/main" id="{81152508-2766-3CA9-558D-81FA18C0FA8D}"/>
+              </a:ext>
+            </a:extLst>
+          </p:cNvPr>
+          <p:cNvCxnSpPr>
+            <a:cxnSpLocks/>
+            <a:stCxn id="6" idx="1"/>
+            <a:endCxn id="14" idx="3"/>
+          </p:cNvCxnSpPr>
+          <p:nvPr/>
+        </p:nvCxnSpPr>
+        <p:spPr>
+          <a:xfrm flipH="1">
+            <a:off x="6391372" y="3705028"/>
+            <a:ext cx="584461" cy="0"/>
+          </a:xfrm>
+          <a:prstGeom prst="straightConnector1">
+            <a:avLst/>
+          </a:prstGeom>
+          <a:ln w="38100">
+            <a:tailEnd type="triangle"/>
+          </a:ln>
+        </p:spPr>
+        <p:style>
+          <a:lnRef idx="1">
+            <a:schemeClr val="accent1"/>
+          </a:lnRef>
+          <a:fillRef idx="0">
+            <a:schemeClr val="accent1"/>
+          </a:fillRef>
+          <a:effectRef idx="0">
+            <a:schemeClr val="accent1"/>
+          </a:effectRef>
+          <a:fontRef idx="minor">
+            <a:schemeClr val="tx1"/>
+          </a:fontRef>
+        </p:style>
+      </p:cxnSp>
+      <p:cxnSp>
+        <p:nvCxnSpPr>
+          <p:cNvPr id="31" name="Straight Arrow Connector 30">
+            <a:extLst>
+              <a:ext uri="{FF2B5EF4-FFF2-40B4-BE49-F238E27FC236}">
+                <a16:creationId xmlns:a16="http://schemas.microsoft.com/office/drawing/2014/main" id="{13B752EA-755A-F587-839F-B0997F5265D8}"/>
+              </a:ext>
+            </a:extLst>
+          </p:cNvPr>
+          <p:cNvCxnSpPr>
+            <a:cxnSpLocks/>
+            <a:stCxn id="14" idx="1"/>
+            <a:endCxn id="7" idx="3"/>
+          </p:cNvCxnSpPr>
+          <p:nvPr/>
+        </p:nvCxnSpPr>
+        <p:spPr>
+          <a:xfrm flipH="1">
+            <a:off x="4336328" y="3705028"/>
+            <a:ext cx="546755" cy="0"/>
+          </a:xfrm>
+          <a:prstGeom prst="straightConnector1">
+            <a:avLst/>
+          </a:prstGeom>
+          <a:ln w="38100">
+            <a:tailEnd type="triangle"/>
+          </a:ln>
+        </p:spPr>
+        <p:style>
+          <a:lnRef idx="1">
+            <a:schemeClr val="accent1"/>
+          </a:lnRef>
+          <a:fillRef idx="0">
+            <a:schemeClr val="accent1"/>
+          </a:fillRef>
+          <a:effectRef idx="0">
+            <a:schemeClr val="accent1"/>
+          </a:effectRef>
+          <a:fontRef idx="minor">
+            <a:schemeClr val="tx1"/>
+          </a:fontRef>
+        </p:style>
+      </p:cxnSp>
+      <p:cxnSp>
+        <p:nvCxnSpPr>
+          <p:cNvPr id="35" name="Straight Arrow Connector 34">
+            <a:extLst>
+              <a:ext uri="{FF2B5EF4-FFF2-40B4-BE49-F238E27FC236}">
+                <a16:creationId xmlns:a16="http://schemas.microsoft.com/office/drawing/2014/main" id="{B94D74BB-904A-5C83-7606-F624362A24A9}"/>
+              </a:ext>
+            </a:extLst>
+          </p:cNvPr>
+          <p:cNvCxnSpPr>
+            <a:cxnSpLocks/>
+            <a:stCxn id="7" idx="1"/>
+            <a:endCxn id="8" idx="3"/>
+          </p:cNvCxnSpPr>
+          <p:nvPr/>
+        </p:nvCxnSpPr>
+        <p:spPr>
+          <a:xfrm flipH="1">
+            <a:off x="2271856" y="3705028"/>
+            <a:ext cx="556183" cy="7070"/>
+          </a:xfrm>
+          <a:prstGeom prst="straightConnector1">
+            <a:avLst/>
+          </a:prstGeom>
+          <a:ln w="38100">
+            <a:tailEnd type="triangle"/>
+          </a:ln>
+        </p:spPr>
+        <p:style>
+          <a:lnRef idx="1">
+            <a:schemeClr val="accent1"/>
+          </a:lnRef>
+          <a:fillRef idx="0">
+            <a:schemeClr val="accent1"/>
+          </a:fillRef>
+          <a:effectRef idx="0">
+            <a:schemeClr val="accent1"/>
+          </a:effectRef>
+          <a:fontRef idx="minor">
+            <a:schemeClr val="tx1"/>
+          </a:fontRef>
+        </p:style>
+      </p:cxnSp>
+      <p:cxnSp>
+        <p:nvCxnSpPr>
+          <p:cNvPr id="40" name="Straight Arrow Connector 39">
+            <a:extLst>
+              <a:ext uri="{FF2B5EF4-FFF2-40B4-BE49-F238E27FC236}">
+                <a16:creationId xmlns:a16="http://schemas.microsoft.com/office/drawing/2014/main" id="{7E267108-5AC0-7572-B0C8-323047BB7C29}"/>
+              </a:ext>
+            </a:extLst>
+          </p:cNvPr>
+          <p:cNvCxnSpPr>
+            <a:cxnSpLocks/>
+            <a:stCxn id="8" idx="2"/>
+            <a:endCxn id="10" idx="0"/>
+          </p:cNvCxnSpPr>
+          <p:nvPr/>
+        </p:nvCxnSpPr>
+        <p:spPr>
+          <a:xfrm>
+            <a:off x="1517712" y="4353120"/>
+            <a:ext cx="0" cy="448360"/>
+          </a:xfrm>
+          <a:prstGeom prst="straightConnector1">
+            <a:avLst/>
+          </a:prstGeom>
+          <a:ln w="38100">
+            <a:tailEnd type="triangle"/>
+          </a:ln>
+        </p:spPr>
+        <p:style>
+          <a:lnRef idx="1">
+            <a:schemeClr val="accent1"/>
+          </a:lnRef>
+          <a:fillRef idx="0">
+            <a:schemeClr val="accent1"/>
+          </a:fillRef>
+          <a:effectRef idx="0">
+            <a:schemeClr val="accent1"/>
+          </a:effectRef>
+          <a:fontRef idx="minor">
+            <a:schemeClr val="tx1"/>
+          </a:fontRef>
+        </p:style>
+      </p:cxnSp>
+      <p:cxnSp>
+        <p:nvCxnSpPr>
+          <p:cNvPr id="44" name="Straight Arrow Connector 43">
+            <a:extLst>
+              <a:ext uri="{FF2B5EF4-FFF2-40B4-BE49-F238E27FC236}">
+                <a16:creationId xmlns:a16="http://schemas.microsoft.com/office/drawing/2014/main" id="{ACBAB1A9-F887-B0D9-72BA-7685BD4F92AC}"/>
+              </a:ext>
+            </a:extLst>
+          </p:cNvPr>
+          <p:cNvCxnSpPr>
+            <a:cxnSpLocks/>
+            <a:stCxn id="10" idx="3"/>
+            <a:endCxn id="13" idx="1"/>
+          </p:cNvCxnSpPr>
+          <p:nvPr/>
+        </p:nvCxnSpPr>
+        <p:spPr>
+          <a:xfrm flipV="1">
+            <a:off x="2271856" y="5437791"/>
+            <a:ext cx="556184" cy="4712"/>
+          </a:xfrm>
+          <a:prstGeom prst="straightConnector1">
+            <a:avLst/>
+          </a:prstGeom>
+          <a:ln w="38100">
+            <a:tailEnd type="triangle"/>
+          </a:ln>
+        </p:spPr>
+        <p:style>
+          <a:lnRef idx="1">
+            <a:schemeClr val="accent1"/>
+          </a:lnRef>
+          <a:fillRef idx="0">
+            <a:schemeClr val="accent1"/>
+          </a:fillRef>
+          <a:effectRef idx="0">
+            <a:schemeClr val="accent1"/>
+          </a:effectRef>
+          <a:fontRef idx="minor">
+            <a:schemeClr val="tx1"/>
+          </a:fontRef>
+        </p:style>
+      </p:cxnSp>
+      <p:cxnSp>
+        <p:nvCxnSpPr>
+          <p:cNvPr id="45" name="Straight Arrow Connector 44">
+            <a:extLst>
+              <a:ext uri="{FF2B5EF4-FFF2-40B4-BE49-F238E27FC236}">
+                <a16:creationId xmlns:a16="http://schemas.microsoft.com/office/drawing/2014/main" id="{9C482EF9-0E9B-C375-4627-218393D11254}"/>
+              </a:ext>
+            </a:extLst>
+          </p:cNvPr>
+          <p:cNvCxnSpPr>
+            <a:cxnSpLocks/>
+            <a:stCxn id="13" idx="3"/>
+            <a:endCxn id="11" idx="1"/>
+          </p:cNvCxnSpPr>
+          <p:nvPr/>
+        </p:nvCxnSpPr>
+        <p:spPr>
+          <a:xfrm>
+            <a:off x="4336329" y="5437791"/>
+            <a:ext cx="565608" cy="0"/>
+          </a:xfrm>
+          <a:prstGeom prst="straightConnector1">
+            <a:avLst/>
+          </a:prstGeom>
+          <a:ln w="38100">
+            <a:tailEnd type="triangle"/>
+          </a:ln>
+        </p:spPr>
+        <p:style>
+          <a:lnRef idx="1">
+            <a:schemeClr val="accent1"/>
+          </a:lnRef>
+          <a:fillRef idx="0">
+            <a:schemeClr val="accent1"/>
+          </a:fillRef>
+          <a:effectRef idx="0">
+            <a:schemeClr val="accent1"/>
+          </a:effectRef>
+          <a:fontRef idx="minor">
+            <a:schemeClr val="tx1"/>
+          </a:fontRef>
+        </p:style>
+      </p:cxnSp>
+      <p:sp>
+        <p:nvSpPr>
+          <p:cNvPr id="52" name="TextBox 51">
+            <a:extLst>
+              <a:ext uri="{FF2B5EF4-FFF2-40B4-BE49-F238E27FC236}">
+                <a16:creationId xmlns:a16="http://schemas.microsoft.com/office/drawing/2014/main" id="{C0239838-330B-6FE2-83C9-AC46DF490000}"/>
+              </a:ext>
+            </a:extLst>
+          </p:cNvPr>
+          <p:cNvSpPr txBox="1"/>
+          <p:nvPr/>
+        </p:nvSpPr>
+        <p:spPr>
+          <a:xfrm>
+            <a:off x="0" y="272024"/>
+            <a:ext cx="9144000" cy="523220"/>
+          </a:xfrm>
+          <a:prstGeom prst="rect">
+            <a:avLst/>
+          </a:prstGeom>
+          <a:noFill/>
+        </p:spPr>
+        <p:txBody>
+          <a:bodyPr wrap="square" rtlCol="0" anchor="ctr">
+            <a:spAutoFit/>
+          </a:bodyPr>
+          <a:lstStyle/>
+          <a:p>
+            <a:pPr marL="0" marR="0" lvl="0" indent="0" algn="ctr" defTabSz="457200" rtl="0" eaLnBrk="1" fontAlgn="auto" latinLnBrk="0" hangingPunct="1">
+              <a:lnSpc>
+                <a:spcPct val="100000"/>
+              </a:lnSpc>
+              <a:spcBef>
+                <a:spcPts val="0"/>
+              </a:spcBef>
+              <a:spcAft>
+                <a:spcPts val="0"/>
+              </a:spcAft>
+              <a:buClrTx/>
+              <a:buSzTx/>
+              <a:buFontTx/>
+              <a:buNone/>
+              <a:tabLst/>
+              <a:defRPr/>
+            </a:pPr>
+            <a:r>
+              <a:rPr kumimoji="0" lang="en-US" sz="2800" b="0" i="0" u="none" strike="noStrike" kern="1200" cap="none" spc="0" normalizeH="0" baseline="0" noProof="0" dirty="0">
+                <a:ln>
+                  <a:noFill/>
+                </a:ln>
+                <a:solidFill>
+                  <a:prstClr val="black"/>
+                </a:solidFill>
+                <a:effectLst/>
+                <a:uLnTx/>
+                <a:uFillTx/>
+                <a:latin typeface="Times New Roman" panose="02020603050405020304" pitchFamily="18" charset="0"/>
+                <a:cs typeface="Times New Roman" panose="02020603050405020304" pitchFamily="18" charset="0"/>
+              </a:rPr>
+              <a:t>GGS416 – Satellite Image Analysis</a:t>
+            </a:r>
+          </a:p>
+        </p:txBody>
+      </p:sp>
+    </p:spTree>
+    <p:extLst>
+      <p:ext uri="{BB962C8B-B14F-4D97-AF65-F5344CB8AC3E}">
+        <p14:creationId xmlns:p14="http://schemas.microsoft.com/office/powerpoint/2010/main" val="3276349978"/>
+      </p:ext>
+    </p:extLst>
+  </p:cSld>
+  <p:clrMapOvr>
+    <a:masterClrMapping/>
+  </p:clrMapOvr>
+</p:sld>
+</file>
+
 <file path=ppt/theme/theme1.xml><?xml version="1.0" encoding="utf-8"?>
 <a:theme xmlns:a="http://schemas.openxmlformats.org/drawingml/2006/main" name="Office Theme">
   <a:themeElements>

</xml_diff>